<commit_message>
adding fix to hardware plots
</commit_message>
<xml_diff>
--- a/vqo_noisy_nonlocality_quantum_networks.pptx
+++ b/vqo_noisy_nonlocality_quantum_networks.pptx
@@ -257,7 +257,7 @@
           <a:p>
             <a:fld id="{05E911D8-8C42-E348-B619-A2C0A8C1C303}" type="datetimeFigureOut">
               <a:rPr lang="en-US" smtClean="0"/>
-              <a:t>4/27/22</a:t>
+              <a:t>7/24/22</a:t>
             </a:fld>
             <a:endParaRPr lang="en-US"/>
           </a:p>
@@ -427,7 +427,7 @@
           <a:p>
             <a:fld id="{05E911D8-8C42-E348-B619-A2C0A8C1C303}" type="datetimeFigureOut">
               <a:rPr lang="en-US" smtClean="0"/>
-              <a:t>4/27/22</a:t>
+              <a:t>7/24/22</a:t>
             </a:fld>
             <a:endParaRPr lang="en-US"/>
           </a:p>
@@ -607,7 +607,7 @@
           <a:p>
             <a:fld id="{05E911D8-8C42-E348-B619-A2C0A8C1C303}" type="datetimeFigureOut">
               <a:rPr lang="en-US" smtClean="0"/>
-              <a:t>4/27/22</a:t>
+              <a:t>7/24/22</a:t>
             </a:fld>
             <a:endParaRPr lang="en-US"/>
           </a:p>
@@ -777,7 +777,7 @@
           <a:p>
             <a:fld id="{05E911D8-8C42-E348-B619-A2C0A8C1C303}" type="datetimeFigureOut">
               <a:rPr lang="en-US" smtClean="0"/>
-              <a:t>4/27/22</a:t>
+              <a:t>7/24/22</a:t>
             </a:fld>
             <a:endParaRPr lang="en-US"/>
           </a:p>
@@ -1023,7 +1023,7 @@
           <a:p>
             <a:fld id="{05E911D8-8C42-E348-B619-A2C0A8C1C303}" type="datetimeFigureOut">
               <a:rPr lang="en-US" smtClean="0"/>
-              <a:t>4/27/22</a:t>
+              <a:t>7/24/22</a:t>
             </a:fld>
             <a:endParaRPr lang="en-US"/>
           </a:p>
@@ -1255,7 +1255,7 @@
           <a:p>
             <a:fld id="{05E911D8-8C42-E348-B619-A2C0A8C1C303}" type="datetimeFigureOut">
               <a:rPr lang="en-US" smtClean="0"/>
-              <a:t>4/27/22</a:t>
+              <a:t>7/24/22</a:t>
             </a:fld>
             <a:endParaRPr lang="en-US"/>
           </a:p>
@@ -1622,7 +1622,7 @@
           <a:p>
             <a:fld id="{05E911D8-8C42-E348-B619-A2C0A8C1C303}" type="datetimeFigureOut">
               <a:rPr lang="en-US" smtClean="0"/>
-              <a:t>4/27/22</a:t>
+              <a:t>7/24/22</a:t>
             </a:fld>
             <a:endParaRPr lang="en-US"/>
           </a:p>
@@ -1740,7 +1740,7 @@
           <a:p>
             <a:fld id="{05E911D8-8C42-E348-B619-A2C0A8C1C303}" type="datetimeFigureOut">
               <a:rPr lang="en-US" smtClean="0"/>
-              <a:t>4/27/22</a:t>
+              <a:t>7/24/22</a:t>
             </a:fld>
             <a:endParaRPr lang="en-US"/>
           </a:p>
@@ -1835,7 +1835,7 @@
           <a:p>
             <a:fld id="{05E911D8-8C42-E348-B619-A2C0A8C1C303}" type="datetimeFigureOut">
               <a:rPr lang="en-US" smtClean="0"/>
-              <a:t>4/27/22</a:t>
+              <a:t>7/24/22</a:t>
             </a:fld>
             <a:endParaRPr lang="en-US"/>
           </a:p>
@@ -2112,7 +2112,7 @@
           <a:p>
             <a:fld id="{05E911D8-8C42-E348-B619-A2C0A8C1C303}" type="datetimeFigureOut">
               <a:rPr lang="en-US" smtClean="0"/>
-              <a:t>4/27/22</a:t>
+              <a:t>7/24/22</a:t>
             </a:fld>
             <a:endParaRPr lang="en-US"/>
           </a:p>
@@ -2369,7 +2369,7 @@
           <a:p>
             <a:fld id="{05E911D8-8C42-E348-B619-A2C0A8C1C303}" type="datetimeFigureOut">
               <a:rPr lang="en-US" smtClean="0"/>
-              <a:t>4/27/22</a:t>
+              <a:t>7/24/22</a:t>
             </a:fld>
             <a:endParaRPr lang="en-US"/>
           </a:p>
@@ -2582,7 +2582,7 @@
           <a:p>
             <a:fld id="{05E911D8-8C42-E348-B619-A2C0A8C1C303}" type="datetimeFigureOut">
               <a:rPr lang="en-US" smtClean="0"/>
-              <a:t>4/27/22</a:t>
+              <a:t>7/24/22</a:t>
             </a:fld>
             <a:endParaRPr lang="en-US"/>
           </a:p>
@@ -3294,8 +3294,8 @@
           </a:extLst>
         </p:spPr>
       </p:pic>
-      <mc:AlternateContent xmlns:mc="http://schemas.openxmlformats.org/markup-compatibility/2006">
-        <mc:Choice xmlns:a14="http://schemas.microsoft.com/office/drawing/2010/main" Requires="a14">
+      <mc:AlternateContent xmlns:mc="http://schemas.openxmlformats.org/markup-compatibility/2006" xmlns:a14="http://schemas.microsoft.com/office/drawing/2010/main">
+        <mc:Choice Requires="a14">
           <p:sp>
             <p:nvSpPr>
               <p:cNvPr id="5" name="TextBox 4">
@@ -3382,7 +3382,7 @@
             </p:txBody>
           </p:sp>
         </mc:Choice>
-        <mc:Fallback>
+        <mc:Fallback xmlns="">
           <p:sp>
             <p:nvSpPr>
               <p:cNvPr id="5" name="TextBox 4">
@@ -3533,8 +3533,8 @@
           </a:p>
         </p:txBody>
       </p:sp>
-      <mc:AlternateContent xmlns:mc="http://schemas.openxmlformats.org/markup-compatibility/2006">
-        <mc:Choice xmlns:a14="http://schemas.microsoft.com/office/drawing/2010/main" Requires="a14">
+      <mc:AlternateContent xmlns:mc="http://schemas.openxmlformats.org/markup-compatibility/2006" xmlns:a14="http://schemas.microsoft.com/office/drawing/2010/main">
+        <mc:Choice Requires="a14">
           <p:sp>
             <p:nvSpPr>
               <p:cNvPr id="7" name="Rounded Rectangle 6">
@@ -4150,7 +4150,7 @@
             </p:txBody>
           </p:sp>
         </mc:Choice>
-        <mc:Fallback>
+        <mc:Fallback xmlns="">
           <p:sp>
             <p:nvSpPr>
               <p:cNvPr id="7" name="Rounded Rectangle 6">
@@ -4200,8 +4200,8 @@
           </p:sp>
         </mc:Fallback>
       </mc:AlternateContent>
-      <mc:AlternateContent xmlns:mc="http://schemas.openxmlformats.org/markup-compatibility/2006">
-        <mc:Choice xmlns:a14="http://schemas.microsoft.com/office/drawing/2010/main" Requires="a14">
+      <mc:AlternateContent xmlns:mc="http://schemas.openxmlformats.org/markup-compatibility/2006" xmlns:a14="http://schemas.microsoft.com/office/drawing/2010/main">
+        <mc:Choice Requires="a14">
           <p:sp>
             <p:nvSpPr>
               <p:cNvPr id="9" name="Rounded Rectangle 8">
@@ -4316,7 +4316,7 @@
             </p:txBody>
           </p:sp>
         </mc:Choice>
-        <mc:Fallback>
+        <mc:Fallback xmlns="">
           <p:sp>
             <p:nvSpPr>
               <p:cNvPr id="9" name="Rounded Rectangle 8">
@@ -4367,8 +4367,8 @@
           </p:sp>
         </mc:Fallback>
       </mc:AlternateContent>
-      <mc:AlternateContent xmlns:mc="http://schemas.openxmlformats.org/markup-compatibility/2006">
-        <mc:Choice xmlns:a14="http://schemas.microsoft.com/office/drawing/2010/main" Requires="a14">
+      <mc:AlternateContent xmlns:mc="http://schemas.openxmlformats.org/markup-compatibility/2006" xmlns:a14="http://schemas.microsoft.com/office/drawing/2010/main">
+        <mc:Choice Requires="a14">
           <p:sp>
             <p:nvSpPr>
               <p:cNvPr id="10" name="Rounded Rectangle 9">
@@ -4481,7 +4481,7 @@
             </p:txBody>
           </p:sp>
         </mc:Choice>
-        <mc:Fallback>
+        <mc:Fallback xmlns="">
           <p:sp>
             <p:nvSpPr>
               <p:cNvPr id="10" name="Rounded Rectangle 9">
@@ -4585,8 +4585,8 @@
           </a:p>
         </p:txBody>
       </p:sp>
-      <mc:AlternateContent xmlns:mc="http://schemas.openxmlformats.org/markup-compatibility/2006">
-        <mc:Choice xmlns:a14="http://schemas.microsoft.com/office/drawing/2010/main" Requires="a14">
+      <mc:AlternateContent xmlns:mc="http://schemas.openxmlformats.org/markup-compatibility/2006" xmlns:a14="http://schemas.microsoft.com/office/drawing/2010/main">
+        <mc:Choice Requires="a14">
           <p:sp>
             <p:nvSpPr>
               <p:cNvPr id="13" name="Rectangle 12">
@@ -4657,7 +4657,7 @@
             </p:txBody>
           </p:sp>
         </mc:Choice>
-        <mc:Fallback>
+        <mc:Fallback xmlns="">
           <p:sp>
             <p:nvSpPr>
               <p:cNvPr id="13" name="Rectangle 12">
@@ -4702,8 +4702,8 @@
           </p:sp>
         </mc:Fallback>
       </mc:AlternateContent>
-      <mc:AlternateContent xmlns:mc="http://schemas.openxmlformats.org/markup-compatibility/2006">
-        <mc:Choice xmlns:a14="http://schemas.microsoft.com/office/drawing/2010/main" Requires="a14">
+      <mc:AlternateContent xmlns:mc="http://schemas.openxmlformats.org/markup-compatibility/2006" xmlns:a14="http://schemas.microsoft.com/office/drawing/2010/main">
+        <mc:Choice Requires="a14">
           <p:sp>
             <p:nvSpPr>
               <p:cNvPr id="14" name="Rectangle 13">
@@ -4916,7 +4916,7 @@
             </p:txBody>
           </p:sp>
         </mc:Choice>
-        <mc:Fallback>
+        <mc:Fallback xmlns="">
           <p:sp>
             <p:nvSpPr>
               <p:cNvPr id="14" name="Rectangle 13">
@@ -5267,8 +5267,8 @@
           </a:p>
         </p:txBody>
       </p:sp>
-      <mc:AlternateContent xmlns:mc="http://schemas.openxmlformats.org/markup-compatibility/2006">
-        <mc:Choice xmlns:a14="http://schemas.microsoft.com/office/drawing/2010/main" Requires="a14">
+      <mc:AlternateContent xmlns:mc="http://schemas.openxmlformats.org/markup-compatibility/2006" xmlns:a14="http://schemas.microsoft.com/office/drawing/2010/main">
+        <mc:Choice Requires="a14">
           <p:sp>
             <p:nvSpPr>
               <p:cNvPr id="24" name="Rounded Rectangle 23">
@@ -5481,7 +5481,7 @@
             </p:txBody>
           </p:sp>
         </mc:Choice>
-        <mc:Fallback>
+        <mc:Fallback xmlns="">
           <p:sp>
             <p:nvSpPr>
               <p:cNvPr id="24" name="Rounded Rectangle 23">
@@ -7564,8 +7564,8 @@
           </a:fontRef>
         </p:style>
       </p:cxnSp>
-      <mc:AlternateContent xmlns:mc="http://schemas.openxmlformats.org/markup-compatibility/2006">
-        <mc:Choice xmlns:a14="http://schemas.microsoft.com/office/drawing/2010/main" Requires="a14">
+      <mc:AlternateContent xmlns:mc="http://schemas.openxmlformats.org/markup-compatibility/2006" xmlns:a14="http://schemas.microsoft.com/office/drawing/2010/main">
+        <mc:Choice Requires="a14">
           <p:sp>
             <p:nvSpPr>
               <p:cNvPr id="7" name="TextBox 6">
@@ -7637,7 +7637,7 @@
             </p:txBody>
           </p:sp>
         </mc:Choice>
-        <mc:Fallback>
+        <mc:Fallback xmlns="">
           <p:sp>
             <p:nvSpPr>
               <p:cNvPr id="7" name="TextBox 6">
@@ -7682,8 +7682,8 @@
           </p:sp>
         </mc:Fallback>
       </mc:AlternateContent>
-      <mc:AlternateContent xmlns:mc="http://schemas.openxmlformats.org/markup-compatibility/2006">
-        <mc:Choice xmlns:a14="http://schemas.microsoft.com/office/drawing/2010/main" Requires="a14">
+      <mc:AlternateContent xmlns:mc="http://schemas.openxmlformats.org/markup-compatibility/2006" xmlns:a14="http://schemas.microsoft.com/office/drawing/2010/main">
+        <mc:Choice Requires="a14">
           <p:sp>
             <p:nvSpPr>
               <p:cNvPr id="8" name="TextBox 7">
@@ -7733,7 +7733,7 @@
             </p:txBody>
           </p:sp>
         </mc:Choice>
-        <mc:Fallback>
+        <mc:Fallback xmlns="">
           <p:sp>
             <p:nvSpPr>
               <p:cNvPr id="8" name="TextBox 7">
@@ -7778,8 +7778,8 @@
           </p:sp>
         </mc:Fallback>
       </mc:AlternateContent>
-      <mc:AlternateContent xmlns:mc="http://schemas.openxmlformats.org/markup-compatibility/2006">
-        <mc:Choice xmlns:a14="http://schemas.microsoft.com/office/drawing/2010/main" Requires="a14">
+      <mc:AlternateContent xmlns:mc="http://schemas.openxmlformats.org/markup-compatibility/2006" xmlns:a14="http://schemas.microsoft.com/office/drawing/2010/main">
+        <mc:Choice Requires="a14">
           <p:sp>
             <p:nvSpPr>
               <p:cNvPr id="9" name="Rounded Rectangle 8">
@@ -7930,7 +7930,7 @@
             </p:txBody>
           </p:sp>
         </mc:Choice>
-        <mc:Fallback>
+        <mc:Fallback xmlns="">
           <p:sp>
             <p:nvSpPr>
               <p:cNvPr id="9" name="Rounded Rectangle 8">
@@ -7982,8 +7982,8 @@
           </p:sp>
         </mc:Fallback>
       </mc:AlternateContent>
-      <mc:AlternateContent xmlns:mc="http://schemas.openxmlformats.org/markup-compatibility/2006">
-        <mc:Choice xmlns:a14="http://schemas.microsoft.com/office/drawing/2010/main" Requires="a14">
+      <mc:AlternateContent xmlns:mc="http://schemas.openxmlformats.org/markup-compatibility/2006" xmlns:a14="http://schemas.microsoft.com/office/drawing/2010/main">
+        <mc:Choice Requires="a14">
           <p:sp>
             <p:nvSpPr>
               <p:cNvPr id="11" name="TextBox 10">
@@ -8055,7 +8055,7 @@
             </p:txBody>
           </p:sp>
         </mc:Choice>
-        <mc:Fallback>
+        <mc:Fallback xmlns="">
           <p:sp>
             <p:nvSpPr>
               <p:cNvPr id="11" name="TextBox 10">
@@ -8696,8 +8696,8 @@
           </a:fontRef>
         </p:style>
       </p:cxnSp>
-      <mc:AlternateContent xmlns:mc="http://schemas.openxmlformats.org/markup-compatibility/2006">
-        <mc:Choice xmlns:a14="http://schemas.microsoft.com/office/drawing/2010/main" Requires="a14">
+      <mc:AlternateContent xmlns:mc="http://schemas.openxmlformats.org/markup-compatibility/2006" xmlns:a14="http://schemas.microsoft.com/office/drawing/2010/main">
+        <mc:Choice Requires="a14">
           <p:sp>
             <p:nvSpPr>
               <p:cNvPr id="37" name="TextBox 36">
@@ -8769,7 +8769,7 @@
             </p:txBody>
           </p:sp>
         </mc:Choice>
-        <mc:Fallback>
+        <mc:Fallback xmlns="">
           <p:sp>
             <p:nvSpPr>
               <p:cNvPr id="37" name="TextBox 36">
@@ -8814,8 +8814,8 @@
           </p:sp>
         </mc:Fallback>
       </mc:AlternateContent>
-      <mc:AlternateContent xmlns:mc="http://schemas.openxmlformats.org/markup-compatibility/2006">
-        <mc:Choice xmlns:a14="http://schemas.microsoft.com/office/drawing/2010/main" Requires="a14">
+      <mc:AlternateContent xmlns:mc="http://schemas.openxmlformats.org/markup-compatibility/2006" xmlns:a14="http://schemas.microsoft.com/office/drawing/2010/main">
+        <mc:Choice Requires="a14">
           <p:sp>
             <p:nvSpPr>
               <p:cNvPr id="38" name="TextBox 37">
@@ -8865,7 +8865,7 @@
             </p:txBody>
           </p:sp>
         </mc:Choice>
-        <mc:Fallback>
+        <mc:Fallback xmlns="">
           <p:sp>
             <p:nvSpPr>
               <p:cNvPr id="38" name="TextBox 37">
@@ -8910,8 +8910,8 @@
           </p:sp>
         </mc:Fallback>
       </mc:AlternateContent>
-      <mc:AlternateContent xmlns:mc="http://schemas.openxmlformats.org/markup-compatibility/2006">
-        <mc:Choice xmlns:a14="http://schemas.microsoft.com/office/drawing/2010/main" Requires="a14">
+      <mc:AlternateContent xmlns:mc="http://schemas.openxmlformats.org/markup-compatibility/2006" xmlns:a14="http://schemas.microsoft.com/office/drawing/2010/main">
+        <mc:Choice Requires="a14">
           <p:sp>
             <p:nvSpPr>
               <p:cNvPr id="39" name="Rounded Rectangle 38">
@@ -9062,7 +9062,7 @@
             </p:txBody>
           </p:sp>
         </mc:Choice>
-        <mc:Fallback>
+        <mc:Fallback xmlns="">
           <p:sp>
             <p:nvSpPr>
               <p:cNvPr id="39" name="Rounded Rectangle 38">
@@ -9114,8 +9114,8 @@
           </p:sp>
         </mc:Fallback>
       </mc:AlternateContent>
-      <mc:AlternateContent xmlns:mc="http://schemas.openxmlformats.org/markup-compatibility/2006">
-        <mc:Choice xmlns:a14="http://schemas.microsoft.com/office/drawing/2010/main" Requires="a14">
+      <mc:AlternateContent xmlns:mc="http://schemas.openxmlformats.org/markup-compatibility/2006" xmlns:a14="http://schemas.microsoft.com/office/drawing/2010/main">
+        <mc:Choice Requires="a14">
           <p:sp>
             <p:nvSpPr>
               <p:cNvPr id="40" name="TextBox 39">
@@ -9187,7 +9187,7 @@
             </p:txBody>
           </p:sp>
         </mc:Choice>
-        <mc:Fallback>
+        <mc:Fallback xmlns="">
           <p:sp>
             <p:nvSpPr>
               <p:cNvPr id="40" name="TextBox 39">
@@ -9788,8 +9788,8 @@
           <a:chExt cx="0" cy="0"/>
         </a:xfrm>
       </p:grpSpPr>
-      <mc:AlternateContent xmlns:mc="http://schemas.openxmlformats.org/markup-compatibility/2006">
-        <mc:Choice xmlns:a14="http://schemas.microsoft.com/office/drawing/2010/main" Requires="a14">
+      <mc:AlternateContent xmlns:mc="http://schemas.openxmlformats.org/markup-compatibility/2006" xmlns:a14="http://schemas.microsoft.com/office/drawing/2010/main">
+        <mc:Choice Requires="a14">
           <p:sp>
             <p:nvSpPr>
               <p:cNvPr id="67" name="Rounded Rectangle 66">
@@ -9896,7 +9896,7 @@
             </p:txBody>
           </p:sp>
         </mc:Choice>
-        <mc:Fallback>
+        <mc:Fallback xmlns="">
           <p:sp>
             <p:nvSpPr>
               <p:cNvPr id="67" name="Rounded Rectangle 66">
@@ -9950,8 +9950,8 @@
           </p:sp>
         </mc:Fallback>
       </mc:AlternateContent>
-      <mc:AlternateContent xmlns:mc="http://schemas.openxmlformats.org/markup-compatibility/2006">
-        <mc:Choice xmlns:a14="http://schemas.microsoft.com/office/drawing/2010/main" Requires="a14">
+      <mc:AlternateContent xmlns:mc="http://schemas.openxmlformats.org/markup-compatibility/2006" xmlns:a14="http://schemas.microsoft.com/office/drawing/2010/main">
+        <mc:Choice Requires="a14">
           <p:sp>
             <p:nvSpPr>
               <p:cNvPr id="65" name="Rounded Rectangle 64">
@@ -10058,7 +10058,7 @@
             </p:txBody>
           </p:sp>
         </mc:Choice>
-        <mc:Fallback>
+        <mc:Fallback xmlns="">
           <p:sp>
             <p:nvSpPr>
               <p:cNvPr id="65" name="Rounded Rectangle 64">
@@ -10112,8 +10112,8 @@
           </p:sp>
         </mc:Fallback>
       </mc:AlternateContent>
-      <mc:AlternateContent xmlns:mc="http://schemas.openxmlformats.org/markup-compatibility/2006">
-        <mc:Choice xmlns:a14="http://schemas.microsoft.com/office/drawing/2010/main" Requires="a14">
+      <mc:AlternateContent xmlns:mc="http://schemas.openxmlformats.org/markup-compatibility/2006" xmlns:a14="http://schemas.microsoft.com/office/drawing/2010/main">
+        <mc:Choice Requires="a14">
           <p:sp>
             <p:nvSpPr>
               <p:cNvPr id="21" name="Rounded Rectangle 20">
@@ -10223,7 +10223,7 @@
             </p:txBody>
           </p:sp>
         </mc:Choice>
-        <mc:Fallback>
+        <mc:Fallback xmlns="">
           <p:sp>
             <p:nvSpPr>
               <p:cNvPr id="21" name="Rounded Rectangle 20">
@@ -10479,8 +10479,8 @@
           </a:p>
         </p:txBody>
       </p:sp>
-      <mc:AlternateContent xmlns:mc="http://schemas.openxmlformats.org/markup-compatibility/2006">
-        <mc:Choice xmlns:a14="http://schemas.microsoft.com/office/drawing/2010/main" Requires="a14">
+      <mc:AlternateContent xmlns:mc="http://schemas.openxmlformats.org/markup-compatibility/2006" xmlns:a14="http://schemas.microsoft.com/office/drawing/2010/main">
+        <mc:Choice Requires="a14">
           <p:sp>
             <p:nvSpPr>
               <p:cNvPr id="12" name="TextBox 11">
@@ -10549,7 +10549,7 @@
             </p:txBody>
           </p:sp>
         </mc:Choice>
-        <mc:Fallback>
+        <mc:Fallback xmlns="">
           <p:sp>
             <p:nvSpPr>
               <p:cNvPr id="12" name="TextBox 11">
@@ -10640,8 +10640,8 @@
           </a:fontRef>
         </p:style>
       </p:cxnSp>
-      <mc:AlternateContent xmlns:mc="http://schemas.openxmlformats.org/markup-compatibility/2006">
-        <mc:Choice xmlns:a14="http://schemas.microsoft.com/office/drawing/2010/main" Requires="a14">
+      <mc:AlternateContent xmlns:mc="http://schemas.openxmlformats.org/markup-compatibility/2006" xmlns:a14="http://schemas.microsoft.com/office/drawing/2010/main">
+        <mc:Choice Requires="a14">
           <p:sp>
             <p:nvSpPr>
               <p:cNvPr id="18" name="TextBox 17">
@@ -10710,7 +10710,7 @@
             </p:txBody>
           </p:sp>
         </mc:Choice>
-        <mc:Fallback>
+        <mc:Fallback xmlns="">
           <p:sp>
             <p:nvSpPr>
               <p:cNvPr id="18" name="TextBox 17">
@@ -10755,8 +10755,8 @@
           </p:sp>
         </mc:Fallback>
       </mc:AlternateContent>
-      <mc:AlternateContent xmlns:mc="http://schemas.openxmlformats.org/markup-compatibility/2006">
-        <mc:Choice xmlns:a14="http://schemas.microsoft.com/office/drawing/2010/main" Requires="a14">
+      <mc:AlternateContent xmlns:mc="http://schemas.openxmlformats.org/markup-compatibility/2006" xmlns:a14="http://schemas.microsoft.com/office/drawing/2010/main">
+        <mc:Choice Requires="a14">
           <p:sp>
             <p:nvSpPr>
               <p:cNvPr id="20" name="TextBox 19">
@@ -10806,7 +10806,7 @@
             </p:txBody>
           </p:sp>
         </mc:Choice>
-        <mc:Fallback>
+        <mc:Fallback xmlns="">
           <p:sp>
             <p:nvSpPr>
               <p:cNvPr id="20" name="TextBox 19">
@@ -10897,8 +10897,8 @@
           </a:fontRef>
         </p:style>
       </p:cxnSp>
-      <mc:AlternateContent xmlns:mc="http://schemas.openxmlformats.org/markup-compatibility/2006">
-        <mc:Choice xmlns:a14="http://schemas.microsoft.com/office/drawing/2010/main" Requires="a14">
+      <mc:AlternateContent xmlns:mc="http://schemas.openxmlformats.org/markup-compatibility/2006" xmlns:a14="http://schemas.microsoft.com/office/drawing/2010/main">
+        <mc:Choice Requires="a14">
           <p:sp>
             <p:nvSpPr>
               <p:cNvPr id="22" name="TextBox 21">
@@ -10948,7 +10948,7 @@
             </p:txBody>
           </p:sp>
         </mc:Choice>
-        <mc:Fallback>
+        <mc:Fallback xmlns="">
           <p:sp>
             <p:nvSpPr>
               <p:cNvPr id="22" name="TextBox 21">
@@ -10993,8 +10993,8 @@
           </p:sp>
         </mc:Fallback>
       </mc:AlternateContent>
-      <mc:AlternateContent xmlns:mc="http://schemas.openxmlformats.org/markup-compatibility/2006">
-        <mc:Choice xmlns:a14="http://schemas.microsoft.com/office/drawing/2010/main" Requires="a14">
+      <mc:AlternateContent xmlns:mc="http://schemas.openxmlformats.org/markup-compatibility/2006" xmlns:a14="http://schemas.microsoft.com/office/drawing/2010/main">
+        <mc:Choice Requires="a14">
           <p:sp>
             <p:nvSpPr>
               <p:cNvPr id="23" name="Rounded Rectangle 22">
@@ -11179,7 +11179,7 @@
             </p:txBody>
           </p:sp>
         </mc:Choice>
-        <mc:Fallback>
+        <mc:Fallback xmlns="">
           <p:sp>
             <p:nvSpPr>
               <p:cNvPr id="23" name="Rounded Rectangle 22">
@@ -11231,8 +11231,8 @@
           </p:sp>
         </mc:Fallback>
       </mc:AlternateContent>
-      <mc:AlternateContent xmlns:mc="http://schemas.openxmlformats.org/markup-compatibility/2006">
-        <mc:Choice xmlns:a14="http://schemas.microsoft.com/office/drawing/2010/main" Requires="a14">
+      <mc:AlternateContent xmlns:mc="http://schemas.openxmlformats.org/markup-compatibility/2006" xmlns:a14="http://schemas.microsoft.com/office/drawing/2010/main">
+        <mc:Choice Requires="a14">
           <p:sp>
             <p:nvSpPr>
               <p:cNvPr id="24" name="TextBox 23">
@@ -11282,7 +11282,7 @@
             </p:txBody>
           </p:sp>
         </mc:Choice>
-        <mc:Fallback>
+        <mc:Fallback xmlns="">
           <p:sp>
             <p:nvSpPr>
               <p:cNvPr id="24" name="TextBox 23">
@@ -11762,8 +11762,8 @@
           </a:p>
         </p:txBody>
       </p:sp>
-      <mc:AlternateContent xmlns:mc="http://schemas.openxmlformats.org/markup-compatibility/2006">
-        <mc:Choice xmlns:a14="http://schemas.microsoft.com/office/drawing/2010/main" Requires="a14">
+      <mc:AlternateContent xmlns:mc="http://schemas.openxmlformats.org/markup-compatibility/2006" xmlns:a14="http://schemas.microsoft.com/office/drawing/2010/main">
+        <mc:Choice Requires="a14">
           <p:sp>
             <p:nvSpPr>
               <p:cNvPr id="48" name="Rectangle 47">
@@ -11812,7 +11812,7 @@
             </p:txBody>
           </p:sp>
         </mc:Choice>
-        <mc:Fallback>
+        <mc:Fallback xmlns="">
           <p:sp>
             <p:nvSpPr>
               <p:cNvPr id="48" name="Rectangle 47">
@@ -11857,8 +11857,8 @@
           </p:sp>
         </mc:Fallback>
       </mc:AlternateContent>
-      <mc:AlternateContent xmlns:mc="http://schemas.openxmlformats.org/markup-compatibility/2006">
-        <mc:Choice xmlns:a14="http://schemas.microsoft.com/office/drawing/2010/main" Requires="a14">
+      <mc:AlternateContent xmlns:mc="http://schemas.openxmlformats.org/markup-compatibility/2006" xmlns:a14="http://schemas.microsoft.com/office/drawing/2010/main">
+        <mc:Choice Requires="a14">
           <p:sp>
             <p:nvSpPr>
               <p:cNvPr id="49" name="Rounded Rectangle 48">
@@ -11943,7 +11943,7 @@
             </p:txBody>
           </p:sp>
         </mc:Choice>
-        <mc:Fallback>
+        <mc:Fallback xmlns="">
           <p:sp>
             <p:nvSpPr>
               <p:cNvPr id="49" name="Rounded Rectangle 48">
@@ -12196,8 +12196,8 @@
           </a:p>
         </p:txBody>
       </p:sp>
-      <mc:AlternateContent xmlns:mc="http://schemas.openxmlformats.org/markup-compatibility/2006">
-        <mc:Choice xmlns:a14="http://schemas.microsoft.com/office/drawing/2010/main" Requires="a14">
+      <mc:AlternateContent xmlns:mc="http://schemas.openxmlformats.org/markup-compatibility/2006" xmlns:a14="http://schemas.microsoft.com/office/drawing/2010/main">
+        <mc:Choice Requires="a14">
           <p:sp>
             <p:nvSpPr>
               <p:cNvPr id="68" name="Rounded Rectangle 67">
@@ -12368,7 +12368,7 @@
             </p:txBody>
           </p:sp>
         </mc:Choice>
-        <mc:Fallback>
+        <mc:Fallback xmlns="">
           <p:sp>
             <p:nvSpPr>
               <p:cNvPr id="68" name="Rounded Rectangle 67">
@@ -12420,8 +12420,8 @@
           </p:sp>
         </mc:Fallback>
       </mc:AlternateContent>
-      <mc:AlternateContent xmlns:mc="http://schemas.openxmlformats.org/markup-compatibility/2006">
-        <mc:Choice xmlns:a14="http://schemas.microsoft.com/office/drawing/2010/main" Requires="a14">
+      <mc:AlternateContent xmlns:mc="http://schemas.openxmlformats.org/markup-compatibility/2006" xmlns:a14="http://schemas.microsoft.com/office/drawing/2010/main">
+        <mc:Choice Requires="a14">
           <p:sp>
             <p:nvSpPr>
               <p:cNvPr id="73" name="Rounded Rectangle 72">
@@ -12528,7 +12528,7 @@
             </p:txBody>
           </p:sp>
         </mc:Choice>
-        <mc:Fallback>
+        <mc:Fallback xmlns="">
           <p:sp>
             <p:nvSpPr>
               <p:cNvPr id="73" name="Rounded Rectangle 72">
@@ -12582,8 +12582,8 @@
           </p:sp>
         </mc:Fallback>
       </mc:AlternateContent>
-      <mc:AlternateContent xmlns:mc="http://schemas.openxmlformats.org/markup-compatibility/2006">
-        <mc:Choice xmlns:a14="http://schemas.microsoft.com/office/drawing/2010/main" Requires="a14">
+      <mc:AlternateContent xmlns:mc="http://schemas.openxmlformats.org/markup-compatibility/2006" xmlns:a14="http://schemas.microsoft.com/office/drawing/2010/main">
+        <mc:Choice Requires="a14">
           <p:sp>
             <p:nvSpPr>
               <p:cNvPr id="74" name="Rounded Rectangle 73">
@@ -12693,7 +12693,7 @@
             </p:txBody>
           </p:sp>
         </mc:Choice>
-        <mc:Fallback>
+        <mc:Fallback xmlns="">
           <p:sp>
             <p:nvSpPr>
               <p:cNvPr id="74" name="Rounded Rectangle 73">
@@ -12747,8 +12747,8 @@
           </p:sp>
         </mc:Fallback>
       </mc:AlternateContent>
-      <mc:AlternateContent xmlns:mc="http://schemas.openxmlformats.org/markup-compatibility/2006">
-        <mc:Choice xmlns:a14="http://schemas.microsoft.com/office/drawing/2010/main" Requires="a14">
+      <mc:AlternateContent xmlns:mc="http://schemas.openxmlformats.org/markup-compatibility/2006" xmlns:a14="http://schemas.microsoft.com/office/drawing/2010/main">
+        <mc:Choice Requires="a14">
           <p:sp>
             <p:nvSpPr>
               <p:cNvPr id="78" name="TextBox 77">
@@ -12798,7 +12798,7 @@
             </p:txBody>
           </p:sp>
         </mc:Choice>
-        <mc:Fallback>
+        <mc:Fallback xmlns="">
           <p:sp>
             <p:nvSpPr>
               <p:cNvPr id="78" name="TextBox 77">
@@ -12935,8 +12935,8 @@
           </a:fontRef>
         </p:style>
       </p:cxnSp>
-      <mc:AlternateContent xmlns:mc="http://schemas.openxmlformats.org/markup-compatibility/2006">
-        <mc:Choice xmlns:a14="http://schemas.microsoft.com/office/drawing/2010/main" Requires="a14">
+      <mc:AlternateContent xmlns:mc="http://schemas.openxmlformats.org/markup-compatibility/2006" xmlns:a14="http://schemas.microsoft.com/office/drawing/2010/main">
+        <mc:Choice Requires="a14">
           <p:sp>
             <p:nvSpPr>
               <p:cNvPr id="79" name="TextBox 78">
@@ -12986,7 +12986,7 @@
             </p:txBody>
           </p:sp>
         </mc:Choice>
-        <mc:Fallback>
+        <mc:Fallback xmlns="">
           <p:sp>
             <p:nvSpPr>
               <p:cNvPr id="79" name="TextBox 78">
@@ -13031,8 +13031,8 @@
           </p:sp>
         </mc:Fallback>
       </mc:AlternateContent>
-      <mc:AlternateContent xmlns:mc="http://schemas.openxmlformats.org/markup-compatibility/2006">
-        <mc:Choice xmlns:a14="http://schemas.microsoft.com/office/drawing/2010/main" Requires="a14">
+      <mc:AlternateContent xmlns:mc="http://schemas.openxmlformats.org/markup-compatibility/2006" xmlns:a14="http://schemas.microsoft.com/office/drawing/2010/main">
+        <mc:Choice Requires="a14">
           <p:sp>
             <p:nvSpPr>
               <p:cNvPr id="80" name="Rounded Rectangle 79">
@@ -13203,7 +13203,7 @@
             </p:txBody>
           </p:sp>
         </mc:Choice>
-        <mc:Fallback>
+        <mc:Fallback xmlns="">
           <p:sp>
             <p:nvSpPr>
               <p:cNvPr id="80" name="Rounded Rectangle 79">
@@ -13687,8 +13687,8 @@
           </p:style>
         </p:cxnSp>
       </p:grpSp>
-      <mc:AlternateContent xmlns:mc="http://schemas.openxmlformats.org/markup-compatibility/2006">
-        <mc:Choice xmlns:a14="http://schemas.microsoft.com/office/drawing/2010/main" Requires="a14">
+      <mc:AlternateContent xmlns:mc="http://schemas.openxmlformats.org/markup-compatibility/2006" xmlns:a14="http://schemas.microsoft.com/office/drawing/2010/main">
+        <mc:Choice Requires="a14">
           <p:sp>
             <p:nvSpPr>
               <p:cNvPr id="90" name="Rounded Rectangle 89">
@@ -13773,7 +13773,7 @@
             </p:txBody>
           </p:sp>
         </mc:Choice>
-        <mc:Fallback>
+        <mc:Fallback xmlns="">
           <p:sp>
             <p:nvSpPr>
               <p:cNvPr id="90" name="Rounded Rectangle 89">
@@ -13980,8 +13980,8 @@
           </a:p>
         </p:txBody>
       </p:sp>
-      <mc:AlternateContent xmlns:mc="http://schemas.openxmlformats.org/markup-compatibility/2006">
-        <mc:Choice xmlns:a14="http://schemas.microsoft.com/office/drawing/2010/main" Requires="a14">
+      <mc:AlternateContent xmlns:mc="http://schemas.openxmlformats.org/markup-compatibility/2006" xmlns:a14="http://schemas.microsoft.com/office/drawing/2010/main">
+        <mc:Choice Requires="a14">
           <p:sp>
             <p:nvSpPr>
               <p:cNvPr id="94" name="Rounded Rectangle 93">
@@ -14166,7 +14166,7 @@
             </p:txBody>
           </p:sp>
         </mc:Choice>
-        <mc:Fallback>
+        <mc:Fallback xmlns="">
           <p:sp>
             <p:nvSpPr>
               <p:cNvPr id="94" name="Rounded Rectangle 93">
@@ -14343,10 +14343,10 @@
       </p:grpSpPr>
       <p:pic>
         <p:nvPicPr>
-          <p:cNvPr id="3" name="Picture 2" descr="Graphical user interface, application&#10;&#10;Description automatically generated">
+          <p:cNvPr id="4" name="Picture 3" descr="Graphical user interface, application&#10;&#10;Description automatically generated">
             <a:extLst>
               <a:ext uri="{FF2B5EF4-FFF2-40B4-BE49-F238E27FC236}">
-                <a16:creationId xmlns:a16="http://schemas.microsoft.com/office/drawing/2014/main" id="{2CBF5AB3-AEDA-044F-B06A-8232B6ABB13D}"/>
+                <a16:creationId xmlns:a16="http://schemas.microsoft.com/office/drawing/2014/main" id="{22157AE3-C4E0-5D4F-95B6-DC815FD0819B}"/>
               </a:ext>
             </a:extLst>
           </p:cNvPr>
@@ -14363,7 +14363,37 @@
         </p:blipFill>
         <p:spPr>
           <a:xfrm>
-            <a:off x="6551612" y="3394363"/>
+            <a:off x="5136171" y="1366233"/>
+            <a:ext cx="14630400" cy="7315200"/>
+          </a:xfrm>
+          <a:prstGeom prst="rect">
+            <a:avLst/>
+          </a:prstGeom>
+        </p:spPr>
+      </p:pic>
+      <p:pic>
+        <p:nvPicPr>
+          <p:cNvPr id="3" name="Picture 2" descr="Graphical user interface, application&#10;&#10;Description automatically generated">
+            <a:extLst>
+              <a:ext uri="{FF2B5EF4-FFF2-40B4-BE49-F238E27FC236}">
+                <a16:creationId xmlns:a16="http://schemas.microsoft.com/office/drawing/2014/main" id="{2CBF5AB3-AEDA-044F-B06A-8232B6ABB13D}"/>
+              </a:ext>
+            </a:extLst>
+          </p:cNvPr>
+          <p:cNvPicPr>
+            <a:picLocks noChangeAspect="1"/>
+          </p:cNvPicPr>
+          <p:nvPr/>
+        </p:nvPicPr>
+        <p:blipFill>
+          <a:blip r:embed="rId3"/>
+          <a:stretch>
+            <a:fillRect/>
+          </a:stretch>
+        </p:blipFill>
+        <p:spPr>
+          <a:xfrm>
+            <a:off x="1594257" y="12015849"/>
             <a:ext cx="10972800" cy="7315200"/>
           </a:xfrm>
           <a:prstGeom prst="rect">
@@ -14385,8 +14415,8 @@
         </p:nvGrpSpPr>
         <p:grpSpPr>
           <a:xfrm>
-            <a:off x="8605146" y="8245569"/>
-            <a:ext cx="3105440" cy="404257"/>
+            <a:off x="6560977" y="7117099"/>
+            <a:ext cx="4210182" cy="548069"/>
             <a:chOff x="6826985" y="5083482"/>
             <a:chExt cx="2421079" cy="315169"/>
           </a:xfrm>
@@ -15103,8 +15133,8 @@
         </p:nvGrpSpPr>
         <p:grpSpPr>
           <a:xfrm>
-            <a:off x="9779644" y="5361188"/>
-            <a:ext cx="1614626" cy="469923"/>
+            <a:off x="8403012" y="3789146"/>
+            <a:ext cx="1840515" cy="535666"/>
             <a:chOff x="4130429" y="1906245"/>
             <a:chExt cx="1011742" cy="294459"/>
           </a:xfrm>
@@ -15397,8 +15427,8 @@
         </p:nvGrpSpPr>
         <p:grpSpPr>
           <a:xfrm>
-            <a:off x="14323989" y="7942672"/>
-            <a:ext cx="2599119" cy="747366"/>
+            <a:off x="13116140" y="6690294"/>
+            <a:ext cx="3390325" cy="974874"/>
             <a:chOff x="2452776" y="1648330"/>
             <a:chExt cx="1932096" cy="555566"/>
           </a:xfrm>
@@ -16115,8 +16145,8 @@
         </p:nvGrpSpPr>
         <p:grpSpPr>
           <a:xfrm>
-            <a:off x="14074709" y="5352088"/>
-            <a:ext cx="2625978" cy="467707"/>
+            <a:off x="13386595" y="3826119"/>
+            <a:ext cx="2995058" cy="533443"/>
             <a:chOff x="6807182" y="5072590"/>
             <a:chExt cx="1754263" cy="312448"/>
           </a:xfrm>
@@ -16670,8 +16700,8 @@
           </a:p>
         </p:txBody>
       </p:sp>
-      <mc:AlternateContent xmlns:mc="http://schemas.openxmlformats.org/markup-compatibility/2006">
-        <mc:Choice xmlns:a14="http://schemas.microsoft.com/office/drawing/2010/main" Requires="a14">
+      <mc:AlternateContent xmlns:mc="http://schemas.openxmlformats.org/markup-compatibility/2006" xmlns:a14="http://schemas.microsoft.com/office/drawing/2010/main">
+        <mc:Choice Requires="a14">
           <p:sp>
             <p:nvSpPr>
               <p:cNvPr id="7" name="Rounded Rectangle 6">
@@ -16773,7 +16803,7 @@
             </p:txBody>
           </p:sp>
         </mc:Choice>
-        <mc:Fallback>
+        <mc:Fallback xmlns="">
           <p:sp>
             <p:nvSpPr>
               <p:cNvPr id="7" name="Rounded Rectangle 6">
@@ -17091,8 +17121,8 @@
           </a:fontRef>
         </p:style>
       </p:cxnSp>
-      <mc:AlternateContent xmlns:mc="http://schemas.openxmlformats.org/markup-compatibility/2006">
-        <mc:Choice xmlns:a14="http://schemas.microsoft.com/office/drawing/2010/main" Requires="a14">
+      <mc:AlternateContent xmlns:mc="http://schemas.openxmlformats.org/markup-compatibility/2006" xmlns:a14="http://schemas.microsoft.com/office/drawing/2010/main">
+        <mc:Choice Requires="a14">
           <p:sp>
             <p:nvSpPr>
               <p:cNvPr id="30" name="Rounded Rectangle 29">
@@ -17194,7 +17224,7 @@
             </p:txBody>
           </p:sp>
         </mc:Choice>
-        <mc:Fallback>
+        <mc:Fallback xmlns="">
           <p:sp>
             <p:nvSpPr>
               <p:cNvPr id="30" name="Rounded Rectangle 29">
@@ -17379,8 +17409,8 @@
           </a:fontRef>
         </p:style>
       </p:cxnSp>
-      <mc:AlternateContent xmlns:mc="http://schemas.openxmlformats.org/markup-compatibility/2006">
-        <mc:Choice xmlns:a14="http://schemas.microsoft.com/office/drawing/2010/main" Requires="a14">
+      <mc:AlternateContent xmlns:mc="http://schemas.openxmlformats.org/markup-compatibility/2006" xmlns:a14="http://schemas.microsoft.com/office/drawing/2010/main">
+        <mc:Choice Requires="a14">
           <p:sp>
             <p:nvSpPr>
               <p:cNvPr id="39" name="Rounded Rectangle 38">
@@ -17482,7 +17512,7 @@
             </p:txBody>
           </p:sp>
         </mc:Choice>
-        <mc:Fallback>
+        <mc:Fallback xmlns="">
           <p:sp>
             <p:nvSpPr>
               <p:cNvPr id="39" name="Rounded Rectangle 38">
@@ -17532,8 +17562,8 @@
           </p:sp>
         </mc:Fallback>
       </mc:AlternateContent>
-      <mc:AlternateContent xmlns:mc="http://schemas.openxmlformats.org/markup-compatibility/2006">
-        <mc:Choice xmlns:a14="http://schemas.microsoft.com/office/drawing/2010/main" Requires="a14">
+      <mc:AlternateContent xmlns:mc="http://schemas.openxmlformats.org/markup-compatibility/2006" xmlns:a14="http://schemas.microsoft.com/office/drawing/2010/main">
+        <mc:Choice Requires="a14">
           <p:sp>
             <p:nvSpPr>
               <p:cNvPr id="48" name="Rounded Rectangle 47">
@@ -17635,7 +17665,7 @@
             </p:txBody>
           </p:sp>
         </mc:Choice>
-        <mc:Fallback>
+        <mc:Fallback xmlns="">
           <p:sp>
             <p:nvSpPr>
               <p:cNvPr id="48" name="Rounded Rectangle 47">
@@ -17864,8 +17894,8 @@
           </a:fontRef>
         </p:style>
       </p:cxnSp>
-      <mc:AlternateContent xmlns:mc="http://schemas.openxmlformats.org/markup-compatibility/2006">
-        <mc:Choice xmlns:a14="http://schemas.microsoft.com/office/drawing/2010/main" Requires="a14">
+      <mc:AlternateContent xmlns:mc="http://schemas.openxmlformats.org/markup-compatibility/2006" xmlns:a14="http://schemas.microsoft.com/office/drawing/2010/main">
+        <mc:Choice Requires="a14">
           <p:sp>
             <p:nvSpPr>
               <p:cNvPr id="57" name="Rounded Rectangle 56">
@@ -17967,7 +17997,7 @@
             </p:txBody>
           </p:sp>
         </mc:Choice>
-        <mc:Fallback>
+        <mc:Fallback xmlns="">
           <p:sp>
             <p:nvSpPr>
               <p:cNvPr id="57" name="Rounded Rectangle 56">
@@ -18195,8 +18225,8 @@
           </a:fontRef>
         </p:style>
       </p:cxnSp>
-      <mc:AlternateContent xmlns:mc="http://schemas.openxmlformats.org/markup-compatibility/2006">
-        <mc:Choice xmlns:a14="http://schemas.microsoft.com/office/drawing/2010/main" Requires="a14">
+      <mc:AlternateContent xmlns:mc="http://schemas.openxmlformats.org/markup-compatibility/2006" xmlns:a14="http://schemas.microsoft.com/office/drawing/2010/main">
+        <mc:Choice Requires="a14">
           <p:sp>
             <p:nvSpPr>
               <p:cNvPr id="72" name="TextBox 71">
@@ -18265,7 +18295,7 @@
             </p:txBody>
           </p:sp>
         </mc:Choice>
-        <mc:Fallback>
+        <mc:Fallback xmlns="">
           <p:sp>
             <p:nvSpPr>
               <p:cNvPr id="72" name="TextBox 71">
@@ -18310,8 +18340,8 @@
           </p:sp>
         </mc:Fallback>
       </mc:AlternateContent>
-      <mc:AlternateContent xmlns:mc="http://schemas.openxmlformats.org/markup-compatibility/2006">
-        <mc:Choice xmlns:a14="http://schemas.microsoft.com/office/drawing/2010/main" Requires="a14">
+      <mc:AlternateContent xmlns:mc="http://schemas.openxmlformats.org/markup-compatibility/2006" xmlns:a14="http://schemas.microsoft.com/office/drawing/2010/main">
+        <mc:Choice Requires="a14">
           <p:sp>
             <p:nvSpPr>
               <p:cNvPr id="73" name="TextBox 72">
@@ -18380,7 +18410,7 @@
             </p:txBody>
           </p:sp>
         </mc:Choice>
-        <mc:Fallback>
+        <mc:Fallback xmlns="">
           <p:sp>
             <p:nvSpPr>
               <p:cNvPr id="73" name="TextBox 72">
@@ -18425,8 +18455,8 @@
           </p:sp>
         </mc:Fallback>
       </mc:AlternateContent>
-      <mc:AlternateContent xmlns:mc="http://schemas.openxmlformats.org/markup-compatibility/2006">
-        <mc:Choice xmlns:a14="http://schemas.microsoft.com/office/drawing/2010/main" Requires="a14">
+      <mc:AlternateContent xmlns:mc="http://schemas.openxmlformats.org/markup-compatibility/2006" xmlns:a14="http://schemas.microsoft.com/office/drawing/2010/main">
+        <mc:Choice Requires="a14">
           <p:sp>
             <p:nvSpPr>
               <p:cNvPr id="75" name="TextBox 74">
@@ -18495,7 +18525,7 @@
             </p:txBody>
           </p:sp>
         </mc:Choice>
-        <mc:Fallback>
+        <mc:Fallback xmlns="">
           <p:sp>
             <p:nvSpPr>
               <p:cNvPr id="75" name="TextBox 74">
@@ -18540,8 +18570,8 @@
           </p:sp>
         </mc:Fallback>
       </mc:AlternateContent>
-      <mc:AlternateContent xmlns:mc="http://schemas.openxmlformats.org/markup-compatibility/2006">
-        <mc:Choice xmlns:a14="http://schemas.microsoft.com/office/drawing/2010/main" Requires="a14">
+      <mc:AlternateContent xmlns:mc="http://schemas.openxmlformats.org/markup-compatibility/2006" xmlns:a14="http://schemas.microsoft.com/office/drawing/2010/main">
+        <mc:Choice Requires="a14">
           <p:sp>
             <p:nvSpPr>
               <p:cNvPr id="76" name="TextBox 75">
@@ -18610,7 +18640,7 @@
             </p:txBody>
           </p:sp>
         </mc:Choice>
-        <mc:Fallback>
+        <mc:Fallback xmlns="">
           <p:sp>
             <p:nvSpPr>
               <p:cNvPr id="76" name="TextBox 75">
@@ -18655,8 +18685,8 @@
           </p:sp>
         </mc:Fallback>
       </mc:AlternateContent>
-      <mc:AlternateContent xmlns:mc="http://schemas.openxmlformats.org/markup-compatibility/2006">
-        <mc:Choice xmlns:a14="http://schemas.microsoft.com/office/drawing/2010/main" Requires="a14">
+      <mc:AlternateContent xmlns:mc="http://schemas.openxmlformats.org/markup-compatibility/2006" xmlns:a14="http://schemas.microsoft.com/office/drawing/2010/main">
+        <mc:Choice Requires="a14">
           <p:sp>
             <p:nvSpPr>
               <p:cNvPr id="77" name="TextBox 76">
@@ -18725,7 +18755,7 @@
             </p:txBody>
           </p:sp>
         </mc:Choice>
-        <mc:Fallback>
+        <mc:Fallback xmlns="">
           <p:sp>
             <p:nvSpPr>
               <p:cNvPr id="77" name="TextBox 76">
@@ -18770,8 +18800,8 @@
           </p:sp>
         </mc:Fallback>
       </mc:AlternateContent>
-      <mc:AlternateContent xmlns:mc="http://schemas.openxmlformats.org/markup-compatibility/2006">
-        <mc:Choice xmlns:a14="http://schemas.microsoft.com/office/drawing/2010/main" Requires="a14">
+      <mc:AlternateContent xmlns:mc="http://schemas.openxmlformats.org/markup-compatibility/2006" xmlns:a14="http://schemas.microsoft.com/office/drawing/2010/main">
+        <mc:Choice Requires="a14">
           <p:sp>
             <p:nvSpPr>
               <p:cNvPr id="78" name="TextBox 77">
@@ -18840,7 +18870,7 @@
             </p:txBody>
           </p:sp>
         </mc:Choice>
-        <mc:Fallback>
+        <mc:Fallback xmlns="">
           <p:sp>
             <p:nvSpPr>
               <p:cNvPr id="78" name="TextBox 77">
@@ -18885,8 +18915,8 @@
           </p:sp>
         </mc:Fallback>
       </mc:AlternateContent>
-      <mc:AlternateContent xmlns:mc="http://schemas.openxmlformats.org/markup-compatibility/2006">
-        <mc:Choice xmlns:a14="http://schemas.microsoft.com/office/drawing/2010/main" Requires="a14">
+      <mc:AlternateContent xmlns:mc="http://schemas.openxmlformats.org/markup-compatibility/2006" xmlns:a14="http://schemas.microsoft.com/office/drawing/2010/main">
+        <mc:Choice Requires="a14">
           <p:sp>
             <p:nvSpPr>
               <p:cNvPr id="79" name="TextBox 78">
@@ -18955,7 +18985,7 @@
             </p:txBody>
           </p:sp>
         </mc:Choice>
-        <mc:Fallback>
+        <mc:Fallback xmlns="">
           <p:sp>
             <p:nvSpPr>
               <p:cNvPr id="79" name="TextBox 78">
@@ -19000,8 +19030,8 @@
           </p:sp>
         </mc:Fallback>
       </mc:AlternateContent>
-      <mc:AlternateContent xmlns:mc="http://schemas.openxmlformats.org/markup-compatibility/2006">
-        <mc:Choice xmlns:a14="http://schemas.microsoft.com/office/drawing/2010/main" Requires="a14">
+      <mc:AlternateContent xmlns:mc="http://schemas.openxmlformats.org/markup-compatibility/2006" xmlns:a14="http://schemas.microsoft.com/office/drawing/2010/main">
+        <mc:Choice Requires="a14">
           <p:sp>
             <p:nvSpPr>
               <p:cNvPr id="80" name="TextBox 79">
@@ -19070,7 +19100,7 @@
             </p:txBody>
           </p:sp>
         </mc:Choice>
-        <mc:Fallback>
+        <mc:Fallback xmlns="">
           <p:sp>
             <p:nvSpPr>
               <p:cNvPr id="80" name="TextBox 79">
@@ -19115,8 +19145,8 @@
           </p:sp>
         </mc:Fallback>
       </mc:AlternateContent>
-      <mc:AlternateContent xmlns:mc="http://schemas.openxmlformats.org/markup-compatibility/2006">
-        <mc:Choice xmlns:a14="http://schemas.microsoft.com/office/drawing/2010/main" Requires="a14">
+      <mc:AlternateContent xmlns:mc="http://schemas.openxmlformats.org/markup-compatibility/2006" xmlns:a14="http://schemas.microsoft.com/office/drawing/2010/main">
+        <mc:Choice Requires="a14">
           <p:sp>
             <p:nvSpPr>
               <p:cNvPr id="81" name="TextBox 80">
@@ -19185,7 +19215,7 @@
             </p:txBody>
           </p:sp>
         </mc:Choice>
-        <mc:Fallback>
+        <mc:Fallback xmlns="">
           <p:sp>
             <p:nvSpPr>
               <p:cNvPr id="81" name="TextBox 80">
@@ -19230,8 +19260,8 @@
           </p:sp>
         </mc:Fallback>
       </mc:AlternateContent>
-      <mc:AlternateContent xmlns:mc="http://schemas.openxmlformats.org/markup-compatibility/2006">
-        <mc:Choice xmlns:a14="http://schemas.microsoft.com/office/drawing/2010/main" Requires="a14">
+      <mc:AlternateContent xmlns:mc="http://schemas.openxmlformats.org/markup-compatibility/2006" xmlns:a14="http://schemas.microsoft.com/office/drawing/2010/main">
+        <mc:Choice Requires="a14">
           <p:sp>
             <p:nvSpPr>
               <p:cNvPr id="82" name="TextBox 81">
@@ -19300,7 +19330,7 @@
             </p:txBody>
           </p:sp>
         </mc:Choice>
-        <mc:Fallback>
+        <mc:Fallback xmlns="">
           <p:sp>
             <p:nvSpPr>
               <p:cNvPr id="82" name="TextBox 81">
@@ -19524,8 +19554,8 @@
           </a:fontRef>
         </p:style>
       </p:cxnSp>
-      <mc:AlternateContent xmlns:mc="http://schemas.openxmlformats.org/markup-compatibility/2006">
-        <mc:Choice xmlns:a14="http://schemas.microsoft.com/office/drawing/2010/main" Requires="a14">
+      <mc:AlternateContent xmlns:mc="http://schemas.openxmlformats.org/markup-compatibility/2006" xmlns:a14="http://schemas.microsoft.com/office/drawing/2010/main">
+        <mc:Choice Requires="a14">
           <p:sp>
             <p:nvSpPr>
               <p:cNvPr id="104" name="Rounded Rectangle 103">
@@ -19627,7 +19657,7 @@
             </p:txBody>
           </p:sp>
         </mc:Choice>
-        <mc:Fallback>
+        <mc:Fallback xmlns="">
           <p:sp>
             <p:nvSpPr>
               <p:cNvPr id="104" name="Rounded Rectangle 103">
@@ -19677,8 +19707,8 @@
           </p:sp>
         </mc:Fallback>
       </mc:AlternateContent>
-      <mc:AlternateContent xmlns:mc="http://schemas.openxmlformats.org/markup-compatibility/2006">
-        <mc:Choice xmlns:a14="http://schemas.microsoft.com/office/drawing/2010/main" Requires="a14">
+      <mc:AlternateContent xmlns:mc="http://schemas.openxmlformats.org/markup-compatibility/2006" xmlns:a14="http://schemas.microsoft.com/office/drawing/2010/main">
+        <mc:Choice Requires="a14">
           <p:sp>
             <p:nvSpPr>
               <p:cNvPr id="105" name="TextBox 104">
@@ -19747,7 +19777,7 @@
             </p:txBody>
           </p:sp>
         </mc:Choice>
-        <mc:Fallback>
+        <mc:Fallback xmlns="">
           <p:sp>
             <p:nvSpPr>
               <p:cNvPr id="105" name="TextBox 104">
@@ -19792,8 +19822,8 @@
           </p:sp>
         </mc:Fallback>
       </mc:AlternateContent>
-      <mc:AlternateContent xmlns:mc="http://schemas.openxmlformats.org/markup-compatibility/2006">
-        <mc:Choice xmlns:a14="http://schemas.microsoft.com/office/drawing/2010/main" Requires="a14">
+      <mc:AlternateContent xmlns:mc="http://schemas.openxmlformats.org/markup-compatibility/2006" xmlns:a14="http://schemas.microsoft.com/office/drawing/2010/main">
+        <mc:Choice Requires="a14">
           <p:sp>
             <p:nvSpPr>
               <p:cNvPr id="106" name="TextBox 105">
@@ -19862,7 +19892,7 @@
             </p:txBody>
           </p:sp>
         </mc:Choice>
-        <mc:Fallback>
+        <mc:Fallback xmlns="">
           <p:sp>
             <p:nvSpPr>
               <p:cNvPr id="106" name="TextBox 105">
@@ -19952,8 +19982,8 @@
           </a:fontRef>
         </p:style>
       </p:cxnSp>
-      <mc:AlternateContent xmlns:mc="http://schemas.openxmlformats.org/markup-compatibility/2006">
-        <mc:Choice xmlns:a14="http://schemas.microsoft.com/office/drawing/2010/main" Requires="a14">
+      <mc:AlternateContent xmlns:mc="http://schemas.openxmlformats.org/markup-compatibility/2006" xmlns:a14="http://schemas.microsoft.com/office/drawing/2010/main">
+        <mc:Choice Requires="a14">
           <p:sp>
             <p:nvSpPr>
               <p:cNvPr id="4" name="Oval 3">
@@ -20062,7 +20092,7 @@
             </p:txBody>
           </p:sp>
         </mc:Choice>
-        <mc:Fallback>
+        <mc:Fallback xmlns="">
           <p:sp>
             <p:nvSpPr>
               <p:cNvPr id="4" name="Oval 3">
@@ -20112,8 +20142,8 @@
           </p:sp>
         </mc:Fallback>
       </mc:AlternateContent>
-      <mc:AlternateContent xmlns:mc="http://schemas.openxmlformats.org/markup-compatibility/2006">
-        <mc:Choice xmlns:a14="http://schemas.microsoft.com/office/drawing/2010/main" Requires="a14">
+      <mc:AlternateContent xmlns:mc="http://schemas.openxmlformats.org/markup-compatibility/2006" xmlns:a14="http://schemas.microsoft.com/office/drawing/2010/main">
+        <mc:Choice Requires="a14">
           <p:sp>
             <p:nvSpPr>
               <p:cNvPr id="60" name="Oval 59">
@@ -20222,7 +20252,7 @@
             </p:txBody>
           </p:sp>
         </mc:Choice>
-        <mc:Fallback>
+        <mc:Fallback xmlns="">
           <p:sp>
             <p:nvSpPr>
               <p:cNvPr id="60" name="Oval 59">
@@ -20272,8 +20302,8 @@
           </p:sp>
         </mc:Fallback>
       </mc:AlternateContent>
-      <mc:AlternateContent xmlns:mc="http://schemas.openxmlformats.org/markup-compatibility/2006">
-        <mc:Choice xmlns:a14="http://schemas.microsoft.com/office/drawing/2010/main" Requires="a14">
+      <mc:AlternateContent xmlns:mc="http://schemas.openxmlformats.org/markup-compatibility/2006" xmlns:a14="http://schemas.microsoft.com/office/drawing/2010/main">
+        <mc:Choice Requires="a14">
           <p:sp>
             <p:nvSpPr>
               <p:cNvPr id="38" name="Oval 37">
@@ -20382,7 +20412,7 @@
             </p:txBody>
           </p:sp>
         </mc:Choice>
-        <mc:Fallback>
+        <mc:Fallback xmlns="">
           <p:sp>
             <p:nvSpPr>
               <p:cNvPr id="38" name="Oval 37">
@@ -20432,8 +20462,8 @@
           </p:sp>
         </mc:Fallback>
       </mc:AlternateContent>
-      <mc:AlternateContent xmlns:mc="http://schemas.openxmlformats.org/markup-compatibility/2006">
-        <mc:Choice xmlns:a14="http://schemas.microsoft.com/office/drawing/2010/main" Requires="a14">
+      <mc:AlternateContent xmlns:mc="http://schemas.openxmlformats.org/markup-compatibility/2006" xmlns:a14="http://schemas.microsoft.com/office/drawing/2010/main">
+        <mc:Choice Requires="a14">
           <p:sp>
             <p:nvSpPr>
               <p:cNvPr id="90" name="Oval 89">
@@ -20542,7 +20572,7 @@
             </p:txBody>
           </p:sp>
         </mc:Choice>
-        <mc:Fallback>
+        <mc:Fallback xmlns="">
           <p:sp>
             <p:nvSpPr>
               <p:cNvPr id="90" name="Oval 89">
@@ -20650,8 +20680,8 @@
           </a:p>
         </p:txBody>
       </p:sp>
-      <mc:AlternateContent xmlns:mc="http://schemas.openxmlformats.org/markup-compatibility/2006">
-        <mc:Choice xmlns:a14="http://schemas.microsoft.com/office/drawing/2010/main" Requires="a14">
+      <mc:AlternateContent xmlns:mc="http://schemas.openxmlformats.org/markup-compatibility/2006" xmlns:a14="http://schemas.microsoft.com/office/drawing/2010/main">
+        <mc:Choice Requires="a14">
           <p:sp>
             <p:nvSpPr>
               <p:cNvPr id="4" name="Oval 3">
@@ -20735,7 +20765,7 @@
             </p:txBody>
           </p:sp>
         </mc:Choice>
-        <mc:Fallback>
+        <mc:Fallback xmlns="">
           <p:sp>
             <p:nvSpPr>
               <p:cNvPr id="4" name="Oval 3">
@@ -20785,8 +20815,8 @@
           </p:sp>
         </mc:Fallback>
       </mc:AlternateContent>
-      <mc:AlternateContent xmlns:mc="http://schemas.openxmlformats.org/markup-compatibility/2006">
-        <mc:Choice xmlns:a14="http://schemas.microsoft.com/office/drawing/2010/main" Requires="a14">
+      <mc:AlternateContent xmlns:mc="http://schemas.openxmlformats.org/markup-compatibility/2006" xmlns:a14="http://schemas.microsoft.com/office/drawing/2010/main">
+        <mc:Choice Requires="a14">
           <p:sp>
             <p:nvSpPr>
               <p:cNvPr id="5" name="Rounded Rectangle 4">
@@ -20863,7 +20893,7 @@
             </p:txBody>
           </p:sp>
         </mc:Choice>
-        <mc:Fallback>
+        <mc:Fallback xmlns="">
           <p:sp>
             <p:nvSpPr>
               <p:cNvPr id="5" name="Rounded Rectangle 4">
@@ -21048,8 +21078,8 @@
           </a:fontRef>
         </p:style>
       </p:cxnSp>
-      <mc:AlternateContent xmlns:mc="http://schemas.openxmlformats.org/markup-compatibility/2006">
-        <mc:Choice xmlns:a14="http://schemas.microsoft.com/office/drawing/2010/main" Requires="a14">
+      <mc:AlternateContent xmlns:mc="http://schemas.openxmlformats.org/markup-compatibility/2006" xmlns:a14="http://schemas.microsoft.com/office/drawing/2010/main">
+        <mc:Choice Requires="a14">
           <p:sp>
             <p:nvSpPr>
               <p:cNvPr id="9" name="Rounded Rectangle 8">
@@ -21126,7 +21156,7 @@
             </p:txBody>
           </p:sp>
         </mc:Choice>
-        <mc:Fallback>
+        <mc:Fallback xmlns="">
           <p:sp>
             <p:nvSpPr>
               <p:cNvPr id="9" name="Rounded Rectangle 8">
@@ -21311,8 +21341,8 @@
           </a:fontRef>
         </p:style>
       </p:cxnSp>
-      <mc:AlternateContent xmlns:mc="http://schemas.openxmlformats.org/markup-compatibility/2006">
-        <mc:Choice xmlns:a14="http://schemas.microsoft.com/office/drawing/2010/main" Requires="a14">
+      <mc:AlternateContent xmlns:mc="http://schemas.openxmlformats.org/markup-compatibility/2006" xmlns:a14="http://schemas.microsoft.com/office/drawing/2010/main">
+        <mc:Choice Requires="a14">
           <p:sp>
             <p:nvSpPr>
               <p:cNvPr id="13" name="TextBox 12">
@@ -21362,7 +21392,7 @@
             </p:txBody>
           </p:sp>
         </mc:Choice>
-        <mc:Fallback>
+        <mc:Fallback xmlns="">
           <p:sp>
             <p:nvSpPr>
               <p:cNvPr id="13" name="TextBox 12">
@@ -21407,8 +21437,8 @@
           </p:sp>
         </mc:Fallback>
       </mc:AlternateContent>
-      <mc:AlternateContent xmlns:mc="http://schemas.openxmlformats.org/markup-compatibility/2006">
-        <mc:Choice xmlns:a14="http://schemas.microsoft.com/office/drawing/2010/main" Requires="a14">
+      <mc:AlternateContent xmlns:mc="http://schemas.openxmlformats.org/markup-compatibility/2006" xmlns:a14="http://schemas.microsoft.com/office/drawing/2010/main">
+        <mc:Choice Requires="a14">
           <p:sp>
             <p:nvSpPr>
               <p:cNvPr id="14" name="TextBox 13">
@@ -21458,7 +21488,7 @@
             </p:txBody>
           </p:sp>
         </mc:Choice>
-        <mc:Fallback>
+        <mc:Fallback xmlns="">
           <p:sp>
             <p:nvSpPr>
               <p:cNvPr id="14" name="TextBox 13">
@@ -21503,8 +21533,8 @@
           </p:sp>
         </mc:Fallback>
       </mc:AlternateContent>
-      <mc:AlternateContent xmlns:mc="http://schemas.openxmlformats.org/markup-compatibility/2006">
-        <mc:Choice xmlns:a14="http://schemas.microsoft.com/office/drawing/2010/main" Requires="a14">
+      <mc:AlternateContent xmlns:mc="http://schemas.openxmlformats.org/markup-compatibility/2006" xmlns:a14="http://schemas.microsoft.com/office/drawing/2010/main">
+        <mc:Choice Requires="a14">
           <p:sp>
             <p:nvSpPr>
               <p:cNvPr id="15" name="TextBox 14">
@@ -21554,7 +21584,7 @@
             </p:txBody>
           </p:sp>
         </mc:Choice>
-        <mc:Fallback>
+        <mc:Fallback xmlns="">
           <p:sp>
             <p:nvSpPr>
               <p:cNvPr id="15" name="TextBox 14">
@@ -21599,8 +21629,8 @@
           </p:sp>
         </mc:Fallback>
       </mc:AlternateContent>
-      <mc:AlternateContent xmlns:mc="http://schemas.openxmlformats.org/markup-compatibility/2006">
-        <mc:Choice xmlns:a14="http://schemas.microsoft.com/office/drawing/2010/main" Requires="a14">
+      <mc:AlternateContent xmlns:mc="http://schemas.openxmlformats.org/markup-compatibility/2006" xmlns:a14="http://schemas.microsoft.com/office/drawing/2010/main">
+        <mc:Choice Requires="a14">
           <p:sp>
             <p:nvSpPr>
               <p:cNvPr id="16" name="TextBox 15">
@@ -21650,7 +21680,7 @@
             </p:txBody>
           </p:sp>
         </mc:Choice>
-        <mc:Fallback>
+        <mc:Fallback xmlns="">
           <p:sp>
             <p:nvSpPr>
               <p:cNvPr id="16" name="TextBox 15">
@@ -21695,8 +21725,8 @@
           </p:sp>
         </mc:Fallback>
       </mc:AlternateContent>
-      <mc:AlternateContent xmlns:mc="http://schemas.openxmlformats.org/markup-compatibility/2006">
-        <mc:Choice xmlns:a14="http://schemas.microsoft.com/office/drawing/2010/main" Requires="a14">
+      <mc:AlternateContent xmlns:mc="http://schemas.openxmlformats.org/markup-compatibility/2006" xmlns:a14="http://schemas.microsoft.com/office/drawing/2010/main">
+        <mc:Choice Requires="a14">
           <p:sp>
             <p:nvSpPr>
               <p:cNvPr id="17" name="Oval 16">
@@ -21802,7 +21832,7 @@
             </p:txBody>
           </p:sp>
         </mc:Choice>
-        <mc:Fallback>
+        <mc:Fallback xmlns="">
           <p:sp>
             <p:nvSpPr>
               <p:cNvPr id="17" name="Oval 16">
@@ -21852,8 +21882,8 @@
           </p:sp>
         </mc:Fallback>
       </mc:AlternateContent>
-      <mc:AlternateContent xmlns:mc="http://schemas.openxmlformats.org/markup-compatibility/2006">
-        <mc:Choice xmlns:a14="http://schemas.microsoft.com/office/drawing/2010/main" Requires="a14">
+      <mc:AlternateContent xmlns:mc="http://schemas.openxmlformats.org/markup-compatibility/2006" xmlns:a14="http://schemas.microsoft.com/office/drawing/2010/main">
+        <mc:Choice Requires="a14">
           <p:sp>
             <p:nvSpPr>
               <p:cNvPr id="18" name="Rounded Rectangle 17">
@@ -21930,7 +21960,7 @@
             </p:txBody>
           </p:sp>
         </mc:Choice>
-        <mc:Fallback>
+        <mc:Fallback xmlns="">
           <p:sp>
             <p:nvSpPr>
               <p:cNvPr id="18" name="Rounded Rectangle 17">
@@ -22115,8 +22145,8 @@
           </a:fontRef>
         </p:style>
       </p:cxnSp>
-      <mc:AlternateContent xmlns:mc="http://schemas.openxmlformats.org/markup-compatibility/2006">
-        <mc:Choice xmlns:a14="http://schemas.microsoft.com/office/drawing/2010/main" Requires="a14">
+      <mc:AlternateContent xmlns:mc="http://schemas.openxmlformats.org/markup-compatibility/2006" xmlns:a14="http://schemas.microsoft.com/office/drawing/2010/main">
+        <mc:Choice Requires="a14">
           <p:sp>
             <p:nvSpPr>
               <p:cNvPr id="22" name="Rounded Rectangle 21">
@@ -22193,7 +22223,7 @@
             </p:txBody>
           </p:sp>
         </mc:Choice>
-        <mc:Fallback>
+        <mc:Fallback xmlns="">
           <p:sp>
             <p:nvSpPr>
               <p:cNvPr id="22" name="Rounded Rectangle 21">
@@ -22378,8 +22408,8 @@
           </a:fontRef>
         </p:style>
       </p:cxnSp>
-      <mc:AlternateContent xmlns:mc="http://schemas.openxmlformats.org/markup-compatibility/2006">
-        <mc:Choice xmlns:a14="http://schemas.microsoft.com/office/drawing/2010/main" Requires="a14">
+      <mc:AlternateContent xmlns:mc="http://schemas.openxmlformats.org/markup-compatibility/2006" xmlns:a14="http://schemas.microsoft.com/office/drawing/2010/main">
+        <mc:Choice Requires="a14">
           <p:sp>
             <p:nvSpPr>
               <p:cNvPr id="26" name="TextBox 25">
@@ -22429,7 +22459,7 @@
             </p:txBody>
           </p:sp>
         </mc:Choice>
-        <mc:Fallback>
+        <mc:Fallback xmlns="">
           <p:sp>
             <p:nvSpPr>
               <p:cNvPr id="26" name="TextBox 25">
@@ -22474,8 +22504,8 @@
           </p:sp>
         </mc:Fallback>
       </mc:AlternateContent>
-      <mc:AlternateContent xmlns:mc="http://schemas.openxmlformats.org/markup-compatibility/2006">
-        <mc:Choice xmlns:a14="http://schemas.microsoft.com/office/drawing/2010/main" Requires="a14">
+      <mc:AlternateContent xmlns:mc="http://schemas.openxmlformats.org/markup-compatibility/2006" xmlns:a14="http://schemas.microsoft.com/office/drawing/2010/main">
+        <mc:Choice Requires="a14">
           <p:sp>
             <p:nvSpPr>
               <p:cNvPr id="27" name="TextBox 26">
@@ -22525,7 +22555,7 @@
             </p:txBody>
           </p:sp>
         </mc:Choice>
-        <mc:Fallback>
+        <mc:Fallback xmlns="">
           <p:sp>
             <p:nvSpPr>
               <p:cNvPr id="27" name="TextBox 26">
@@ -22570,8 +22600,8 @@
           </p:sp>
         </mc:Fallback>
       </mc:AlternateContent>
-      <mc:AlternateContent xmlns:mc="http://schemas.openxmlformats.org/markup-compatibility/2006">
-        <mc:Choice xmlns:a14="http://schemas.microsoft.com/office/drawing/2010/main" Requires="a14">
+      <mc:AlternateContent xmlns:mc="http://schemas.openxmlformats.org/markup-compatibility/2006" xmlns:a14="http://schemas.microsoft.com/office/drawing/2010/main">
+        <mc:Choice Requires="a14">
           <p:sp>
             <p:nvSpPr>
               <p:cNvPr id="28" name="TextBox 27">
@@ -22621,7 +22651,7 @@
             </p:txBody>
           </p:sp>
         </mc:Choice>
-        <mc:Fallback>
+        <mc:Fallback xmlns="">
           <p:sp>
             <p:nvSpPr>
               <p:cNvPr id="28" name="TextBox 27">
@@ -22666,8 +22696,8 @@
           </p:sp>
         </mc:Fallback>
       </mc:AlternateContent>
-      <mc:AlternateContent xmlns:mc="http://schemas.openxmlformats.org/markup-compatibility/2006">
-        <mc:Choice xmlns:a14="http://schemas.microsoft.com/office/drawing/2010/main" Requires="a14">
+      <mc:AlternateContent xmlns:mc="http://schemas.openxmlformats.org/markup-compatibility/2006" xmlns:a14="http://schemas.microsoft.com/office/drawing/2010/main">
+        <mc:Choice Requires="a14">
           <p:sp>
             <p:nvSpPr>
               <p:cNvPr id="29" name="TextBox 28">
@@ -22717,7 +22747,7 @@
             </p:txBody>
           </p:sp>
         </mc:Choice>
-        <mc:Fallback>
+        <mc:Fallback xmlns="">
           <p:sp>
             <p:nvSpPr>
               <p:cNvPr id="29" name="TextBox 28">
@@ -22824,8 +22854,8 @@
           </a:p>
         </p:txBody>
       </p:sp>
-      <mc:AlternateContent xmlns:mc="http://schemas.openxmlformats.org/markup-compatibility/2006">
-        <mc:Choice xmlns:a14="http://schemas.microsoft.com/office/drawing/2010/main" Requires="a14">
+      <mc:AlternateContent xmlns:mc="http://schemas.openxmlformats.org/markup-compatibility/2006" xmlns:a14="http://schemas.microsoft.com/office/drawing/2010/main">
+        <mc:Choice Requires="a14">
           <p:sp>
             <p:nvSpPr>
               <p:cNvPr id="4" name="Oval 3">
@@ -22934,7 +22964,7 @@
             </p:txBody>
           </p:sp>
         </mc:Choice>
-        <mc:Fallback>
+        <mc:Fallback xmlns="">
           <p:sp>
             <p:nvSpPr>
               <p:cNvPr id="4" name="Oval 3">
@@ -22984,8 +23014,8 @@
           </p:sp>
         </mc:Fallback>
       </mc:AlternateContent>
-      <mc:AlternateContent xmlns:mc="http://schemas.openxmlformats.org/markup-compatibility/2006">
-        <mc:Choice xmlns:a14="http://schemas.microsoft.com/office/drawing/2010/main" Requires="a14">
+      <mc:AlternateContent xmlns:mc="http://schemas.openxmlformats.org/markup-compatibility/2006" xmlns:a14="http://schemas.microsoft.com/office/drawing/2010/main">
+        <mc:Choice Requires="a14">
           <p:sp>
             <p:nvSpPr>
               <p:cNvPr id="5" name="Rounded Rectangle 4">
@@ -23087,7 +23117,7 @@
             </p:txBody>
           </p:sp>
         </mc:Choice>
-        <mc:Fallback>
+        <mc:Fallback xmlns="">
           <p:sp>
             <p:nvSpPr>
               <p:cNvPr id="5" name="Rounded Rectangle 4">
@@ -23272,8 +23302,8 @@
           </a:fontRef>
         </p:style>
       </p:cxnSp>
-      <mc:AlternateContent xmlns:mc="http://schemas.openxmlformats.org/markup-compatibility/2006">
-        <mc:Choice xmlns:a14="http://schemas.microsoft.com/office/drawing/2010/main" Requires="a14">
+      <mc:AlternateContent xmlns:mc="http://schemas.openxmlformats.org/markup-compatibility/2006" xmlns:a14="http://schemas.microsoft.com/office/drawing/2010/main">
+        <mc:Choice Requires="a14">
           <p:sp>
             <p:nvSpPr>
               <p:cNvPr id="9" name="Rounded Rectangle 8">
@@ -23350,7 +23380,7 @@
             </p:txBody>
           </p:sp>
         </mc:Choice>
-        <mc:Fallback>
+        <mc:Fallback xmlns="">
           <p:sp>
             <p:nvSpPr>
               <p:cNvPr id="9" name="Rounded Rectangle 8">
@@ -23535,8 +23565,8 @@
           </a:fontRef>
         </p:style>
       </p:cxnSp>
-      <mc:AlternateContent xmlns:mc="http://schemas.openxmlformats.org/markup-compatibility/2006">
-        <mc:Choice xmlns:a14="http://schemas.microsoft.com/office/drawing/2010/main" Requires="a14">
+      <mc:AlternateContent xmlns:mc="http://schemas.openxmlformats.org/markup-compatibility/2006" xmlns:a14="http://schemas.microsoft.com/office/drawing/2010/main">
+        <mc:Choice Requires="a14">
           <p:sp>
             <p:nvSpPr>
               <p:cNvPr id="13" name="TextBox 12">
@@ -23605,7 +23635,7 @@
             </p:txBody>
           </p:sp>
         </mc:Choice>
-        <mc:Fallback>
+        <mc:Fallback xmlns="">
           <p:sp>
             <p:nvSpPr>
               <p:cNvPr id="13" name="TextBox 12">
@@ -23650,8 +23680,8 @@
           </p:sp>
         </mc:Fallback>
       </mc:AlternateContent>
-      <mc:AlternateContent xmlns:mc="http://schemas.openxmlformats.org/markup-compatibility/2006">
-        <mc:Choice xmlns:a14="http://schemas.microsoft.com/office/drawing/2010/main" Requires="a14">
+      <mc:AlternateContent xmlns:mc="http://schemas.openxmlformats.org/markup-compatibility/2006" xmlns:a14="http://schemas.microsoft.com/office/drawing/2010/main">
+        <mc:Choice Requires="a14">
           <p:sp>
             <p:nvSpPr>
               <p:cNvPr id="14" name="TextBox 13">
@@ -23701,7 +23731,7 @@
             </p:txBody>
           </p:sp>
         </mc:Choice>
-        <mc:Fallback>
+        <mc:Fallback xmlns="">
           <p:sp>
             <p:nvSpPr>
               <p:cNvPr id="14" name="TextBox 13">
@@ -23746,8 +23776,8 @@
           </p:sp>
         </mc:Fallback>
       </mc:AlternateContent>
-      <mc:AlternateContent xmlns:mc="http://schemas.openxmlformats.org/markup-compatibility/2006">
-        <mc:Choice xmlns:a14="http://schemas.microsoft.com/office/drawing/2010/main" Requires="a14">
+      <mc:AlternateContent xmlns:mc="http://schemas.openxmlformats.org/markup-compatibility/2006" xmlns:a14="http://schemas.microsoft.com/office/drawing/2010/main">
+        <mc:Choice Requires="a14">
           <p:sp>
             <p:nvSpPr>
               <p:cNvPr id="15" name="TextBox 14">
@@ -23816,7 +23846,7 @@
             </p:txBody>
           </p:sp>
         </mc:Choice>
-        <mc:Fallback>
+        <mc:Fallback xmlns="">
           <p:sp>
             <p:nvSpPr>
               <p:cNvPr id="15" name="TextBox 14">
@@ -23861,8 +23891,8 @@
           </p:sp>
         </mc:Fallback>
       </mc:AlternateContent>
-      <mc:AlternateContent xmlns:mc="http://schemas.openxmlformats.org/markup-compatibility/2006">
-        <mc:Choice xmlns:a14="http://schemas.microsoft.com/office/drawing/2010/main" Requires="a14">
+      <mc:AlternateContent xmlns:mc="http://schemas.openxmlformats.org/markup-compatibility/2006" xmlns:a14="http://schemas.microsoft.com/office/drawing/2010/main">
+        <mc:Choice Requires="a14">
           <p:sp>
             <p:nvSpPr>
               <p:cNvPr id="16" name="TextBox 15">
@@ -23912,7 +23942,7 @@
             </p:txBody>
           </p:sp>
         </mc:Choice>
-        <mc:Fallback>
+        <mc:Fallback xmlns="">
           <p:sp>
             <p:nvSpPr>
               <p:cNvPr id="16" name="TextBox 15">
@@ -23957,8 +23987,8 @@
           </p:sp>
         </mc:Fallback>
       </mc:AlternateContent>
-      <mc:AlternateContent xmlns:mc="http://schemas.openxmlformats.org/markup-compatibility/2006">
-        <mc:Choice xmlns:a14="http://schemas.microsoft.com/office/drawing/2010/main" Requires="a14">
+      <mc:AlternateContent xmlns:mc="http://schemas.openxmlformats.org/markup-compatibility/2006" xmlns:a14="http://schemas.microsoft.com/office/drawing/2010/main">
+        <mc:Choice Requires="a14">
           <p:sp>
             <p:nvSpPr>
               <p:cNvPr id="17" name="Oval 16">
@@ -24067,7 +24097,7 @@
             </p:txBody>
           </p:sp>
         </mc:Choice>
-        <mc:Fallback>
+        <mc:Fallback xmlns="">
           <p:sp>
             <p:nvSpPr>
               <p:cNvPr id="17" name="Oval 16">
@@ -24162,8 +24192,8 @@
           </a:fontRef>
         </p:style>
       </p:cxnSp>
-      <mc:AlternateContent xmlns:mc="http://schemas.openxmlformats.org/markup-compatibility/2006">
-        <mc:Choice xmlns:a14="http://schemas.microsoft.com/office/drawing/2010/main" Requires="a14">
+      <mc:AlternateContent xmlns:mc="http://schemas.openxmlformats.org/markup-compatibility/2006" xmlns:a14="http://schemas.microsoft.com/office/drawing/2010/main">
+        <mc:Choice Requires="a14">
           <p:sp>
             <p:nvSpPr>
               <p:cNvPr id="19" name="Rounded Rectangle 18">
@@ -24269,7 +24299,7 @@
             </p:txBody>
           </p:sp>
         </mc:Choice>
-        <mc:Fallback>
+        <mc:Fallback xmlns="">
           <p:sp>
             <p:nvSpPr>
               <p:cNvPr id="19" name="Rounded Rectangle 18">
@@ -24454,8 +24484,8 @@
           </a:fontRef>
         </p:style>
       </p:cxnSp>
-      <mc:AlternateContent xmlns:mc="http://schemas.openxmlformats.org/markup-compatibility/2006">
-        <mc:Choice xmlns:a14="http://schemas.microsoft.com/office/drawing/2010/main" Requires="a14">
+      <mc:AlternateContent xmlns:mc="http://schemas.openxmlformats.org/markup-compatibility/2006" xmlns:a14="http://schemas.microsoft.com/office/drawing/2010/main">
+        <mc:Choice Requires="a14">
           <p:sp>
             <p:nvSpPr>
               <p:cNvPr id="23" name="TextBox 22">
@@ -24524,7 +24554,7 @@
             </p:txBody>
           </p:sp>
         </mc:Choice>
-        <mc:Fallback>
+        <mc:Fallback xmlns="">
           <p:sp>
             <p:nvSpPr>
               <p:cNvPr id="23" name="TextBox 22">
@@ -24569,8 +24599,8 @@
           </p:sp>
         </mc:Fallback>
       </mc:AlternateContent>
-      <mc:AlternateContent xmlns:mc="http://schemas.openxmlformats.org/markup-compatibility/2006">
-        <mc:Choice xmlns:a14="http://schemas.microsoft.com/office/drawing/2010/main" Requires="a14">
+      <mc:AlternateContent xmlns:mc="http://schemas.openxmlformats.org/markup-compatibility/2006" xmlns:a14="http://schemas.microsoft.com/office/drawing/2010/main">
+        <mc:Choice Requires="a14">
           <p:sp>
             <p:nvSpPr>
               <p:cNvPr id="24" name="TextBox 23">
@@ -24639,7 +24669,7 @@
             </p:txBody>
           </p:sp>
         </mc:Choice>
-        <mc:Fallback>
+        <mc:Fallback xmlns="">
           <p:sp>
             <p:nvSpPr>
               <p:cNvPr id="24" name="TextBox 23">
@@ -24795,8 +24825,8 @@
           </a:p>
         </p:txBody>
       </p:sp>
-      <mc:AlternateContent xmlns:mc="http://schemas.openxmlformats.org/markup-compatibility/2006">
-        <mc:Choice xmlns:a14="http://schemas.microsoft.com/office/drawing/2010/main" Requires="a14">
+      <mc:AlternateContent xmlns:mc="http://schemas.openxmlformats.org/markup-compatibility/2006" xmlns:a14="http://schemas.microsoft.com/office/drawing/2010/main">
+        <mc:Choice Requires="a14">
           <p:sp>
             <p:nvSpPr>
               <p:cNvPr id="4" name="Oval 3">
@@ -24905,7 +24935,7 @@
             </p:txBody>
           </p:sp>
         </mc:Choice>
-        <mc:Fallback>
+        <mc:Fallback xmlns="">
           <p:sp>
             <p:nvSpPr>
               <p:cNvPr id="4" name="Oval 3">
@@ -24955,8 +24985,8 @@
           </p:sp>
         </mc:Fallback>
       </mc:AlternateContent>
-      <mc:AlternateContent xmlns:mc="http://schemas.openxmlformats.org/markup-compatibility/2006">
-        <mc:Choice xmlns:a14="http://schemas.microsoft.com/office/drawing/2010/main" Requires="a14">
+      <mc:AlternateContent xmlns:mc="http://schemas.openxmlformats.org/markup-compatibility/2006" xmlns:a14="http://schemas.microsoft.com/office/drawing/2010/main">
+        <mc:Choice Requires="a14">
           <p:sp>
             <p:nvSpPr>
               <p:cNvPr id="5" name="Rounded Rectangle 4">
@@ -25058,7 +25088,7 @@
             </p:txBody>
           </p:sp>
         </mc:Choice>
-        <mc:Fallback>
+        <mc:Fallback xmlns="">
           <p:sp>
             <p:nvSpPr>
               <p:cNvPr id="5" name="Rounded Rectangle 4">
@@ -25243,8 +25273,8 @@
           </a:fontRef>
         </p:style>
       </p:cxnSp>
-      <mc:AlternateContent xmlns:mc="http://schemas.openxmlformats.org/markup-compatibility/2006">
-        <mc:Choice xmlns:a14="http://schemas.microsoft.com/office/drawing/2010/main" Requires="a14">
+      <mc:AlternateContent xmlns:mc="http://schemas.openxmlformats.org/markup-compatibility/2006" xmlns:a14="http://schemas.microsoft.com/office/drawing/2010/main">
+        <mc:Choice Requires="a14">
           <p:sp>
             <p:nvSpPr>
               <p:cNvPr id="9" name="Rounded Rectangle 8">
@@ -25321,7 +25351,7 @@
             </p:txBody>
           </p:sp>
         </mc:Choice>
-        <mc:Fallback>
+        <mc:Fallback xmlns="">
           <p:sp>
             <p:nvSpPr>
               <p:cNvPr id="9" name="Rounded Rectangle 8">
@@ -25506,8 +25536,8 @@
           </a:fontRef>
         </p:style>
       </p:cxnSp>
-      <mc:AlternateContent xmlns:mc="http://schemas.openxmlformats.org/markup-compatibility/2006">
-        <mc:Choice xmlns:a14="http://schemas.microsoft.com/office/drawing/2010/main" Requires="a14">
+      <mc:AlternateContent xmlns:mc="http://schemas.openxmlformats.org/markup-compatibility/2006" xmlns:a14="http://schemas.microsoft.com/office/drawing/2010/main">
+        <mc:Choice Requires="a14">
           <p:sp>
             <p:nvSpPr>
               <p:cNvPr id="13" name="TextBox 12">
@@ -25576,7 +25606,7 @@
             </p:txBody>
           </p:sp>
         </mc:Choice>
-        <mc:Fallback>
+        <mc:Fallback xmlns="">
           <p:sp>
             <p:nvSpPr>
               <p:cNvPr id="13" name="TextBox 12">
@@ -25621,8 +25651,8 @@
           </p:sp>
         </mc:Fallback>
       </mc:AlternateContent>
-      <mc:AlternateContent xmlns:mc="http://schemas.openxmlformats.org/markup-compatibility/2006">
-        <mc:Choice xmlns:a14="http://schemas.microsoft.com/office/drawing/2010/main" Requires="a14">
+      <mc:AlternateContent xmlns:mc="http://schemas.openxmlformats.org/markup-compatibility/2006" xmlns:a14="http://schemas.microsoft.com/office/drawing/2010/main">
+        <mc:Choice Requires="a14">
           <p:sp>
             <p:nvSpPr>
               <p:cNvPr id="14" name="TextBox 13">
@@ -25672,7 +25702,7 @@
             </p:txBody>
           </p:sp>
         </mc:Choice>
-        <mc:Fallback>
+        <mc:Fallback xmlns="">
           <p:sp>
             <p:nvSpPr>
               <p:cNvPr id="14" name="TextBox 13">
@@ -25717,8 +25747,8 @@
           </p:sp>
         </mc:Fallback>
       </mc:AlternateContent>
-      <mc:AlternateContent xmlns:mc="http://schemas.openxmlformats.org/markup-compatibility/2006">
-        <mc:Choice xmlns:a14="http://schemas.microsoft.com/office/drawing/2010/main" Requires="a14">
+      <mc:AlternateContent xmlns:mc="http://schemas.openxmlformats.org/markup-compatibility/2006" xmlns:a14="http://schemas.microsoft.com/office/drawing/2010/main">
+        <mc:Choice Requires="a14">
           <p:sp>
             <p:nvSpPr>
               <p:cNvPr id="15" name="TextBox 14">
@@ -25787,7 +25817,7 @@
             </p:txBody>
           </p:sp>
         </mc:Choice>
-        <mc:Fallback>
+        <mc:Fallback xmlns="">
           <p:sp>
             <p:nvSpPr>
               <p:cNvPr id="15" name="TextBox 14">
@@ -25832,8 +25862,8 @@
           </p:sp>
         </mc:Fallback>
       </mc:AlternateContent>
-      <mc:AlternateContent xmlns:mc="http://schemas.openxmlformats.org/markup-compatibility/2006">
-        <mc:Choice xmlns:a14="http://schemas.microsoft.com/office/drawing/2010/main" Requires="a14">
+      <mc:AlternateContent xmlns:mc="http://schemas.openxmlformats.org/markup-compatibility/2006" xmlns:a14="http://schemas.microsoft.com/office/drawing/2010/main">
+        <mc:Choice Requires="a14">
           <p:sp>
             <p:nvSpPr>
               <p:cNvPr id="16" name="TextBox 15">
@@ -25883,7 +25913,7 @@
             </p:txBody>
           </p:sp>
         </mc:Choice>
-        <mc:Fallback>
+        <mc:Fallback xmlns="">
           <p:sp>
             <p:nvSpPr>
               <p:cNvPr id="16" name="TextBox 15">
@@ -25928,8 +25958,8 @@
           </p:sp>
         </mc:Fallback>
       </mc:AlternateContent>
-      <mc:AlternateContent xmlns:mc="http://schemas.openxmlformats.org/markup-compatibility/2006">
-        <mc:Choice xmlns:a14="http://schemas.microsoft.com/office/drawing/2010/main" Requires="a14">
+      <mc:AlternateContent xmlns:mc="http://schemas.openxmlformats.org/markup-compatibility/2006" xmlns:a14="http://schemas.microsoft.com/office/drawing/2010/main">
+        <mc:Choice Requires="a14">
           <p:sp>
             <p:nvSpPr>
               <p:cNvPr id="41" name="Rounded Rectangle 40">
@@ -26031,7 +26061,7 @@
             </p:txBody>
           </p:sp>
         </mc:Choice>
-        <mc:Fallback>
+        <mc:Fallback xmlns="">
           <p:sp>
             <p:nvSpPr>
               <p:cNvPr id="41" name="Rounded Rectangle 40">
@@ -26170,8 +26200,8 @@
           </a:fontRef>
         </p:style>
       </p:cxnSp>
-      <mc:AlternateContent xmlns:mc="http://schemas.openxmlformats.org/markup-compatibility/2006">
-        <mc:Choice xmlns:a14="http://schemas.microsoft.com/office/drawing/2010/main" Requires="a14">
+      <mc:AlternateContent xmlns:mc="http://schemas.openxmlformats.org/markup-compatibility/2006" xmlns:a14="http://schemas.microsoft.com/office/drawing/2010/main">
+        <mc:Choice Requires="a14">
           <p:sp>
             <p:nvSpPr>
               <p:cNvPr id="44" name="TextBox 43">
@@ -26240,7 +26270,7 @@
             </p:txBody>
           </p:sp>
         </mc:Choice>
-        <mc:Fallback>
+        <mc:Fallback xmlns="">
           <p:sp>
             <p:nvSpPr>
               <p:cNvPr id="44" name="TextBox 43">
@@ -26285,8 +26315,8 @@
           </p:sp>
         </mc:Fallback>
       </mc:AlternateContent>
-      <mc:AlternateContent xmlns:mc="http://schemas.openxmlformats.org/markup-compatibility/2006">
-        <mc:Choice xmlns:a14="http://schemas.microsoft.com/office/drawing/2010/main" Requires="a14">
+      <mc:AlternateContent xmlns:mc="http://schemas.openxmlformats.org/markup-compatibility/2006" xmlns:a14="http://schemas.microsoft.com/office/drawing/2010/main">
+        <mc:Choice Requires="a14">
           <p:sp>
             <p:nvSpPr>
               <p:cNvPr id="45" name="TextBox 44">
@@ -26355,7 +26385,7 @@
             </p:txBody>
           </p:sp>
         </mc:Choice>
-        <mc:Fallback>
+        <mc:Fallback xmlns="">
           <p:sp>
             <p:nvSpPr>
               <p:cNvPr id="45" name="TextBox 44">
@@ -26400,8 +26430,8 @@
           </p:sp>
         </mc:Fallback>
       </mc:AlternateContent>
-      <mc:AlternateContent xmlns:mc="http://schemas.openxmlformats.org/markup-compatibility/2006">
-        <mc:Choice xmlns:a14="http://schemas.microsoft.com/office/drawing/2010/main" Requires="a14">
+      <mc:AlternateContent xmlns:mc="http://schemas.openxmlformats.org/markup-compatibility/2006" xmlns:a14="http://schemas.microsoft.com/office/drawing/2010/main">
+        <mc:Choice Requires="a14">
           <p:sp>
             <p:nvSpPr>
               <p:cNvPr id="46" name="Oval 45">
@@ -26510,7 +26540,7 @@
             </p:txBody>
           </p:sp>
         </mc:Choice>
-        <mc:Fallback>
+        <mc:Fallback xmlns="">
           <p:sp>
             <p:nvSpPr>
               <p:cNvPr id="46" name="Oval 45">
@@ -26696,8 +26726,8 @@
           </a:fontRef>
         </p:style>
       </p:cxnSp>
-      <mc:AlternateContent xmlns:mc="http://schemas.openxmlformats.org/markup-compatibility/2006">
-        <mc:Choice xmlns:a14="http://schemas.microsoft.com/office/drawing/2010/main" Requires="a14">
+      <mc:AlternateContent xmlns:mc="http://schemas.openxmlformats.org/markup-compatibility/2006" xmlns:a14="http://schemas.microsoft.com/office/drawing/2010/main">
+        <mc:Choice Requires="a14">
           <p:sp>
             <p:nvSpPr>
               <p:cNvPr id="56" name="Oval 55">
@@ -26803,7 +26833,7 @@
             </p:txBody>
           </p:sp>
         </mc:Choice>
-        <mc:Fallback>
+        <mc:Fallback xmlns="">
           <p:sp>
             <p:nvSpPr>
               <p:cNvPr id="56" name="Oval 55">
@@ -26853,8 +26883,8 @@
           </p:sp>
         </mc:Fallback>
       </mc:AlternateContent>
-      <mc:AlternateContent xmlns:mc="http://schemas.openxmlformats.org/markup-compatibility/2006">
-        <mc:Choice xmlns:a14="http://schemas.microsoft.com/office/drawing/2010/main" Requires="a14">
+      <mc:AlternateContent xmlns:mc="http://schemas.openxmlformats.org/markup-compatibility/2006" xmlns:a14="http://schemas.microsoft.com/office/drawing/2010/main">
+        <mc:Choice Requires="a14">
           <p:sp>
             <p:nvSpPr>
               <p:cNvPr id="60" name="Rounded Rectangle 59">
@@ -26956,7 +26986,7 @@
             </p:txBody>
           </p:sp>
         </mc:Choice>
-        <mc:Fallback>
+        <mc:Fallback xmlns="">
           <p:sp>
             <p:nvSpPr>
               <p:cNvPr id="60" name="Rounded Rectangle 59">
@@ -27095,8 +27125,8 @@
           </a:fontRef>
         </p:style>
       </p:cxnSp>
-      <mc:AlternateContent xmlns:mc="http://schemas.openxmlformats.org/markup-compatibility/2006">
-        <mc:Choice xmlns:a14="http://schemas.microsoft.com/office/drawing/2010/main" Requires="a14">
+      <mc:AlternateContent xmlns:mc="http://schemas.openxmlformats.org/markup-compatibility/2006" xmlns:a14="http://schemas.microsoft.com/office/drawing/2010/main">
+        <mc:Choice Requires="a14">
           <p:sp>
             <p:nvSpPr>
               <p:cNvPr id="63" name="TextBox 62">
@@ -27165,7 +27195,7 @@
             </p:txBody>
           </p:sp>
         </mc:Choice>
-        <mc:Fallback>
+        <mc:Fallback xmlns="">
           <p:sp>
             <p:nvSpPr>
               <p:cNvPr id="63" name="TextBox 62">
@@ -27210,8 +27240,8 @@
           </p:sp>
         </mc:Fallback>
       </mc:AlternateContent>
-      <mc:AlternateContent xmlns:mc="http://schemas.openxmlformats.org/markup-compatibility/2006">
-        <mc:Choice xmlns:a14="http://schemas.microsoft.com/office/drawing/2010/main" Requires="a14">
+      <mc:AlternateContent xmlns:mc="http://schemas.openxmlformats.org/markup-compatibility/2006" xmlns:a14="http://schemas.microsoft.com/office/drawing/2010/main">
+        <mc:Choice Requires="a14">
           <p:sp>
             <p:nvSpPr>
               <p:cNvPr id="64" name="TextBox 63">
@@ -27280,7 +27310,7 @@
             </p:txBody>
           </p:sp>
         </mc:Choice>
-        <mc:Fallback>
+        <mc:Fallback xmlns="">
           <p:sp>
             <p:nvSpPr>
               <p:cNvPr id="64" name="TextBox 63">
@@ -27464,8 +27494,8 @@
           </a:p>
         </p:txBody>
       </p:sp>
-      <mc:AlternateContent xmlns:mc="http://schemas.openxmlformats.org/markup-compatibility/2006">
-        <mc:Choice xmlns:a14="http://schemas.microsoft.com/office/drawing/2010/main" Requires="a14">
+      <mc:AlternateContent xmlns:mc="http://schemas.openxmlformats.org/markup-compatibility/2006" xmlns:a14="http://schemas.microsoft.com/office/drawing/2010/main">
+        <mc:Choice Requires="a14">
           <p:sp>
             <p:nvSpPr>
               <p:cNvPr id="4" name="Oval 3">
@@ -27574,7 +27604,7 @@
             </p:txBody>
           </p:sp>
         </mc:Choice>
-        <mc:Fallback>
+        <mc:Fallback xmlns="">
           <p:sp>
             <p:nvSpPr>
               <p:cNvPr id="4" name="Oval 3">
@@ -27624,8 +27654,8 @@
           </p:sp>
         </mc:Fallback>
       </mc:AlternateContent>
-      <mc:AlternateContent xmlns:mc="http://schemas.openxmlformats.org/markup-compatibility/2006">
-        <mc:Choice xmlns:a14="http://schemas.microsoft.com/office/drawing/2010/main" Requires="a14">
+      <mc:AlternateContent xmlns:mc="http://schemas.openxmlformats.org/markup-compatibility/2006" xmlns:a14="http://schemas.microsoft.com/office/drawing/2010/main">
+        <mc:Choice Requires="a14">
           <p:sp>
             <p:nvSpPr>
               <p:cNvPr id="5" name="Rounded Rectangle 4">
@@ -27727,7 +27757,7 @@
             </p:txBody>
           </p:sp>
         </mc:Choice>
-        <mc:Fallback>
+        <mc:Fallback xmlns="">
           <p:sp>
             <p:nvSpPr>
               <p:cNvPr id="5" name="Rounded Rectangle 4">
@@ -27912,8 +27942,8 @@
           </a:fontRef>
         </p:style>
       </p:cxnSp>
-      <mc:AlternateContent xmlns:mc="http://schemas.openxmlformats.org/markup-compatibility/2006">
-        <mc:Choice xmlns:a14="http://schemas.microsoft.com/office/drawing/2010/main" Requires="a14">
+      <mc:AlternateContent xmlns:mc="http://schemas.openxmlformats.org/markup-compatibility/2006" xmlns:a14="http://schemas.microsoft.com/office/drawing/2010/main">
+        <mc:Choice Requires="a14">
           <p:sp>
             <p:nvSpPr>
               <p:cNvPr id="9" name="Rounded Rectangle 8">
@@ -28015,7 +28045,7 @@
             </p:txBody>
           </p:sp>
         </mc:Choice>
-        <mc:Fallback>
+        <mc:Fallback xmlns="">
           <p:sp>
             <p:nvSpPr>
               <p:cNvPr id="9" name="Rounded Rectangle 8">
@@ -28200,8 +28230,8 @@
           </a:fontRef>
         </p:style>
       </p:cxnSp>
-      <mc:AlternateContent xmlns:mc="http://schemas.openxmlformats.org/markup-compatibility/2006">
-        <mc:Choice xmlns:a14="http://schemas.microsoft.com/office/drawing/2010/main" Requires="a14">
+      <mc:AlternateContent xmlns:mc="http://schemas.openxmlformats.org/markup-compatibility/2006" xmlns:a14="http://schemas.microsoft.com/office/drawing/2010/main">
+        <mc:Choice Requires="a14">
           <p:sp>
             <p:nvSpPr>
               <p:cNvPr id="13" name="TextBox 12">
@@ -28270,7 +28300,7 @@
             </p:txBody>
           </p:sp>
         </mc:Choice>
-        <mc:Fallback>
+        <mc:Fallback xmlns="">
           <p:sp>
             <p:nvSpPr>
               <p:cNvPr id="13" name="TextBox 12">
@@ -28315,8 +28345,8 @@
           </p:sp>
         </mc:Fallback>
       </mc:AlternateContent>
-      <mc:AlternateContent xmlns:mc="http://schemas.openxmlformats.org/markup-compatibility/2006">
-        <mc:Choice xmlns:a14="http://schemas.microsoft.com/office/drawing/2010/main" Requires="a14">
+      <mc:AlternateContent xmlns:mc="http://schemas.openxmlformats.org/markup-compatibility/2006" xmlns:a14="http://schemas.microsoft.com/office/drawing/2010/main">
+        <mc:Choice Requires="a14">
           <p:sp>
             <p:nvSpPr>
               <p:cNvPr id="14" name="TextBox 13">
@@ -28385,7 +28415,7 @@
             </p:txBody>
           </p:sp>
         </mc:Choice>
-        <mc:Fallback>
+        <mc:Fallback xmlns="">
           <p:sp>
             <p:nvSpPr>
               <p:cNvPr id="14" name="TextBox 13">
@@ -28430,8 +28460,8 @@
           </p:sp>
         </mc:Fallback>
       </mc:AlternateContent>
-      <mc:AlternateContent xmlns:mc="http://schemas.openxmlformats.org/markup-compatibility/2006">
-        <mc:Choice xmlns:a14="http://schemas.microsoft.com/office/drawing/2010/main" Requires="a14">
+      <mc:AlternateContent xmlns:mc="http://schemas.openxmlformats.org/markup-compatibility/2006" xmlns:a14="http://schemas.microsoft.com/office/drawing/2010/main">
+        <mc:Choice Requires="a14">
           <p:sp>
             <p:nvSpPr>
               <p:cNvPr id="15" name="TextBox 14">
@@ -28500,7 +28530,7 @@
             </p:txBody>
           </p:sp>
         </mc:Choice>
-        <mc:Fallback>
+        <mc:Fallback xmlns="">
           <p:sp>
             <p:nvSpPr>
               <p:cNvPr id="15" name="TextBox 14">
@@ -28545,8 +28575,8 @@
           </p:sp>
         </mc:Fallback>
       </mc:AlternateContent>
-      <mc:AlternateContent xmlns:mc="http://schemas.openxmlformats.org/markup-compatibility/2006">
-        <mc:Choice xmlns:a14="http://schemas.microsoft.com/office/drawing/2010/main" Requires="a14">
+      <mc:AlternateContent xmlns:mc="http://schemas.openxmlformats.org/markup-compatibility/2006" xmlns:a14="http://schemas.microsoft.com/office/drawing/2010/main">
+        <mc:Choice Requires="a14">
           <p:sp>
             <p:nvSpPr>
               <p:cNvPr id="16" name="TextBox 15">
@@ -28615,7 +28645,7 @@
             </p:txBody>
           </p:sp>
         </mc:Choice>
-        <mc:Fallback>
+        <mc:Fallback xmlns="">
           <p:sp>
             <p:nvSpPr>
               <p:cNvPr id="16" name="TextBox 15">
@@ -28660,8 +28690,8 @@
           </p:sp>
         </mc:Fallback>
       </mc:AlternateContent>
-      <mc:AlternateContent xmlns:mc="http://schemas.openxmlformats.org/markup-compatibility/2006">
-        <mc:Choice xmlns:a14="http://schemas.microsoft.com/office/drawing/2010/main" Requires="a14">
+      <mc:AlternateContent xmlns:mc="http://schemas.openxmlformats.org/markup-compatibility/2006" xmlns:a14="http://schemas.microsoft.com/office/drawing/2010/main">
+        <mc:Choice Requires="a14">
           <p:sp>
             <p:nvSpPr>
               <p:cNvPr id="17" name="Oval 16">
@@ -28767,7 +28797,7 @@
             </p:txBody>
           </p:sp>
         </mc:Choice>
-        <mc:Fallback>
+        <mc:Fallback xmlns="">
           <p:sp>
             <p:nvSpPr>
               <p:cNvPr id="17" name="Oval 16">
@@ -28863,8 +28893,8 @@
           </a:fontRef>
         </p:style>
       </p:cxnSp>
-      <mc:AlternateContent xmlns:mc="http://schemas.openxmlformats.org/markup-compatibility/2006">
-        <mc:Choice xmlns:a14="http://schemas.microsoft.com/office/drawing/2010/main" Requires="a14">
+      <mc:AlternateContent xmlns:mc="http://schemas.openxmlformats.org/markup-compatibility/2006" xmlns:a14="http://schemas.microsoft.com/office/drawing/2010/main">
+        <mc:Choice Requires="a14">
           <p:sp>
             <p:nvSpPr>
               <p:cNvPr id="19" name="Rounded Rectangle 18">
@@ -28970,7 +29000,7 @@
             </p:txBody>
           </p:sp>
         </mc:Choice>
-        <mc:Fallback>
+        <mc:Fallback xmlns="">
           <p:sp>
             <p:nvSpPr>
               <p:cNvPr id="19" name="Rounded Rectangle 18">
@@ -29155,8 +29185,8 @@
           </a:fontRef>
         </p:style>
       </p:cxnSp>
-      <mc:AlternateContent xmlns:mc="http://schemas.openxmlformats.org/markup-compatibility/2006">
-        <mc:Choice xmlns:a14="http://schemas.microsoft.com/office/drawing/2010/main" Requires="a14">
+      <mc:AlternateContent xmlns:mc="http://schemas.openxmlformats.org/markup-compatibility/2006" xmlns:a14="http://schemas.microsoft.com/office/drawing/2010/main">
+        <mc:Choice Requires="a14">
           <p:sp>
             <p:nvSpPr>
               <p:cNvPr id="23" name="TextBox 22">
@@ -29225,7 +29255,7 @@
             </p:txBody>
           </p:sp>
         </mc:Choice>
-        <mc:Fallback>
+        <mc:Fallback xmlns="">
           <p:sp>
             <p:nvSpPr>
               <p:cNvPr id="23" name="TextBox 22">
@@ -29270,8 +29300,8 @@
           </p:sp>
         </mc:Fallback>
       </mc:AlternateContent>
-      <mc:AlternateContent xmlns:mc="http://schemas.openxmlformats.org/markup-compatibility/2006">
-        <mc:Choice xmlns:a14="http://schemas.microsoft.com/office/drawing/2010/main" Requires="a14">
+      <mc:AlternateContent xmlns:mc="http://schemas.openxmlformats.org/markup-compatibility/2006" xmlns:a14="http://schemas.microsoft.com/office/drawing/2010/main">
+        <mc:Choice Requires="a14">
           <p:sp>
             <p:nvSpPr>
               <p:cNvPr id="24" name="TextBox 23">
@@ -29340,7 +29370,7 @@
             </p:txBody>
           </p:sp>
         </mc:Choice>
-        <mc:Fallback>
+        <mc:Fallback xmlns="">
           <p:sp>
             <p:nvSpPr>
               <p:cNvPr id="24" name="TextBox 23">
@@ -29385,8 +29415,8 @@
           </p:sp>
         </mc:Fallback>
       </mc:AlternateContent>
-      <mc:AlternateContent xmlns:mc="http://schemas.openxmlformats.org/markup-compatibility/2006">
-        <mc:Choice xmlns:a14="http://schemas.microsoft.com/office/drawing/2010/main" Requires="a14">
+      <mc:AlternateContent xmlns:mc="http://schemas.openxmlformats.org/markup-compatibility/2006" xmlns:a14="http://schemas.microsoft.com/office/drawing/2010/main">
+        <mc:Choice Requires="a14">
           <p:sp>
             <p:nvSpPr>
               <p:cNvPr id="26" name="Rounded Rectangle 25">
@@ -29497,7 +29527,7 @@
             </p:txBody>
           </p:sp>
         </mc:Choice>
-        <mc:Fallback>
+        <mc:Fallback xmlns="">
           <p:sp>
             <p:nvSpPr>
               <p:cNvPr id="26" name="Rounded Rectangle 25">
@@ -29636,8 +29666,8 @@
           </a:fontRef>
         </p:style>
       </p:cxnSp>
-      <mc:AlternateContent xmlns:mc="http://schemas.openxmlformats.org/markup-compatibility/2006">
-        <mc:Choice xmlns:a14="http://schemas.microsoft.com/office/drawing/2010/main" Requires="a14">
+      <mc:AlternateContent xmlns:mc="http://schemas.openxmlformats.org/markup-compatibility/2006" xmlns:a14="http://schemas.microsoft.com/office/drawing/2010/main">
+        <mc:Choice Requires="a14">
           <p:sp>
             <p:nvSpPr>
               <p:cNvPr id="29" name="TextBox 28">
@@ -29712,7 +29742,7 @@
             </p:txBody>
           </p:sp>
         </mc:Choice>
-        <mc:Fallback>
+        <mc:Fallback xmlns="">
           <p:sp>
             <p:nvSpPr>
               <p:cNvPr id="29" name="TextBox 28">
@@ -29757,8 +29787,8 @@
           </p:sp>
         </mc:Fallback>
       </mc:AlternateContent>
-      <mc:AlternateContent xmlns:mc="http://schemas.openxmlformats.org/markup-compatibility/2006">
-        <mc:Choice xmlns:a14="http://schemas.microsoft.com/office/drawing/2010/main" Requires="a14">
+      <mc:AlternateContent xmlns:mc="http://schemas.openxmlformats.org/markup-compatibility/2006" xmlns:a14="http://schemas.microsoft.com/office/drawing/2010/main">
+        <mc:Choice Requires="a14">
           <p:sp>
             <p:nvSpPr>
               <p:cNvPr id="30" name="TextBox 29">
@@ -29833,7 +29863,7 @@
             </p:txBody>
           </p:sp>
         </mc:Choice>
-        <mc:Fallback>
+        <mc:Fallback xmlns="">
           <p:sp>
             <p:nvSpPr>
               <p:cNvPr id="30" name="TextBox 29">
@@ -29924,8 +29954,8 @@
           </a:fontRef>
         </p:style>
       </p:cxnSp>
-      <mc:AlternateContent xmlns:mc="http://schemas.openxmlformats.org/markup-compatibility/2006">
-        <mc:Choice xmlns:a14="http://schemas.microsoft.com/office/drawing/2010/main" Requires="a14">
+      <mc:AlternateContent xmlns:mc="http://schemas.openxmlformats.org/markup-compatibility/2006" xmlns:a14="http://schemas.microsoft.com/office/drawing/2010/main">
+        <mc:Choice Requires="a14">
           <p:sp>
             <p:nvSpPr>
               <p:cNvPr id="35" name="Oval 34">
@@ -30034,7 +30064,7 @@
             </p:txBody>
           </p:sp>
         </mc:Choice>
-        <mc:Fallback>
+        <mc:Fallback xmlns="">
           <p:sp>
             <p:nvSpPr>
               <p:cNvPr id="35" name="Oval 34">
@@ -30264,8 +30294,8 @@
           </a:p>
         </p:txBody>
       </p:sp>
-      <mc:AlternateContent xmlns:mc="http://schemas.openxmlformats.org/markup-compatibility/2006">
-        <mc:Choice xmlns:a14="http://schemas.microsoft.com/office/drawing/2010/main" Requires="a14">
+      <mc:AlternateContent xmlns:mc="http://schemas.openxmlformats.org/markup-compatibility/2006" xmlns:a14="http://schemas.microsoft.com/office/drawing/2010/main">
+        <mc:Choice Requires="a14">
           <p:sp>
             <p:nvSpPr>
               <p:cNvPr id="4" name="Oval 3">
@@ -30374,7 +30404,7 @@
             </p:txBody>
           </p:sp>
         </mc:Choice>
-        <mc:Fallback>
+        <mc:Fallback xmlns="">
           <p:sp>
             <p:nvSpPr>
               <p:cNvPr id="4" name="Oval 3">
@@ -30424,8 +30454,8 @@
           </p:sp>
         </mc:Fallback>
       </mc:AlternateContent>
-      <mc:AlternateContent xmlns:mc="http://schemas.openxmlformats.org/markup-compatibility/2006">
-        <mc:Choice xmlns:a14="http://schemas.microsoft.com/office/drawing/2010/main" Requires="a14">
+      <mc:AlternateContent xmlns:mc="http://schemas.openxmlformats.org/markup-compatibility/2006" xmlns:a14="http://schemas.microsoft.com/office/drawing/2010/main">
+        <mc:Choice Requires="a14">
           <p:sp>
             <p:nvSpPr>
               <p:cNvPr id="5" name="Rounded Rectangle 4">
@@ -30527,7 +30557,7 @@
             </p:txBody>
           </p:sp>
         </mc:Choice>
-        <mc:Fallback>
+        <mc:Fallback xmlns="">
           <p:sp>
             <p:nvSpPr>
               <p:cNvPr id="5" name="Rounded Rectangle 4">
@@ -30712,8 +30742,8 @@
           </a:fontRef>
         </p:style>
       </p:cxnSp>
-      <mc:AlternateContent xmlns:mc="http://schemas.openxmlformats.org/markup-compatibility/2006">
-        <mc:Choice xmlns:a14="http://schemas.microsoft.com/office/drawing/2010/main" Requires="a14">
+      <mc:AlternateContent xmlns:mc="http://schemas.openxmlformats.org/markup-compatibility/2006" xmlns:a14="http://schemas.microsoft.com/office/drawing/2010/main">
+        <mc:Choice Requires="a14">
           <p:sp>
             <p:nvSpPr>
               <p:cNvPr id="9" name="Rounded Rectangle 8">
@@ -30815,7 +30845,7 @@
             </p:txBody>
           </p:sp>
         </mc:Choice>
-        <mc:Fallback>
+        <mc:Fallback xmlns="">
           <p:sp>
             <p:nvSpPr>
               <p:cNvPr id="9" name="Rounded Rectangle 8">
@@ -31000,8 +31030,8 @@
           </a:fontRef>
         </p:style>
       </p:cxnSp>
-      <mc:AlternateContent xmlns:mc="http://schemas.openxmlformats.org/markup-compatibility/2006">
-        <mc:Choice xmlns:a14="http://schemas.microsoft.com/office/drawing/2010/main" Requires="a14">
+      <mc:AlternateContent xmlns:mc="http://schemas.openxmlformats.org/markup-compatibility/2006" xmlns:a14="http://schemas.microsoft.com/office/drawing/2010/main">
+        <mc:Choice Requires="a14">
           <p:sp>
             <p:nvSpPr>
               <p:cNvPr id="13" name="TextBox 12">
@@ -31070,7 +31100,7 @@
             </p:txBody>
           </p:sp>
         </mc:Choice>
-        <mc:Fallback>
+        <mc:Fallback xmlns="">
           <p:sp>
             <p:nvSpPr>
               <p:cNvPr id="13" name="TextBox 12">
@@ -31115,8 +31145,8 @@
           </p:sp>
         </mc:Fallback>
       </mc:AlternateContent>
-      <mc:AlternateContent xmlns:mc="http://schemas.openxmlformats.org/markup-compatibility/2006">
-        <mc:Choice xmlns:a14="http://schemas.microsoft.com/office/drawing/2010/main" Requires="a14">
+      <mc:AlternateContent xmlns:mc="http://schemas.openxmlformats.org/markup-compatibility/2006" xmlns:a14="http://schemas.microsoft.com/office/drawing/2010/main">
+        <mc:Choice Requires="a14">
           <p:sp>
             <p:nvSpPr>
               <p:cNvPr id="14" name="TextBox 13">
@@ -31185,7 +31215,7 @@
             </p:txBody>
           </p:sp>
         </mc:Choice>
-        <mc:Fallback>
+        <mc:Fallback xmlns="">
           <p:sp>
             <p:nvSpPr>
               <p:cNvPr id="14" name="TextBox 13">
@@ -31230,8 +31260,8 @@
           </p:sp>
         </mc:Fallback>
       </mc:AlternateContent>
-      <mc:AlternateContent xmlns:mc="http://schemas.openxmlformats.org/markup-compatibility/2006">
-        <mc:Choice xmlns:a14="http://schemas.microsoft.com/office/drawing/2010/main" Requires="a14">
+      <mc:AlternateContent xmlns:mc="http://schemas.openxmlformats.org/markup-compatibility/2006" xmlns:a14="http://schemas.microsoft.com/office/drawing/2010/main">
+        <mc:Choice Requires="a14">
           <p:sp>
             <p:nvSpPr>
               <p:cNvPr id="15" name="TextBox 14">
@@ -31300,7 +31330,7 @@
             </p:txBody>
           </p:sp>
         </mc:Choice>
-        <mc:Fallback>
+        <mc:Fallback xmlns="">
           <p:sp>
             <p:nvSpPr>
               <p:cNvPr id="15" name="TextBox 14">
@@ -31345,8 +31375,8 @@
           </p:sp>
         </mc:Fallback>
       </mc:AlternateContent>
-      <mc:AlternateContent xmlns:mc="http://schemas.openxmlformats.org/markup-compatibility/2006">
-        <mc:Choice xmlns:a14="http://schemas.microsoft.com/office/drawing/2010/main" Requires="a14">
+      <mc:AlternateContent xmlns:mc="http://schemas.openxmlformats.org/markup-compatibility/2006" xmlns:a14="http://schemas.microsoft.com/office/drawing/2010/main">
+        <mc:Choice Requires="a14">
           <p:sp>
             <p:nvSpPr>
               <p:cNvPr id="16" name="TextBox 15">
@@ -31415,7 +31445,7 @@
             </p:txBody>
           </p:sp>
         </mc:Choice>
-        <mc:Fallback>
+        <mc:Fallback xmlns="">
           <p:sp>
             <p:nvSpPr>
               <p:cNvPr id="16" name="TextBox 15">
@@ -31460,8 +31490,8 @@
           </p:sp>
         </mc:Fallback>
       </mc:AlternateContent>
-      <mc:AlternateContent xmlns:mc="http://schemas.openxmlformats.org/markup-compatibility/2006">
-        <mc:Choice xmlns:a14="http://schemas.microsoft.com/office/drawing/2010/main" Requires="a14">
+      <mc:AlternateContent xmlns:mc="http://schemas.openxmlformats.org/markup-compatibility/2006" xmlns:a14="http://schemas.microsoft.com/office/drawing/2010/main">
+        <mc:Choice Requires="a14">
           <p:sp>
             <p:nvSpPr>
               <p:cNvPr id="17" name="Oval 16">
@@ -31567,7 +31597,7 @@
             </p:txBody>
           </p:sp>
         </mc:Choice>
-        <mc:Fallback>
+        <mc:Fallback xmlns="">
           <p:sp>
             <p:nvSpPr>
               <p:cNvPr id="17" name="Oval 16">
@@ -31663,8 +31693,8 @@
           </a:fontRef>
         </p:style>
       </p:cxnSp>
-      <mc:AlternateContent xmlns:mc="http://schemas.openxmlformats.org/markup-compatibility/2006">
-        <mc:Choice xmlns:a14="http://schemas.microsoft.com/office/drawing/2010/main" Requires="a14">
+      <mc:AlternateContent xmlns:mc="http://schemas.openxmlformats.org/markup-compatibility/2006" xmlns:a14="http://schemas.microsoft.com/office/drawing/2010/main">
+        <mc:Choice Requires="a14">
           <p:sp>
             <p:nvSpPr>
               <p:cNvPr id="19" name="Rounded Rectangle 18">
@@ -31770,7 +31800,7 @@
             </p:txBody>
           </p:sp>
         </mc:Choice>
-        <mc:Fallback>
+        <mc:Fallback xmlns="">
           <p:sp>
             <p:nvSpPr>
               <p:cNvPr id="19" name="Rounded Rectangle 18">
@@ -31955,8 +31985,8 @@
           </a:fontRef>
         </p:style>
       </p:cxnSp>
-      <mc:AlternateContent xmlns:mc="http://schemas.openxmlformats.org/markup-compatibility/2006">
-        <mc:Choice xmlns:a14="http://schemas.microsoft.com/office/drawing/2010/main" Requires="a14">
+      <mc:AlternateContent xmlns:mc="http://schemas.openxmlformats.org/markup-compatibility/2006" xmlns:a14="http://schemas.microsoft.com/office/drawing/2010/main">
+        <mc:Choice Requires="a14">
           <p:sp>
             <p:nvSpPr>
               <p:cNvPr id="23" name="TextBox 22">
@@ -32025,7 +32055,7 @@
             </p:txBody>
           </p:sp>
         </mc:Choice>
-        <mc:Fallback>
+        <mc:Fallback xmlns="">
           <p:sp>
             <p:nvSpPr>
               <p:cNvPr id="23" name="TextBox 22">
@@ -32070,8 +32100,8 @@
           </p:sp>
         </mc:Fallback>
       </mc:AlternateContent>
-      <mc:AlternateContent xmlns:mc="http://schemas.openxmlformats.org/markup-compatibility/2006">
-        <mc:Choice xmlns:a14="http://schemas.microsoft.com/office/drawing/2010/main" Requires="a14">
+      <mc:AlternateContent xmlns:mc="http://schemas.openxmlformats.org/markup-compatibility/2006" xmlns:a14="http://schemas.microsoft.com/office/drawing/2010/main">
+        <mc:Choice Requires="a14">
           <p:sp>
             <p:nvSpPr>
               <p:cNvPr id="24" name="TextBox 23">
@@ -32140,7 +32170,7 @@
             </p:txBody>
           </p:sp>
         </mc:Choice>
-        <mc:Fallback>
+        <mc:Fallback xmlns="">
           <p:sp>
             <p:nvSpPr>
               <p:cNvPr id="24" name="TextBox 23">
@@ -32185,8 +32215,8 @@
           </p:sp>
         </mc:Fallback>
       </mc:AlternateContent>
-      <mc:AlternateContent xmlns:mc="http://schemas.openxmlformats.org/markup-compatibility/2006">
-        <mc:Choice xmlns:a14="http://schemas.microsoft.com/office/drawing/2010/main" Requires="a14">
+      <mc:AlternateContent xmlns:mc="http://schemas.openxmlformats.org/markup-compatibility/2006" xmlns:a14="http://schemas.microsoft.com/office/drawing/2010/main">
+        <mc:Choice Requires="a14">
           <p:sp>
             <p:nvSpPr>
               <p:cNvPr id="25" name="Rounded Rectangle 24">
@@ -32297,7 +32327,7 @@
             </p:txBody>
           </p:sp>
         </mc:Choice>
-        <mc:Fallback>
+        <mc:Fallback xmlns="">
           <p:sp>
             <p:nvSpPr>
               <p:cNvPr id="25" name="Rounded Rectangle 24">
@@ -32436,8 +32466,8 @@
           </a:fontRef>
         </p:style>
       </p:cxnSp>
-      <mc:AlternateContent xmlns:mc="http://schemas.openxmlformats.org/markup-compatibility/2006">
-        <mc:Choice xmlns:a14="http://schemas.microsoft.com/office/drawing/2010/main" Requires="a14">
+      <mc:AlternateContent xmlns:mc="http://schemas.openxmlformats.org/markup-compatibility/2006" xmlns:a14="http://schemas.microsoft.com/office/drawing/2010/main">
+        <mc:Choice Requires="a14">
           <p:sp>
             <p:nvSpPr>
               <p:cNvPr id="28" name="TextBox 27">
@@ -32512,7 +32542,7 @@
             </p:txBody>
           </p:sp>
         </mc:Choice>
-        <mc:Fallback>
+        <mc:Fallback xmlns="">
           <p:sp>
             <p:nvSpPr>
               <p:cNvPr id="28" name="TextBox 27">
@@ -32557,8 +32587,8 @@
           </p:sp>
         </mc:Fallback>
       </mc:AlternateContent>
-      <mc:AlternateContent xmlns:mc="http://schemas.openxmlformats.org/markup-compatibility/2006">
-        <mc:Choice xmlns:a14="http://schemas.microsoft.com/office/drawing/2010/main" Requires="a14">
+      <mc:AlternateContent xmlns:mc="http://schemas.openxmlformats.org/markup-compatibility/2006" xmlns:a14="http://schemas.microsoft.com/office/drawing/2010/main">
+        <mc:Choice Requires="a14">
           <p:sp>
             <p:nvSpPr>
               <p:cNvPr id="29" name="TextBox 28">
@@ -32633,7 +32663,7 @@
             </p:txBody>
           </p:sp>
         </mc:Choice>
-        <mc:Fallback>
+        <mc:Fallback xmlns="">
           <p:sp>
             <p:nvSpPr>
               <p:cNvPr id="29" name="TextBox 28">
@@ -32724,8 +32754,8 @@
           </a:fontRef>
         </p:style>
       </p:cxnSp>
-      <mc:AlternateContent xmlns:mc="http://schemas.openxmlformats.org/markup-compatibility/2006">
-        <mc:Choice xmlns:a14="http://schemas.microsoft.com/office/drawing/2010/main" Requires="a14">
+      <mc:AlternateContent xmlns:mc="http://schemas.openxmlformats.org/markup-compatibility/2006" xmlns:a14="http://schemas.microsoft.com/office/drawing/2010/main">
+        <mc:Choice Requires="a14">
           <p:sp>
             <p:nvSpPr>
               <p:cNvPr id="31" name="Oval 30">
@@ -32834,7 +32864,7 @@
             </p:txBody>
           </p:sp>
         </mc:Choice>
-        <mc:Fallback>
+        <mc:Fallback xmlns="">
           <p:sp>
             <p:nvSpPr>
               <p:cNvPr id="31" name="Oval 30">
@@ -33055,8 +33085,8 @@
           </a:fontRef>
         </p:style>
       </p:cxnSp>
-      <mc:AlternateContent xmlns:mc="http://schemas.openxmlformats.org/markup-compatibility/2006">
-        <mc:Choice xmlns:a14="http://schemas.microsoft.com/office/drawing/2010/main" Requires="a14">
+      <mc:AlternateContent xmlns:mc="http://schemas.openxmlformats.org/markup-compatibility/2006" xmlns:a14="http://schemas.microsoft.com/office/drawing/2010/main">
+        <mc:Choice Requires="a14">
           <p:sp>
             <p:nvSpPr>
               <p:cNvPr id="36" name="Oval 35">
@@ -33165,7 +33195,7 @@
             </p:txBody>
           </p:sp>
         </mc:Choice>
-        <mc:Fallback>
+        <mc:Fallback xmlns="">
           <p:sp>
             <p:nvSpPr>
               <p:cNvPr id="36" name="Oval 35">
@@ -33215,8 +33245,8 @@
           </p:sp>
         </mc:Fallback>
       </mc:AlternateContent>
-      <mc:AlternateContent xmlns:mc="http://schemas.openxmlformats.org/markup-compatibility/2006">
-        <mc:Choice xmlns:a14="http://schemas.microsoft.com/office/drawing/2010/main" Requires="a14">
+      <mc:AlternateContent xmlns:mc="http://schemas.openxmlformats.org/markup-compatibility/2006" xmlns:a14="http://schemas.microsoft.com/office/drawing/2010/main">
+        <mc:Choice Requires="a14">
           <p:sp>
             <p:nvSpPr>
               <p:cNvPr id="37" name="Rounded Rectangle 36">
@@ -33318,7 +33348,7 @@
             </p:txBody>
           </p:sp>
         </mc:Choice>
-        <mc:Fallback>
+        <mc:Fallback xmlns="">
           <p:sp>
             <p:nvSpPr>
               <p:cNvPr id="37" name="Rounded Rectangle 36">
@@ -33503,8 +33533,8 @@
           </a:fontRef>
         </p:style>
       </p:cxnSp>
-      <mc:AlternateContent xmlns:mc="http://schemas.openxmlformats.org/markup-compatibility/2006">
-        <mc:Choice xmlns:a14="http://schemas.microsoft.com/office/drawing/2010/main" Requires="a14">
+      <mc:AlternateContent xmlns:mc="http://schemas.openxmlformats.org/markup-compatibility/2006" xmlns:a14="http://schemas.microsoft.com/office/drawing/2010/main">
+        <mc:Choice Requires="a14">
           <p:sp>
             <p:nvSpPr>
               <p:cNvPr id="41" name="Rounded Rectangle 40">
@@ -33581,7 +33611,7 @@
             </p:txBody>
           </p:sp>
         </mc:Choice>
-        <mc:Fallback>
+        <mc:Fallback xmlns="">
           <p:sp>
             <p:nvSpPr>
               <p:cNvPr id="41" name="Rounded Rectangle 40">
@@ -33766,8 +33796,8 @@
           </a:fontRef>
         </p:style>
       </p:cxnSp>
-      <mc:AlternateContent xmlns:mc="http://schemas.openxmlformats.org/markup-compatibility/2006">
-        <mc:Choice xmlns:a14="http://schemas.microsoft.com/office/drawing/2010/main" Requires="a14">
+      <mc:AlternateContent xmlns:mc="http://schemas.openxmlformats.org/markup-compatibility/2006" xmlns:a14="http://schemas.microsoft.com/office/drawing/2010/main">
+        <mc:Choice Requires="a14">
           <p:sp>
             <p:nvSpPr>
               <p:cNvPr id="45" name="TextBox 44">
@@ -33836,7 +33866,7 @@
             </p:txBody>
           </p:sp>
         </mc:Choice>
-        <mc:Fallback>
+        <mc:Fallback xmlns="">
           <p:sp>
             <p:nvSpPr>
               <p:cNvPr id="45" name="TextBox 44">
@@ -33881,8 +33911,8 @@
           </p:sp>
         </mc:Fallback>
       </mc:AlternateContent>
-      <mc:AlternateContent xmlns:mc="http://schemas.openxmlformats.org/markup-compatibility/2006">
-        <mc:Choice xmlns:a14="http://schemas.microsoft.com/office/drawing/2010/main" Requires="a14">
+      <mc:AlternateContent xmlns:mc="http://schemas.openxmlformats.org/markup-compatibility/2006" xmlns:a14="http://schemas.microsoft.com/office/drawing/2010/main">
+        <mc:Choice Requires="a14">
           <p:sp>
             <p:nvSpPr>
               <p:cNvPr id="46" name="TextBox 45">
@@ -33932,7 +33962,7 @@
             </p:txBody>
           </p:sp>
         </mc:Choice>
-        <mc:Fallback>
+        <mc:Fallback xmlns="">
           <p:sp>
             <p:nvSpPr>
               <p:cNvPr id="46" name="TextBox 45">
@@ -33977,8 +34007,8 @@
           </p:sp>
         </mc:Fallback>
       </mc:AlternateContent>
-      <mc:AlternateContent xmlns:mc="http://schemas.openxmlformats.org/markup-compatibility/2006">
-        <mc:Choice xmlns:a14="http://schemas.microsoft.com/office/drawing/2010/main" Requires="a14">
+      <mc:AlternateContent xmlns:mc="http://schemas.openxmlformats.org/markup-compatibility/2006" xmlns:a14="http://schemas.microsoft.com/office/drawing/2010/main">
+        <mc:Choice Requires="a14">
           <p:sp>
             <p:nvSpPr>
               <p:cNvPr id="47" name="TextBox 46">
@@ -34047,7 +34077,7 @@
             </p:txBody>
           </p:sp>
         </mc:Choice>
-        <mc:Fallback>
+        <mc:Fallback xmlns="">
           <p:sp>
             <p:nvSpPr>
               <p:cNvPr id="47" name="TextBox 46">
@@ -34092,8 +34122,8 @@
           </p:sp>
         </mc:Fallback>
       </mc:AlternateContent>
-      <mc:AlternateContent xmlns:mc="http://schemas.openxmlformats.org/markup-compatibility/2006">
-        <mc:Choice xmlns:a14="http://schemas.microsoft.com/office/drawing/2010/main" Requires="a14">
+      <mc:AlternateContent xmlns:mc="http://schemas.openxmlformats.org/markup-compatibility/2006" xmlns:a14="http://schemas.microsoft.com/office/drawing/2010/main">
+        <mc:Choice Requires="a14">
           <p:sp>
             <p:nvSpPr>
               <p:cNvPr id="48" name="TextBox 47">
@@ -34143,7 +34173,7 @@
             </p:txBody>
           </p:sp>
         </mc:Choice>
-        <mc:Fallback>
+        <mc:Fallback xmlns="">
           <p:sp>
             <p:nvSpPr>
               <p:cNvPr id="48" name="TextBox 47">
@@ -34188,8 +34218,8 @@
           </p:sp>
         </mc:Fallback>
       </mc:AlternateContent>
-      <mc:AlternateContent xmlns:mc="http://schemas.openxmlformats.org/markup-compatibility/2006">
-        <mc:Choice xmlns:a14="http://schemas.microsoft.com/office/drawing/2010/main" Requires="a14">
+      <mc:AlternateContent xmlns:mc="http://schemas.openxmlformats.org/markup-compatibility/2006" xmlns:a14="http://schemas.microsoft.com/office/drawing/2010/main">
+        <mc:Choice Requires="a14">
           <p:sp>
             <p:nvSpPr>
               <p:cNvPr id="49" name="Rounded Rectangle 48">
@@ -34291,7 +34321,7 @@
             </p:txBody>
           </p:sp>
         </mc:Choice>
-        <mc:Fallback>
+        <mc:Fallback xmlns="">
           <p:sp>
             <p:nvSpPr>
               <p:cNvPr id="49" name="Rounded Rectangle 48">
@@ -34430,8 +34460,8 @@
           </a:fontRef>
         </p:style>
       </p:cxnSp>
-      <mc:AlternateContent xmlns:mc="http://schemas.openxmlformats.org/markup-compatibility/2006">
-        <mc:Choice xmlns:a14="http://schemas.microsoft.com/office/drawing/2010/main" Requires="a14">
+      <mc:AlternateContent xmlns:mc="http://schemas.openxmlformats.org/markup-compatibility/2006" xmlns:a14="http://schemas.microsoft.com/office/drawing/2010/main">
+        <mc:Choice Requires="a14">
           <p:sp>
             <p:nvSpPr>
               <p:cNvPr id="52" name="TextBox 51">
@@ -34500,7 +34530,7 @@
             </p:txBody>
           </p:sp>
         </mc:Choice>
-        <mc:Fallback>
+        <mc:Fallback xmlns="">
           <p:sp>
             <p:nvSpPr>
               <p:cNvPr id="52" name="TextBox 51">
@@ -34545,8 +34575,8 @@
           </p:sp>
         </mc:Fallback>
       </mc:AlternateContent>
-      <mc:AlternateContent xmlns:mc="http://schemas.openxmlformats.org/markup-compatibility/2006">
-        <mc:Choice xmlns:a14="http://schemas.microsoft.com/office/drawing/2010/main" Requires="a14">
+      <mc:AlternateContent xmlns:mc="http://schemas.openxmlformats.org/markup-compatibility/2006" xmlns:a14="http://schemas.microsoft.com/office/drawing/2010/main">
+        <mc:Choice Requires="a14">
           <p:sp>
             <p:nvSpPr>
               <p:cNvPr id="53" name="TextBox 52">
@@ -34615,7 +34645,7 @@
             </p:txBody>
           </p:sp>
         </mc:Choice>
-        <mc:Fallback>
+        <mc:Fallback xmlns="">
           <p:sp>
             <p:nvSpPr>
               <p:cNvPr id="53" name="TextBox 52">
@@ -34660,8 +34690,8 @@
           </p:sp>
         </mc:Fallback>
       </mc:AlternateContent>
-      <mc:AlternateContent xmlns:mc="http://schemas.openxmlformats.org/markup-compatibility/2006">
-        <mc:Choice xmlns:a14="http://schemas.microsoft.com/office/drawing/2010/main" Requires="a14">
+      <mc:AlternateContent xmlns:mc="http://schemas.openxmlformats.org/markup-compatibility/2006" xmlns:a14="http://schemas.microsoft.com/office/drawing/2010/main">
+        <mc:Choice Requires="a14">
           <p:sp>
             <p:nvSpPr>
               <p:cNvPr id="54" name="Oval 53">
@@ -34770,7 +34800,7 @@
             </p:txBody>
           </p:sp>
         </mc:Choice>
-        <mc:Fallback>
+        <mc:Fallback xmlns="">
           <p:sp>
             <p:nvSpPr>
               <p:cNvPr id="54" name="Oval 53">
@@ -34956,8 +34986,8 @@
           </a:fontRef>
         </p:style>
       </p:cxnSp>
-      <mc:AlternateContent xmlns:mc="http://schemas.openxmlformats.org/markup-compatibility/2006">
-        <mc:Choice xmlns:a14="http://schemas.microsoft.com/office/drawing/2010/main" Requires="a14">
+      <mc:AlternateContent xmlns:mc="http://schemas.openxmlformats.org/markup-compatibility/2006" xmlns:a14="http://schemas.microsoft.com/office/drawing/2010/main">
+        <mc:Choice Requires="a14">
           <p:sp>
             <p:nvSpPr>
               <p:cNvPr id="58" name="Oval 57">
@@ -35063,7 +35093,7 @@
             </p:txBody>
           </p:sp>
         </mc:Choice>
-        <mc:Fallback>
+        <mc:Fallback xmlns="">
           <p:sp>
             <p:nvSpPr>
               <p:cNvPr id="58" name="Oval 57">
@@ -35113,8 +35143,8 @@
           </p:sp>
         </mc:Fallback>
       </mc:AlternateContent>
-      <mc:AlternateContent xmlns:mc="http://schemas.openxmlformats.org/markup-compatibility/2006">
-        <mc:Choice xmlns:a14="http://schemas.microsoft.com/office/drawing/2010/main" Requires="a14">
+      <mc:AlternateContent xmlns:mc="http://schemas.openxmlformats.org/markup-compatibility/2006" xmlns:a14="http://schemas.microsoft.com/office/drawing/2010/main">
+        <mc:Choice Requires="a14">
           <p:sp>
             <p:nvSpPr>
               <p:cNvPr id="59" name="Rounded Rectangle 58">
@@ -35216,7 +35246,7 @@
             </p:txBody>
           </p:sp>
         </mc:Choice>
-        <mc:Fallback>
+        <mc:Fallback xmlns="">
           <p:sp>
             <p:nvSpPr>
               <p:cNvPr id="59" name="Rounded Rectangle 58">
@@ -35355,8 +35385,8 @@
           </a:fontRef>
         </p:style>
       </p:cxnSp>
-      <mc:AlternateContent xmlns:mc="http://schemas.openxmlformats.org/markup-compatibility/2006">
-        <mc:Choice xmlns:a14="http://schemas.microsoft.com/office/drawing/2010/main" Requires="a14">
+      <mc:AlternateContent xmlns:mc="http://schemas.openxmlformats.org/markup-compatibility/2006" xmlns:a14="http://schemas.microsoft.com/office/drawing/2010/main">
+        <mc:Choice Requires="a14">
           <p:sp>
             <p:nvSpPr>
               <p:cNvPr id="62" name="TextBox 61">
@@ -35425,7 +35455,7 @@
             </p:txBody>
           </p:sp>
         </mc:Choice>
-        <mc:Fallback>
+        <mc:Fallback xmlns="">
           <p:sp>
             <p:nvSpPr>
               <p:cNvPr id="62" name="TextBox 61">
@@ -35470,8 +35500,8 @@
           </p:sp>
         </mc:Fallback>
       </mc:AlternateContent>
-      <mc:AlternateContent xmlns:mc="http://schemas.openxmlformats.org/markup-compatibility/2006">
-        <mc:Choice xmlns:a14="http://schemas.microsoft.com/office/drawing/2010/main" Requires="a14">
+      <mc:AlternateContent xmlns:mc="http://schemas.openxmlformats.org/markup-compatibility/2006" xmlns:a14="http://schemas.microsoft.com/office/drawing/2010/main">
+        <mc:Choice Requires="a14">
           <p:sp>
             <p:nvSpPr>
               <p:cNvPr id="63" name="TextBox 62">
@@ -35540,7 +35570,7 @@
             </p:txBody>
           </p:sp>
         </mc:Choice>
-        <mc:Fallback>
+        <mc:Fallback xmlns="">
           <p:sp>
             <p:nvSpPr>
               <p:cNvPr id="63" name="TextBox 62">
@@ -35666,8 +35696,8 @@
           </a:fontRef>
         </p:style>
       </p:cxnSp>
-      <mc:AlternateContent xmlns:mc="http://schemas.openxmlformats.org/markup-compatibility/2006">
-        <mc:Choice xmlns:a14="http://schemas.microsoft.com/office/drawing/2010/main" Requires="a14">
+      <mc:AlternateContent xmlns:mc="http://schemas.openxmlformats.org/markup-compatibility/2006" xmlns:a14="http://schemas.microsoft.com/office/drawing/2010/main">
+        <mc:Choice Requires="a14">
           <p:sp>
             <p:nvSpPr>
               <p:cNvPr id="66" name="Oval 65">
@@ -35776,7 +35806,7 @@
             </p:txBody>
           </p:sp>
         </mc:Choice>
-        <mc:Fallback>
+        <mc:Fallback xmlns="">
           <p:sp>
             <p:nvSpPr>
               <p:cNvPr id="66" name="Oval 65">
@@ -35826,8 +35856,8 @@
           </p:sp>
         </mc:Fallback>
       </mc:AlternateContent>
-      <mc:AlternateContent xmlns:mc="http://schemas.openxmlformats.org/markup-compatibility/2006">
-        <mc:Choice xmlns:a14="http://schemas.microsoft.com/office/drawing/2010/main" Requires="a14">
+      <mc:AlternateContent xmlns:mc="http://schemas.openxmlformats.org/markup-compatibility/2006" xmlns:a14="http://schemas.microsoft.com/office/drawing/2010/main">
+        <mc:Choice Requires="a14">
           <p:sp>
             <p:nvSpPr>
               <p:cNvPr id="67" name="Rounded Rectangle 66">
@@ -35929,7 +35959,7 @@
             </p:txBody>
           </p:sp>
         </mc:Choice>
-        <mc:Fallback>
+        <mc:Fallback xmlns="">
           <p:sp>
             <p:nvSpPr>
               <p:cNvPr id="67" name="Rounded Rectangle 66">
@@ -36114,8 +36144,8 @@
           </a:fontRef>
         </p:style>
       </p:cxnSp>
-      <mc:AlternateContent xmlns:mc="http://schemas.openxmlformats.org/markup-compatibility/2006">
-        <mc:Choice xmlns:a14="http://schemas.microsoft.com/office/drawing/2010/main" Requires="a14">
+      <mc:AlternateContent xmlns:mc="http://schemas.openxmlformats.org/markup-compatibility/2006" xmlns:a14="http://schemas.microsoft.com/office/drawing/2010/main">
+        <mc:Choice Requires="a14">
           <p:sp>
             <p:nvSpPr>
               <p:cNvPr id="71" name="Rounded Rectangle 70">
@@ -36192,7 +36222,7 @@
             </p:txBody>
           </p:sp>
         </mc:Choice>
-        <mc:Fallback>
+        <mc:Fallback xmlns="">
           <p:sp>
             <p:nvSpPr>
               <p:cNvPr id="71" name="Rounded Rectangle 70">
@@ -36377,8 +36407,8 @@
           </a:fontRef>
         </p:style>
       </p:cxnSp>
-      <mc:AlternateContent xmlns:mc="http://schemas.openxmlformats.org/markup-compatibility/2006">
-        <mc:Choice xmlns:a14="http://schemas.microsoft.com/office/drawing/2010/main" Requires="a14">
+      <mc:AlternateContent xmlns:mc="http://schemas.openxmlformats.org/markup-compatibility/2006" xmlns:a14="http://schemas.microsoft.com/office/drawing/2010/main">
+        <mc:Choice Requires="a14">
           <p:sp>
             <p:nvSpPr>
               <p:cNvPr id="75" name="TextBox 74">
@@ -36447,7 +36477,7 @@
             </p:txBody>
           </p:sp>
         </mc:Choice>
-        <mc:Fallback>
+        <mc:Fallback xmlns="">
           <p:sp>
             <p:nvSpPr>
               <p:cNvPr id="75" name="TextBox 74">
@@ -36492,8 +36522,8 @@
           </p:sp>
         </mc:Fallback>
       </mc:AlternateContent>
-      <mc:AlternateContent xmlns:mc="http://schemas.openxmlformats.org/markup-compatibility/2006">
-        <mc:Choice xmlns:a14="http://schemas.microsoft.com/office/drawing/2010/main" Requires="a14">
+      <mc:AlternateContent xmlns:mc="http://schemas.openxmlformats.org/markup-compatibility/2006" xmlns:a14="http://schemas.microsoft.com/office/drawing/2010/main">
+        <mc:Choice Requires="a14">
           <p:sp>
             <p:nvSpPr>
               <p:cNvPr id="76" name="TextBox 75">
@@ -36543,7 +36573,7 @@
             </p:txBody>
           </p:sp>
         </mc:Choice>
-        <mc:Fallback>
+        <mc:Fallback xmlns="">
           <p:sp>
             <p:nvSpPr>
               <p:cNvPr id="76" name="TextBox 75">
@@ -36588,8 +36618,8 @@
           </p:sp>
         </mc:Fallback>
       </mc:AlternateContent>
-      <mc:AlternateContent xmlns:mc="http://schemas.openxmlformats.org/markup-compatibility/2006">
-        <mc:Choice xmlns:a14="http://schemas.microsoft.com/office/drawing/2010/main" Requires="a14">
+      <mc:AlternateContent xmlns:mc="http://schemas.openxmlformats.org/markup-compatibility/2006" xmlns:a14="http://schemas.microsoft.com/office/drawing/2010/main">
+        <mc:Choice Requires="a14">
           <p:sp>
             <p:nvSpPr>
               <p:cNvPr id="77" name="TextBox 76">
@@ -36658,7 +36688,7 @@
             </p:txBody>
           </p:sp>
         </mc:Choice>
-        <mc:Fallback>
+        <mc:Fallback xmlns="">
           <p:sp>
             <p:nvSpPr>
               <p:cNvPr id="77" name="TextBox 76">
@@ -36703,8 +36733,8 @@
           </p:sp>
         </mc:Fallback>
       </mc:AlternateContent>
-      <mc:AlternateContent xmlns:mc="http://schemas.openxmlformats.org/markup-compatibility/2006">
-        <mc:Choice xmlns:a14="http://schemas.microsoft.com/office/drawing/2010/main" Requires="a14">
+      <mc:AlternateContent xmlns:mc="http://schemas.openxmlformats.org/markup-compatibility/2006" xmlns:a14="http://schemas.microsoft.com/office/drawing/2010/main">
+        <mc:Choice Requires="a14">
           <p:sp>
             <p:nvSpPr>
               <p:cNvPr id="78" name="TextBox 77">
@@ -36754,7 +36784,7 @@
             </p:txBody>
           </p:sp>
         </mc:Choice>
-        <mc:Fallback>
+        <mc:Fallback xmlns="">
           <p:sp>
             <p:nvSpPr>
               <p:cNvPr id="78" name="TextBox 77">
@@ -36799,8 +36829,8 @@
           </p:sp>
         </mc:Fallback>
       </mc:AlternateContent>
-      <mc:AlternateContent xmlns:mc="http://schemas.openxmlformats.org/markup-compatibility/2006">
-        <mc:Choice xmlns:a14="http://schemas.microsoft.com/office/drawing/2010/main" Requires="a14">
+      <mc:AlternateContent xmlns:mc="http://schemas.openxmlformats.org/markup-compatibility/2006" xmlns:a14="http://schemas.microsoft.com/office/drawing/2010/main">
+        <mc:Choice Requires="a14">
           <p:sp>
             <p:nvSpPr>
               <p:cNvPr id="79" name="Oval 78">
@@ -36909,7 +36939,7 @@
             </p:txBody>
           </p:sp>
         </mc:Choice>
-        <mc:Fallback>
+        <mc:Fallback xmlns="">
           <p:sp>
             <p:nvSpPr>
               <p:cNvPr id="79" name="Oval 78">
@@ -37005,8 +37035,8 @@
           </a:fontRef>
         </p:style>
       </p:cxnSp>
-      <mc:AlternateContent xmlns:mc="http://schemas.openxmlformats.org/markup-compatibility/2006">
-        <mc:Choice xmlns:a14="http://schemas.microsoft.com/office/drawing/2010/main" Requires="a14">
+      <mc:AlternateContent xmlns:mc="http://schemas.openxmlformats.org/markup-compatibility/2006" xmlns:a14="http://schemas.microsoft.com/office/drawing/2010/main">
+        <mc:Choice Requires="a14">
           <p:sp>
             <p:nvSpPr>
               <p:cNvPr id="81" name="Rounded Rectangle 80">
@@ -37112,7 +37142,7 @@
             </p:txBody>
           </p:sp>
         </mc:Choice>
-        <mc:Fallback>
+        <mc:Fallback xmlns="">
           <p:sp>
             <p:nvSpPr>
               <p:cNvPr id="81" name="Rounded Rectangle 80">
@@ -37297,8 +37327,8 @@
           </a:fontRef>
         </p:style>
       </p:cxnSp>
-      <mc:AlternateContent xmlns:mc="http://schemas.openxmlformats.org/markup-compatibility/2006">
-        <mc:Choice xmlns:a14="http://schemas.microsoft.com/office/drawing/2010/main" Requires="a14">
+      <mc:AlternateContent xmlns:mc="http://schemas.openxmlformats.org/markup-compatibility/2006" xmlns:a14="http://schemas.microsoft.com/office/drawing/2010/main">
+        <mc:Choice Requires="a14">
           <p:sp>
             <p:nvSpPr>
               <p:cNvPr id="85" name="TextBox 84">
@@ -37367,7 +37397,7 @@
             </p:txBody>
           </p:sp>
         </mc:Choice>
-        <mc:Fallback>
+        <mc:Fallback xmlns="">
           <p:sp>
             <p:nvSpPr>
               <p:cNvPr id="85" name="TextBox 84">
@@ -37412,8 +37442,8 @@
           </p:sp>
         </mc:Fallback>
       </mc:AlternateContent>
-      <mc:AlternateContent xmlns:mc="http://schemas.openxmlformats.org/markup-compatibility/2006">
-        <mc:Choice xmlns:a14="http://schemas.microsoft.com/office/drawing/2010/main" Requires="a14">
+      <mc:AlternateContent xmlns:mc="http://schemas.openxmlformats.org/markup-compatibility/2006" xmlns:a14="http://schemas.microsoft.com/office/drawing/2010/main">
+        <mc:Choice Requires="a14">
           <p:sp>
             <p:nvSpPr>
               <p:cNvPr id="86" name="TextBox 85">
@@ -37482,7 +37512,7 @@
             </p:txBody>
           </p:sp>
         </mc:Choice>
-        <mc:Fallback>
+        <mc:Fallback xmlns="">
           <p:sp>
             <p:nvSpPr>
               <p:cNvPr id="86" name="TextBox 85">
@@ -37527,8 +37557,8 @@
           </p:sp>
         </mc:Fallback>
       </mc:AlternateContent>
-      <mc:AlternateContent xmlns:mc="http://schemas.openxmlformats.org/markup-compatibility/2006">
-        <mc:Choice xmlns:a14="http://schemas.microsoft.com/office/drawing/2010/main" Requires="a14">
+      <mc:AlternateContent xmlns:mc="http://schemas.openxmlformats.org/markup-compatibility/2006" xmlns:a14="http://schemas.microsoft.com/office/drawing/2010/main">
+        <mc:Choice Requires="a14">
           <p:sp>
             <p:nvSpPr>
               <p:cNvPr id="87" name="Oval 86">
@@ -37612,7 +37642,7 @@
             </p:txBody>
           </p:sp>
         </mc:Choice>
-        <mc:Fallback>
+        <mc:Fallback xmlns="">
           <p:sp>
             <p:nvSpPr>
               <p:cNvPr id="87" name="Oval 86">
@@ -37662,8 +37692,8 @@
           </p:sp>
         </mc:Fallback>
       </mc:AlternateContent>
-      <mc:AlternateContent xmlns:mc="http://schemas.openxmlformats.org/markup-compatibility/2006">
-        <mc:Choice xmlns:a14="http://schemas.microsoft.com/office/drawing/2010/main" Requires="a14">
+      <mc:AlternateContent xmlns:mc="http://schemas.openxmlformats.org/markup-compatibility/2006" xmlns:a14="http://schemas.microsoft.com/office/drawing/2010/main">
+        <mc:Choice Requires="a14">
           <p:sp>
             <p:nvSpPr>
               <p:cNvPr id="88" name="Rounded Rectangle 87">
@@ -37740,7 +37770,7 @@
             </p:txBody>
           </p:sp>
         </mc:Choice>
-        <mc:Fallback>
+        <mc:Fallback xmlns="">
           <p:sp>
             <p:nvSpPr>
               <p:cNvPr id="88" name="Rounded Rectangle 87">
@@ -37925,8 +37955,8 @@
           </a:fontRef>
         </p:style>
       </p:cxnSp>
-      <mc:AlternateContent xmlns:mc="http://schemas.openxmlformats.org/markup-compatibility/2006">
-        <mc:Choice xmlns:a14="http://schemas.microsoft.com/office/drawing/2010/main" Requires="a14">
+      <mc:AlternateContent xmlns:mc="http://schemas.openxmlformats.org/markup-compatibility/2006" xmlns:a14="http://schemas.microsoft.com/office/drawing/2010/main">
+        <mc:Choice Requires="a14">
           <p:sp>
             <p:nvSpPr>
               <p:cNvPr id="92" name="Rounded Rectangle 91">
@@ -38003,7 +38033,7 @@
             </p:txBody>
           </p:sp>
         </mc:Choice>
-        <mc:Fallback>
+        <mc:Fallback xmlns="">
           <p:sp>
             <p:nvSpPr>
               <p:cNvPr id="92" name="Rounded Rectangle 91">
@@ -38188,8 +38218,8 @@
           </a:fontRef>
         </p:style>
       </p:cxnSp>
-      <mc:AlternateContent xmlns:mc="http://schemas.openxmlformats.org/markup-compatibility/2006">
-        <mc:Choice xmlns:a14="http://schemas.microsoft.com/office/drawing/2010/main" Requires="a14">
+      <mc:AlternateContent xmlns:mc="http://schemas.openxmlformats.org/markup-compatibility/2006" xmlns:a14="http://schemas.microsoft.com/office/drawing/2010/main">
+        <mc:Choice Requires="a14">
           <p:sp>
             <p:nvSpPr>
               <p:cNvPr id="96" name="TextBox 95">
@@ -38239,7 +38269,7 @@
             </p:txBody>
           </p:sp>
         </mc:Choice>
-        <mc:Fallback>
+        <mc:Fallback xmlns="">
           <p:sp>
             <p:nvSpPr>
               <p:cNvPr id="96" name="TextBox 95">
@@ -38284,8 +38314,8 @@
           </p:sp>
         </mc:Fallback>
       </mc:AlternateContent>
-      <mc:AlternateContent xmlns:mc="http://schemas.openxmlformats.org/markup-compatibility/2006">
-        <mc:Choice xmlns:a14="http://schemas.microsoft.com/office/drawing/2010/main" Requires="a14">
+      <mc:AlternateContent xmlns:mc="http://schemas.openxmlformats.org/markup-compatibility/2006" xmlns:a14="http://schemas.microsoft.com/office/drawing/2010/main">
+        <mc:Choice Requires="a14">
           <p:sp>
             <p:nvSpPr>
               <p:cNvPr id="97" name="TextBox 96">
@@ -38335,7 +38365,7 @@
             </p:txBody>
           </p:sp>
         </mc:Choice>
-        <mc:Fallback>
+        <mc:Fallback xmlns="">
           <p:sp>
             <p:nvSpPr>
               <p:cNvPr id="97" name="TextBox 96">
@@ -38380,8 +38410,8 @@
           </p:sp>
         </mc:Fallback>
       </mc:AlternateContent>
-      <mc:AlternateContent xmlns:mc="http://schemas.openxmlformats.org/markup-compatibility/2006">
-        <mc:Choice xmlns:a14="http://schemas.microsoft.com/office/drawing/2010/main" Requires="a14">
+      <mc:AlternateContent xmlns:mc="http://schemas.openxmlformats.org/markup-compatibility/2006" xmlns:a14="http://schemas.microsoft.com/office/drawing/2010/main">
+        <mc:Choice Requires="a14">
           <p:sp>
             <p:nvSpPr>
               <p:cNvPr id="98" name="TextBox 97">
@@ -38431,7 +38461,7 @@
             </p:txBody>
           </p:sp>
         </mc:Choice>
-        <mc:Fallback>
+        <mc:Fallback xmlns="">
           <p:sp>
             <p:nvSpPr>
               <p:cNvPr id="98" name="TextBox 97">
@@ -38476,8 +38506,8 @@
           </p:sp>
         </mc:Fallback>
       </mc:AlternateContent>
-      <mc:AlternateContent xmlns:mc="http://schemas.openxmlformats.org/markup-compatibility/2006">
-        <mc:Choice xmlns:a14="http://schemas.microsoft.com/office/drawing/2010/main" Requires="a14">
+      <mc:AlternateContent xmlns:mc="http://schemas.openxmlformats.org/markup-compatibility/2006" xmlns:a14="http://schemas.microsoft.com/office/drawing/2010/main">
+        <mc:Choice Requires="a14">
           <p:sp>
             <p:nvSpPr>
               <p:cNvPr id="99" name="TextBox 98">
@@ -38527,7 +38557,7 @@
             </p:txBody>
           </p:sp>
         </mc:Choice>
-        <mc:Fallback>
+        <mc:Fallback xmlns="">
           <p:sp>
             <p:nvSpPr>
               <p:cNvPr id="99" name="TextBox 98">
@@ -38899,8 +38929,8 @@
           </a:p>
         </p:txBody>
       </p:sp>
-      <mc:AlternateContent xmlns:mc="http://schemas.openxmlformats.org/markup-compatibility/2006">
-        <mc:Choice xmlns:a14="http://schemas.microsoft.com/office/drawing/2010/main" Requires="a14">
+      <mc:AlternateContent xmlns:mc="http://schemas.openxmlformats.org/markup-compatibility/2006" xmlns:a14="http://schemas.microsoft.com/office/drawing/2010/main">
+        <mc:Choice Requires="a14">
           <p:sp>
             <p:nvSpPr>
               <p:cNvPr id="4" name="Oval 3">
@@ -38984,7 +39014,7 @@
             </p:txBody>
           </p:sp>
         </mc:Choice>
-        <mc:Fallback>
+        <mc:Fallback xmlns="">
           <p:sp>
             <p:nvSpPr>
               <p:cNvPr id="4" name="Oval 3">
@@ -39034,8 +39064,8 @@
           </p:sp>
         </mc:Fallback>
       </mc:AlternateContent>
-      <mc:AlternateContent xmlns:mc="http://schemas.openxmlformats.org/markup-compatibility/2006">
-        <mc:Choice xmlns:a14="http://schemas.microsoft.com/office/drawing/2010/main" Requires="a14">
+      <mc:AlternateContent xmlns:mc="http://schemas.openxmlformats.org/markup-compatibility/2006" xmlns:a14="http://schemas.microsoft.com/office/drawing/2010/main">
+        <mc:Choice Requires="a14">
           <p:sp>
             <p:nvSpPr>
               <p:cNvPr id="5" name="Rounded Rectangle 4">
@@ -39112,7 +39142,7 @@
             </p:txBody>
           </p:sp>
         </mc:Choice>
-        <mc:Fallback>
+        <mc:Fallback xmlns="">
           <p:sp>
             <p:nvSpPr>
               <p:cNvPr id="5" name="Rounded Rectangle 4">
@@ -39251,8 +39281,8 @@
           </a:fontRef>
         </p:style>
       </p:cxnSp>
-      <mc:AlternateContent xmlns:mc="http://schemas.openxmlformats.org/markup-compatibility/2006">
-        <mc:Choice xmlns:a14="http://schemas.microsoft.com/office/drawing/2010/main" Requires="a14">
+      <mc:AlternateContent xmlns:mc="http://schemas.openxmlformats.org/markup-compatibility/2006" xmlns:a14="http://schemas.microsoft.com/office/drawing/2010/main">
+        <mc:Choice Requires="a14">
           <p:sp>
             <p:nvSpPr>
               <p:cNvPr id="9" name="Rounded Rectangle 8">
@@ -39329,7 +39359,7 @@
             </p:txBody>
           </p:sp>
         </mc:Choice>
-        <mc:Fallback>
+        <mc:Fallback xmlns="">
           <p:sp>
             <p:nvSpPr>
               <p:cNvPr id="9" name="Rounded Rectangle 8">
@@ -39467,8 +39497,8 @@
           </a:fontRef>
         </p:style>
       </p:cxnSp>
-      <mc:AlternateContent xmlns:mc="http://schemas.openxmlformats.org/markup-compatibility/2006">
-        <mc:Choice xmlns:a14="http://schemas.microsoft.com/office/drawing/2010/main" Requires="a14">
+      <mc:AlternateContent xmlns:mc="http://schemas.openxmlformats.org/markup-compatibility/2006" xmlns:a14="http://schemas.microsoft.com/office/drawing/2010/main">
+        <mc:Choice Requires="a14">
           <p:sp>
             <p:nvSpPr>
               <p:cNvPr id="13" name="TextBox 12">
@@ -39518,7 +39548,7 @@
             </p:txBody>
           </p:sp>
         </mc:Choice>
-        <mc:Fallback>
+        <mc:Fallback xmlns="">
           <p:sp>
             <p:nvSpPr>
               <p:cNvPr id="13" name="TextBox 12">
@@ -39563,8 +39593,8 @@
           </p:sp>
         </mc:Fallback>
       </mc:AlternateContent>
-      <mc:AlternateContent xmlns:mc="http://schemas.openxmlformats.org/markup-compatibility/2006">
-        <mc:Choice xmlns:a14="http://schemas.microsoft.com/office/drawing/2010/main" Requires="a14">
+      <mc:AlternateContent xmlns:mc="http://schemas.openxmlformats.org/markup-compatibility/2006" xmlns:a14="http://schemas.microsoft.com/office/drawing/2010/main">
+        <mc:Choice Requires="a14">
           <p:sp>
             <p:nvSpPr>
               <p:cNvPr id="14" name="TextBox 13">
@@ -39614,7 +39644,7 @@
             </p:txBody>
           </p:sp>
         </mc:Choice>
-        <mc:Fallback>
+        <mc:Fallback xmlns="">
           <p:sp>
             <p:nvSpPr>
               <p:cNvPr id="14" name="TextBox 13">
@@ -39659,8 +39689,8 @@
           </p:sp>
         </mc:Fallback>
       </mc:AlternateContent>
-      <mc:AlternateContent xmlns:mc="http://schemas.openxmlformats.org/markup-compatibility/2006">
-        <mc:Choice xmlns:a14="http://schemas.microsoft.com/office/drawing/2010/main" Requires="a14">
+      <mc:AlternateContent xmlns:mc="http://schemas.openxmlformats.org/markup-compatibility/2006" xmlns:a14="http://schemas.microsoft.com/office/drawing/2010/main">
+        <mc:Choice Requires="a14">
           <p:sp>
             <p:nvSpPr>
               <p:cNvPr id="15" name="TextBox 14">
@@ -39710,7 +39740,7 @@
             </p:txBody>
           </p:sp>
         </mc:Choice>
-        <mc:Fallback>
+        <mc:Fallback xmlns="">
           <p:sp>
             <p:nvSpPr>
               <p:cNvPr id="15" name="TextBox 14">
@@ -39755,8 +39785,8 @@
           </p:sp>
         </mc:Fallback>
       </mc:AlternateContent>
-      <mc:AlternateContent xmlns:mc="http://schemas.openxmlformats.org/markup-compatibility/2006">
-        <mc:Choice xmlns:a14="http://schemas.microsoft.com/office/drawing/2010/main" Requires="a14">
+      <mc:AlternateContent xmlns:mc="http://schemas.openxmlformats.org/markup-compatibility/2006" xmlns:a14="http://schemas.microsoft.com/office/drawing/2010/main">
+        <mc:Choice Requires="a14">
           <p:sp>
             <p:nvSpPr>
               <p:cNvPr id="16" name="TextBox 15">
@@ -39806,7 +39836,7 @@
             </p:txBody>
           </p:sp>
         </mc:Choice>
-        <mc:Fallback>
+        <mc:Fallback xmlns="">
           <p:sp>
             <p:nvSpPr>
               <p:cNvPr id="16" name="TextBox 15">
@@ -39851,8 +39881,8 @@
           </p:sp>
         </mc:Fallback>
       </mc:AlternateContent>
-      <mc:AlternateContent xmlns:mc="http://schemas.openxmlformats.org/markup-compatibility/2006">
-        <mc:Choice xmlns:a14="http://schemas.microsoft.com/office/drawing/2010/main" Requires="a14">
+      <mc:AlternateContent xmlns:mc="http://schemas.openxmlformats.org/markup-compatibility/2006" xmlns:a14="http://schemas.microsoft.com/office/drawing/2010/main">
+        <mc:Choice Requires="a14">
           <p:sp>
             <p:nvSpPr>
               <p:cNvPr id="19" name="Rounded Rectangle 18">
@@ -39957,7 +39987,7 @@
             </p:txBody>
           </p:sp>
         </mc:Choice>
-        <mc:Fallback>
+        <mc:Fallback xmlns="">
           <p:sp>
             <p:nvSpPr>
               <p:cNvPr id="19" name="Rounded Rectangle 18">
@@ -40007,8 +40037,8 @@
           </p:sp>
         </mc:Fallback>
       </mc:AlternateContent>
-      <mc:AlternateContent xmlns:mc="http://schemas.openxmlformats.org/markup-compatibility/2006">
-        <mc:Choice xmlns:a14="http://schemas.microsoft.com/office/drawing/2010/main" Requires="a14">
+      <mc:AlternateContent xmlns:mc="http://schemas.openxmlformats.org/markup-compatibility/2006" xmlns:a14="http://schemas.microsoft.com/office/drawing/2010/main">
+        <mc:Choice Requires="a14">
           <p:sp>
             <p:nvSpPr>
               <p:cNvPr id="20" name="Rounded Rectangle 19">
@@ -40113,7 +40143,7 @@
             </p:txBody>
           </p:sp>
         </mc:Choice>
-        <mc:Fallback>
+        <mc:Fallback xmlns="">
           <p:sp>
             <p:nvSpPr>
               <p:cNvPr id="20" name="Rounded Rectangle 19">
@@ -40253,8 +40283,8 @@
           </a:fontRef>
         </p:style>
       </p:cxnSp>
-      <mc:AlternateContent xmlns:mc="http://schemas.openxmlformats.org/markup-compatibility/2006">
-        <mc:Choice xmlns:a14="http://schemas.microsoft.com/office/drawing/2010/main" Requires="a14">
+      <mc:AlternateContent xmlns:mc="http://schemas.openxmlformats.org/markup-compatibility/2006" xmlns:a14="http://schemas.microsoft.com/office/drawing/2010/main">
+        <mc:Choice Requires="a14">
           <p:sp>
             <p:nvSpPr>
               <p:cNvPr id="32" name="Oval 31">
@@ -40338,7 +40368,7 @@
             </p:txBody>
           </p:sp>
         </mc:Choice>
-        <mc:Fallback>
+        <mc:Fallback xmlns="">
           <p:sp>
             <p:nvSpPr>
               <p:cNvPr id="32" name="Oval 31">
@@ -40388,8 +40418,8 @@
           </p:sp>
         </mc:Fallback>
       </mc:AlternateContent>
-      <mc:AlternateContent xmlns:mc="http://schemas.openxmlformats.org/markup-compatibility/2006">
-        <mc:Choice xmlns:a14="http://schemas.microsoft.com/office/drawing/2010/main" Requires="a14">
+      <mc:AlternateContent xmlns:mc="http://schemas.openxmlformats.org/markup-compatibility/2006" xmlns:a14="http://schemas.microsoft.com/office/drawing/2010/main">
+        <mc:Choice Requires="a14">
           <p:sp>
             <p:nvSpPr>
               <p:cNvPr id="33" name="Rounded Rectangle 32">
@@ -40466,7 +40496,7 @@
             </p:txBody>
           </p:sp>
         </mc:Choice>
-        <mc:Fallback>
+        <mc:Fallback xmlns="">
           <p:sp>
             <p:nvSpPr>
               <p:cNvPr id="33" name="Rounded Rectangle 32">
@@ -40605,8 +40635,8 @@
           </a:fontRef>
         </p:style>
       </p:cxnSp>
-      <mc:AlternateContent xmlns:mc="http://schemas.openxmlformats.org/markup-compatibility/2006">
-        <mc:Choice xmlns:a14="http://schemas.microsoft.com/office/drawing/2010/main" Requires="a14">
+      <mc:AlternateContent xmlns:mc="http://schemas.openxmlformats.org/markup-compatibility/2006" xmlns:a14="http://schemas.microsoft.com/office/drawing/2010/main">
+        <mc:Choice Requires="a14">
           <p:sp>
             <p:nvSpPr>
               <p:cNvPr id="36" name="Rounded Rectangle 35">
@@ -40683,7 +40713,7 @@
             </p:txBody>
           </p:sp>
         </mc:Choice>
-        <mc:Fallback>
+        <mc:Fallback xmlns="">
           <p:sp>
             <p:nvSpPr>
               <p:cNvPr id="36" name="Rounded Rectangle 35">
@@ -40821,8 +40851,8 @@
           </a:fontRef>
         </p:style>
       </p:cxnSp>
-      <mc:AlternateContent xmlns:mc="http://schemas.openxmlformats.org/markup-compatibility/2006">
-        <mc:Choice xmlns:a14="http://schemas.microsoft.com/office/drawing/2010/main" Requires="a14">
+      <mc:AlternateContent xmlns:mc="http://schemas.openxmlformats.org/markup-compatibility/2006" xmlns:a14="http://schemas.microsoft.com/office/drawing/2010/main">
+        <mc:Choice Requires="a14">
           <p:sp>
             <p:nvSpPr>
               <p:cNvPr id="39" name="TextBox 38">
@@ -40872,7 +40902,7 @@
             </p:txBody>
           </p:sp>
         </mc:Choice>
-        <mc:Fallback>
+        <mc:Fallback xmlns="">
           <p:sp>
             <p:nvSpPr>
               <p:cNvPr id="39" name="TextBox 38">
@@ -40917,8 +40947,8 @@
           </p:sp>
         </mc:Fallback>
       </mc:AlternateContent>
-      <mc:AlternateContent xmlns:mc="http://schemas.openxmlformats.org/markup-compatibility/2006">
-        <mc:Choice xmlns:a14="http://schemas.microsoft.com/office/drawing/2010/main" Requires="a14">
+      <mc:AlternateContent xmlns:mc="http://schemas.openxmlformats.org/markup-compatibility/2006" xmlns:a14="http://schemas.microsoft.com/office/drawing/2010/main">
+        <mc:Choice Requires="a14">
           <p:sp>
             <p:nvSpPr>
               <p:cNvPr id="40" name="TextBox 39">
@@ -40968,7 +40998,7 @@
             </p:txBody>
           </p:sp>
         </mc:Choice>
-        <mc:Fallback>
+        <mc:Fallback xmlns="">
           <p:sp>
             <p:nvSpPr>
               <p:cNvPr id="40" name="TextBox 39">
@@ -41013,8 +41043,8 @@
           </p:sp>
         </mc:Fallback>
       </mc:AlternateContent>
-      <mc:AlternateContent xmlns:mc="http://schemas.openxmlformats.org/markup-compatibility/2006">
-        <mc:Choice xmlns:a14="http://schemas.microsoft.com/office/drawing/2010/main" Requires="a14">
+      <mc:AlternateContent xmlns:mc="http://schemas.openxmlformats.org/markup-compatibility/2006" xmlns:a14="http://schemas.microsoft.com/office/drawing/2010/main">
+        <mc:Choice Requires="a14">
           <p:sp>
             <p:nvSpPr>
               <p:cNvPr id="41" name="TextBox 40">
@@ -41064,7 +41094,7 @@
             </p:txBody>
           </p:sp>
         </mc:Choice>
-        <mc:Fallback>
+        <mc:Fallback xmlns="">
           <p:sp>
             <p:nvSpPr>
               <p:cNvPr id="41" name="TextBox 40">
@@ -41109,8 +41139,8 @@
           </p:sp>
         </mc:Fallback>
       </mc:AlternateContent>
-      <mc:AlternateContent xmlns:mc="http://schemas.openxmlformats.org/markup-compatibility/2006">
-        <mc:Choice xmlns:a14="http://schemas.microsoft.com/office/drawing/2010/main" Requires="a14">
+      <mc:AlternateContent xmlns:mc="http://schemas.openxmlformats.org/markup-compatibility/2006" xmlns:a14="http://schemas.microsoft.com/office/drawing/2010/main">
+        <mc:Choice Requires="a14">
           <p:sp>
             <p:nvSpPr>
               <p:cNvPr id="42" name="TextBox 41">
@@ -41160,7 +41190,7 @@
             </p:txBody>
           </p:sp>
         </mc:Choice>
-        <mc:Fallback>
+        <mc:Fallback xmlns="">
           <p:sp>
             <p:nvSpPr>
               <p:cNvPr id="42" name="TextBox 41">
@@ -41205,8 +41235,8 @@
           </p:sp>
         </mc:Fallback>
       </mc:AlternateContent>
-      <mc:AlternateContent xmlns:mc="http://schemas.openxmlformats.org/markup-compatibility/2006">
-        <mc:Choice xmlns:a14="http://schemas.microsoft.com/office/drawing/2010/main" Requires="a14">
+      <mc:AlternateContent xmlns:mc="http://schemas.openxmlformats.org/markup-compatibility/2006" xmlns:a14="http://schemas.microsoft.com/office/drawing/2010/main">
+        <mc:Choice Requires="a14">
           <p:sp>
             <p:nvSpPr>
               <p:cNvPr id="43" name="Rounded Rectangle 42">
@@ -41311,7 +41341,7 @@
             </p:txBody>
           </p:sp>
         </mc:Choice>
-        <mc:Fallback>
+        <mc:Fallback xmlns="">
           <p:sp>
             <p:nvSpPr>
               <p:cNvPr id="43" name="Rounded Rectangle 42">
@@ -41451,8 +41481,8 @@
           </a:fontRef>
         </p:style>
       </p:cxnSp>
-      <mc:AlternateContent xmlns:mc="http://schemas.openxmlformats.org/markup-compatibility/2006">
-        <mc:Choice xmlns:a14="http://schemas.microsoft.com/office/drawing/2010/main" Requires="a14">
+      <mc:AlternateContent xmlns:mc="http://schemas.openxmlformats.org/markup-compatibility/2006" xmlns:a14="http://schemas.microsoft.com/office/drawing/2010/main">
+        <mc:Choice Requires="a14">
           <p:sp>
             <p:nvSpPr>
               <p:cNvPr id="47" name="Oval 46">
@@ -41536,7 +41566,7 @@
             </p:txBody>
           </p:sp>
         </mc:Choice>
-        <mc:Fallback>
+        <mc:Fallback xmlns="">
           <p:sp>
             <p:nvSpPr>
               <p:cNvPr id="47" name="Oval 46">
@@ -41586,8 +41616,8 @@
           </p:sp>
         </mc:Fallback>
       </mc:AlternateContent>
-      <mc:AlternateContent xmlns:mc="http://schemas.openxmlformats.org/markup-compatibility/2006">
-        <mc:Choice xmlns:a14="http://schemas.microsoft.com/office/drawing/2010/main" Requires="a14">
+      <mc:AlternateContent xmlns:mc="http://schemas.openxmlformats.org/markup-compatibility/2006" xmlns:a14="http://schemas.microsoft.com/office/drawing/2010/main">
+        <mc:Choice Requires="a14">
           <p:sp>
             <p:nvSpPr>
               <p:cNvPr id="48" name="Rounded Rectangle 47">
@@ -41664,7 +41694,7 @@
             </p:txBody>
           </p:sp>
         </mc:Choice>
-        <mc:Fallback>
+        <mc:Fallback xmlns="">
           <p:sp>
             <p:nvSpPr>
               <p:cNvPr id="48" name="Rounded Rectangle 47">
@@ -41804,8 +41834,8 @@
           </a:fontRef>
         </p:style>
       </p:cxnSp>
-      <mc:AlternateContent xmlns:mc="http://schemas.openxmlformats.org/markup-compatibility/2006">
-        <mc:Choice xmlns:a14="http://schemas.microsoft.com/office/drawing/2010/main" Requires="a14">
+      <mc:AlternateContent xmlns:mc="http://schemas.openxmlformats.org/markup-compatibility/2006" xmlns:a14="http://schemas.microsoft.com/office/drawing/2010/main">
+        <mc:Choice Requires="a14">
           <p:sp>
             <p:nvSpPr>
               <p:cNvPr id="51" name="Rounded Rectangle 50">
@@ -41882,7 +41912,7 @@
             </p:txBody>
           </p:sp>
         </mc:Choice>
-        <mc:Fallback>
+        <mc:Fallback xmlns="">
           <p:sp>
             <p:nvSpPr>
               <p:cNvPr id="51" name="Rounded Rectangle 50">
@@ -42022,8 +42052,8 @@
           </a:fontRef>
         </p:style>
       </p:cxnSp>
-      <mc:AlternateContent xmlns:mc="http://schemas.openxmlformats.org/markup-compatibility/2006">
-        <mc:Choice xmlns:a14="http://schemas.microsoft.com/office/drawing/2010/main" Requires="a14">
+      <mc:AlternateContent xmlns:mc="http://schemas.openxmlformats.org/markup-compatibility/2006" xmlns:a14="http://schemas.microsoft.com/office/drawing/2010/main">
+        <mc:Choice Requires="a14">
           <p:sp>
             <p:nvSpPr>
               <p:cNvPr id="54" name="TextBox 53">
@@ -42073,7 +42103,7 @@
             </p:txBody>
           </p:sp>
         </mc:Choice>
-        <mc:Fallback>
+        <mc:Fallback xmlns="">
           <p:sp>
             <p:nvSpPr>
               <p:cNvPr id="54" name="TextBox 53">
@@ -42118,8 +42148,8 @@
           </p:sp>
         </mc:Fallback>
       </mc:AlternateContent>
-      <mc:AlternateContent xmlns:mc="http://schemas.openxmlformats.org/markup-compatibility/2006">
-        <mc:Choice xmlns:a14="http://schemas.microsoft.com/office/drawing/2010/main" Requires="a14">
+      <mc:AlternateContent xmlns:mc="http://schemas.openxmlformats.org/markup-compatibility/2006" xmlns:a14="http://schemas.microsoft.com/office/drawing/2010/main">
+        <mc:Choice Requires="a14">
           <p:sp>
             <p:nvSpPr>
               <p:cNvPr id="55" name="TextBox 54">
@@ -42169,7 +42199,7 @@
             </p:txBody>
           </p:sp>
         </mc:Choice>
-        <mc:Fallback>
+        <mc:Fallback xmlns="">
           <p:sp>
             <p:nvSpPr>
               <p:cNvPr id="55" name="TextBox 54">
@@ -42214,8 +42244,8 @@
           </p:sp>
         </mc:Fallback>
       </mc:AlternateContent>
-      <mc:AlternateContent xmlns:mc="http://schemas.openxmlformats.org/markup-compatibility/2006">
-        <mc:Choice xmlns:a14="http://schemas.microsoft.com/office/drawing/2010/main" Requires="a14">
+      <mc:AlternateContent xmlns:mc="http://schemas.openxmlformats.org/markup-compatibility/2006" xmlns:a14="http://schemas.microsoft.com/office/drawing/2010/main">
+        <mc:Choice Requires="a14">
           <p:sp>
             <p:nvSpPr>
               <p:cNvPr id="56" name="TextBox 55">
@@ -42265,7 +42295,7 @@
             </p:txBody>
           </p:sp>
         </mc:Choice>
-        <mc:Fallback>
+        <mc:Fallback xmlns="">
           <p:sp>
             <p:nvSpPr>
               <p:cNvPr id="56" name="TextBox 55">
@@ -42310,8 +42340,8 @@
           </p:sp>
         </mc:Fallback>
       </mc:AlternateContent>
-      <mc:AlternateContent xmlns:mc="http://schemas.openxmlformats.org/markup-compatibility/2006">
-        <mc:Choice xmlns:a14="http://schemas.microsoft.com/office/drawing/2010/main" Requires="a14">
+      <mc:AlternateContent xmlns:mc="http://schemas.openxmlformats.org/markup-compatibility/2006" xmlns:a14="http://schemas.microsoft.com/office/drawing/2010/main">
+        <mc:Choice Requires="a14">
           <p:sp>
             <p:nvSpPr>
               <p:cNvPr id="57" name="TextBox 56">
@@ -42361,7 +42391,7 @@
             </p:txBody>
           </p:sp>
         </mc:Choice>
-        <mc:Fallback>
+        <mc:Fallback xmlns="">
           <p:sp>
             <p:nvSpPr>
               <p:cNvPr id="57" name="TextBox 56">
@@ -42406,8 +42436,8 @@
           </p:sp>
         </mc:Fallback>
       </mc:AlternateContent>
-      <mc:AlternateContent xmlns:mc="http://schemas.openxmlformats.org/markup-compatibility/2006">
-        <mc:Choice xmlns:a14="http://schemas.microsoft.com/office/drawing/2010/main" Requires="a14">
+      <mc:AlternateContent xmlns:mc="http://schemas.openxmlformats.org/markup-compatibility/2006" xmlns:a14="http://schemas.microsoft.com/office/drawing/2010/main">
+        <mc:Choice Requires="a14">
           <p:sp>
             <p:nvSpPr>
               <p:cNvPr id="61" name="Rounded Rectangle 60">
@@ -42512,7 +42542,7 @@
             </p:txBody>
           </p:sp>
         </mc:Choice>
-        <mc:Fallback>
+        <mc:Fallback xmlns="">
           <p:sp>
             <p:nvSpPr>
               <p:cNvPr id="61" name="Rounded Rectangle 60">
@@ -42562,8 +42592,8 @@
           </p:sp>
         </mc:Fallback>
       </mc:AlternateContent>
-      <mc:AlternateContent xmlns:mc="http://schemas.openxmlformats.org/markup-compatibility/2006">
-        <mc:Choice xmlns:a14="http://schemas.microsoft.com/office/drawing/2010/main" Requires="a14">
+      <mc:AlternateContent xmlns:mc="http://schemas.openxmlformats.org/markup-compatibility/2006" xmlns:a14="http://schemas.microsoft.com/office/drawing/2010/main">
+        <mc:Choice Requires="a14">
           <p:sp>
             <p:nvSpPr>
               <p:cNvPr id="62" name="Rounded Rectangle 61">
@@ -42668,7 +42698,7 @@
             </p:txBody>
           </p:sp>
         </mc:Choice>
-        <mc:Fallback>
+        <mc:Fallback xmlns="">
           <p:sp>
             <p:nvSpPr>
               <p:cNvPr id="62" name="Rounded Rectangle 61">
@@ -43236,8 +43266,8 @@
           </a:p>
         </p:txBody>
       </p:sp>
-      <mc:AlternateContent xmlns:mc="http://schemas.openxmlformats.org/markup-compatibility/2006">
-        <mc:Choice xmlns:a14="http://schemas.microsoft.com/office/drawing/2010/main" Requires="a14">
+      <mc:AlternateContent xmlns:mc="http://schemas.openxmlformats.org/markup-compatibility/2006" xmlns:a14="http://schemas.microsoft.com/office/drawing/2010/main">
+        <mc:Choice Requires="a14">
           <p:sp>
             <p:nvSpPr>
               <p:cNvPr id="5" name="TextBox 4">
@@ -43306,7 +43336,7 @@
             </p:txBody>
           </p:sp>
         </mc:Choice>
-        <mc:Fallback>
+        <mc:Fallback xmlns="">
           <p:sp>
             <p:nvSpPr>
               <p:cNvPr id="5" name="TextBox 4">
@@ -43351,8 +43381,8 @@
           </p:sp>
         </mc:Fallback>
       </mc:AlternateContent>
-      <mc:AlternateContent xmlns:mc="http://schemas.openxmlformats.org/markup-compatibility/2006">
-        <mc:Choice xmlns:a14="http://schemas.microsoft.com/office/drawing/2010/main" Requires="a14">
+      <mc:AlternateContent xmlns:mc="http://schemas.openxmlformats.org/markup-compatibility/2006" xmlns:a14="http://schemas.microsoft.com/office/drawing/2010/main">
+        <mc:Choice Requires="a14">
           <p:sp>
             <p:nvSpPr>
               <p:cNvPr id="6" name="Rounded Rectangle 5">
@@ -43490,7 +43520,7 @@
             </p:txBody>
           </p:sp>
         </mc:Choice>
-        <mc:Fallback>
+        <mc:Fallback xmlns="">
           <p:sp>
             <p:nvSpPr>
               <p:cNvPr id="6" name="Rounded Rectangle 5">
@@ -43632,8 +43662,8 @@
           </a:fontRef>
         </p:style>
       </p:cxnSp>
-      <mc:AlternateContent xmlns:mc="http://schemas.openxmlformats.org/markup-compatibility/2006">
-        <mc:Choice xmlns:a14="http://schemas.microsoft.com/office/drawing/2010/main" Requires="a14">
+      <mc:AlternateContent xmlns:mc="http://schemas.openxmlformats.org/markup-compatibility/2006" xmlns:a14="http://schemas.microsoft.com/office/drawing/2010/main">
+        <mc:Choice Requires="a14">
           <p:sp>
             <p:nvSpPr>
               <p:cNvPr id="9" name="Rounded Rectangle 8">
@@ -43846,7 +43876,7 @@
             </p:txBody>
           </p:sp>
         </mc:Choice>
-        <mc:Fallback>
+        <mc:Fallback xmlns="">
           <p:sp>
             <p:nvSpPr>
               <p:cNvPr id="9" name="Rounded Rectangle 8">
@@ -43896,8 +43926,8 @@
           </p:sp>
         </mc:Fallback>
       </mc:AlternateContent>
-      <mc:AlternateContent xmlns:mc="http://schemas.openxmlformats.org/markup-compatibility/2006">
-        <mc:Choice xmlns:a14="http://schemas.microsoft.com/office/drawing/2010/main" Requires="a14">
+      <mc:AlternateContent xmlns:mc="http://schemas.openxmlformats.org/markup-compatibility/2006" xmlns:a14="http://schemas.microsoft.com/office/drawing/2010/main">
+        <mc:Choice Requires="a14">
           <p:sp>
             <p:nvSpPr>
               <p:cNvPr id="10" name="Rounded Rectangle 9">
@@ -44110,7 +44140,7 @@
             </p:txBody>
           </p:sp>
         </mc:Choice>
-        <mc:Fallback>
+        <mc:Fallback xmlns="">
           <p:sp>
             <p:nvSpPr>
               <p:cNvPr id="10" name="Rounded Rectangle 9">
@@ -44252,8 +44282,8 @@
           </a:fontRef>
         </p:style>
       </p:cxnSp>
-      <mc:AlternateContent xmlns:mc="http://schemas.openxmlformats.org/markup-compatibility/2006">
-        <mc:Choice xmlns:a14="http://schemas.microsoft.com/office/drawing/2010/main" Requires="a14">
+      <mc:AlternateContent xmlns:mc="http://schemas.openxmlformats.org/markup-compatibility/2006" xmlns:a14="http://schemas.microsoft.com/office/drawing/2010/main">
+        <mc:Choice Requires="a14">
           <p:sp>
             <p:nvSpPr>
               <p:cNvPr id="13" name="TextBox 12">
@@ -44303,7 +44333,7 @@
             </p:txBody>
           </p:sp>
         </mc:Choice>
-        <mc:Fallback>
+        <mc:Fallback xmlns="">
           <p:sp>
             <p:nvSpPr>
               <p:cNvPr id="13" name="TextBox 12">
@@ -44348,8 +44378,8 @@
           </p:sp>
         </mc:Fallback>
       </mc:AlternateContent>
-      <mc:AlternateContent xmlns:mc="http://schemas.openxmlformats.org/markup-compatibility/2006">
-        <mc:Choice xmlns:a14="http://schemas.microsoft.com/office/drawing/2010/main" Requires="a14">
+      <mc:AlternateContent xmlns:mc="http://schemas.openxmlformats.org/markup-compatibility/2006" xmlns:a14="http://schemas.microsoft.com/office/drawing/2010/main">
+        <mc:Choice Requires="a14">
           <p:sp>
             <p:nvSpPr>
               <p:cNvPr id="14" name="TextBox 13">
@@ -44418,7 +44448,7 @@
             </p:txBody>
           </p:sp>
         </mc:Choice>
-        <mc:Fallback>
+        <mc:Fallback xmlns="">
           <p:sp>
             <p:nvSpPr>
               <p:cNvPr id="14" name="TextBox 13">
@@ -44646,8 +44676,8 @@
           </a:fontRef>
         </p:style>
       </p:cxnSp>
-      <mc:AlternateContent xmlns:mc="http://schemas.openxmlformats.org/markup-compatibility/2006">
-        <mc:Choice xmlns:a14="http://schemas.microsoft.com/office/drawing/2010/main" Requires="a14">
+      <mc:AlternateContent xmlns:mc="http://schemas.openxmlformats.org/markup-compatibility/2006" xmlns:a14="http://schemas.microsoft.com/office/drawing/2010/main">
+        <mc:Choice Requires="a14">
           <p:sp>
             <p:nvSpPr>
               <p:cNvPr id="19" name="TextBox 18">
@@ -44716,7 +44746,7 @@
             </p:txBody>
           </p:sp>
         </mc:Choice>
-        <mc:Fallback>
+        <mc:Fallback xmlns="">
           <p:sp>
             <p:nvSpPr>
               <p:cNvPr id="19" name="TextBox 18">
@@ -44853,8 +44883,8 @@
           </a:fontRef>
         </p:style>
       </p:cxnSp>
-      <mc:AlternateContent xmlns:mc="http://schemas.openxmlformats.org/markup-compatibility/2006">
-        <mc:Choice xmlns:a14="http://schemas.microsoft.com/office/drawing/2010/main" Requires="a14">
+      <mc:AlternateContent xmlns:mc="http://schemas.openxmlformats.org/markup-compatibility/2006" xmlns:a14="http://schemas.microsoft.com/office/drawing/2010/main">
+        <mc:Choice Requires="a14">
           <p:sp>
             <p:nvSpPr>
               <p:cNvPr id="22" name="Oval 21">
@@ -45008,7 +45038,7 @@
             </p:txBody>
           </p:sp>
         </mc:Choice>
-        <mc:Fallback>
+        <mc:Fallback xmlns="">
           <p:sp>
             <p:nvSpPr>
               <p:cNvPr id="22" name="Oval 21">
@@ -45058,8 +45088,8 @@
           </p:sp>
         </mc:Fallback>
       </mc:AlternateContent>
-      <mc:AlternateContent xmlns:mc="http://schemas.openxmlformats.org/markup-compatibility/2006">
-        <mc:Choice xmlns:a14="http://schemas.microsoft.com/office/drawing/2010/main" Requires="a14">
+      <mc:AlternateContent xmlns:mc="http://schemas.openxmlformats.org/markup-compatibility/2006" xmlns:a14="http://schemas.microsoft.com/office/drawing/2010/main">
+        <mc:Choice Requires="a14">
           <p:sp>
             <p:nvSpPr>
               <p:cNvPr id="24" name="Rounded Rectangle 23">
@@ -45205,7 +45235,7 @@
             </p:txBody>
           </p:sp>
         </mc:Choice>
-        <mc:Fallback>
+        <mc:Fallback xmlns="">
           <p:sp>
             <p:nvSpPr>
               <p:cNvPr id="24" name="Rounded Rectangle 23">
@@ -45255,8 +45285,8 @@
           </p:sp>
         </mc:Fallback>
       </mc:AlternateContent>
-      <mc:AlternateContent xmlns:mc="http://schemas.openxmlformats.org/markup-compatibility/2006">
-        <mc:Choice xmlns:a14="http://schemas.microsoft.com/office/drawing/2010/main" Requires="a14">
+      <mc:AlternateContent xmlns:mc="http://schemas.openxmlformats.org/markup-compatibility/2006" xmlns:a14="http://schemas.microsoft.com/office/drawing/2010/main">
+        <mc:Choice Requires="a14">
           <p:sp>
             <p:nvSpPr>
               <p:cNvPr id="28" name="TextBox 27">
@@ -45306,7 +45336,7 @@
             </p:txBody>
           </p:sp>
         </mc:Choice>
-        <mc:Fallback>
+        <mc:Fallback xmlns="">
           <p:sp>
             <p:nvSpPr>
               <p:cNvPr id="28" name="TextBox 27">
@@ -45351,8 +45381,8 @@
           </p:sp>
         </mc:Fallback>
       </mc:AlternateContent>
-      <mc:AlternateContent xmlns:mc="http://schemas.openxmlformats.org/markup-compatibility/2006">
-        <mc:Choice xmlns:a14="http://schemas.microsoft.com/office/drawing/2010/main" Requires="a14">
+      <mc:AlternateContent xmlns:mc="http://schemas.openxmlformats.org/markup-compatibility/2006" xmlns:a14="http://schemas.microsoft.com/office/drawing/2010/main">
+        <mc:Choice Requires="a14">
           <p:sp>
             <p:nvSpPr>
               <p:cNvPr id="29" name="TextBox 28">
@@ -45421,7 +45451,7 @@
             </p:txBody>
           </p:sp>
         </mc:Choice>
-        <mc:Fallback>
+        <mc:Fallback xmlns="">
           <p:sp>
             <p:nvSpPr>
               <p:cNvPr id="29" name="TextBox 28">
@@ -45466,8 +45496,8 @@
           </p:sp>
         </mc:Fallback>
       </mc:AlternateContent>
-      <mc:AlternateContent xmlns:mc="http://schemas.openxmlformats.org/markup-compatibility/2006">
-        <mc:Choice xmlns:a14="http://schemas.microsoft.com/office/drawing/2010/main" Requires="a14">
+      <mc:AlternateContent xmlns:mc="http://schemas.openxmlformats.org/markup-compatibility/2006" xmlns:a14="http://schemas.microsoft.com/office/drawing/2010/main">
+        <mc:Choice Requires="a14">
           <p:sp>
             <p:nvSpPr>
               <p:cNvPr id="36" name="Oval 35">
@@ -45621,7 +45651,7 @@
             </p:txBody>
           </p:sp>
         </mc:Choice>
-        <mc:Fallback>
+        <mc:Fallback xmlns="">
           <p:sp>
             <p:nvSpPr>
               <p:cNvPr id="36" name="Oval 35">
@@ -45855,8 +45885,8 @@
           </a:fontRef>
         </p:style>
       </p:cxnSp>
-      <mc:AlternateContent xmlns:mc="http://schemas.openxmlformats.org/markup-compatibility/2006">
-        <mc:Choice xmlns:a14="http://schemas.microsoft.com/office/drawing/2010/main" Requires="a14">
+      <mc:AlternateContent xmlns:mc="http://schemas.openxmlformats.org/markup-compatibility/2006" xmlns:a14="http://schemas.microsoft.com/office/drawing/2010/main">
+        <mc:Choice Requires="a14">
           <p:sp>
             <p:nvSpPr>
               <p:cNvPr id="49" name="TextBox 48">
@@ -45906,7 +45936,7 @@
             </p:txBody>
           </p:sp>
         </mc:Choice>
-        <mc:Fallback>
+        <mc:Fallback xmlns="">
           <p:sp>
             <p:nvSpPr>
               <p:cNvPr id="49" name="TextBox 48">
@@ -45951,8 +45981,8 @@
           </p:sp>
         </mc:Fallback>
       </mc:AlternateContent>
-      <mc:AlternateContent xmlns:mc="http://schemas.openxmlformats.org/markup-compatibility/2006">
-        <mc:Choice xmlns:a14="http://schemas.microsoft.com/office/drawing/2010/main" Requires="a14">
+      <mc:AlternateContent xmlns:mc="http://schemas.openxmlformats.org/markup-compatibility/2006" xmlns:a14="http://schemas.microsoft.com/office/drawing/2010/main">
+        <mc:Choice Requires="a14">
           <p:sp>
             <p:nvSpPr>
               <p:cNvPr id="50" name="TextBox 49">
@@ -46021,7 +46051,7 @@
             </p:txBody>
           </p:sp>
         </mc:Choice>
-        <mc:Fallback>
+        <mc:Fallback xmlns="">
           <p:sp>
             <p:nvSpPr>
               <p:cNvPr id="50" name="TextBox 49">
@@ -46066,8 +46096,8 @@
           </p:sp>
         </mc:Fallback>
       </mc:AlternateContent>
-      <mc:AlternateContent xmlns:mc="http://schemas.openxmlformats.org/markup-compatibility/2006">
-        <mc:Choice xmlns:a14="http://schemas.microsoft.com/office/drawing/2010/main" Requires="a14">
+      <mc:AlternateContent xmlns:mc="http://schemas.openxmlformats.org/markup-compatibility/2006" xmlns:a14="http://schemas.microsoft.com/office/drawing/2010/main">
+        <mc:Choice Requires="a14">
           <p:sp>
             <p:nvSpPr>
               <p:cNvPr id="51" name="Rounded Rectangle 50">
@@ -46270,7 +46300,7 @@
             </p:txBody>
           </p:sp>
         </mc:Choice>
-        <mc:Fallback>
+        <mc:Fallback xmlns="">
           <p:sp>
             <p:nvSpPr>
               <p:cNvPr id="51" name="Rounded Rectangle 50">
@@ -46322,8 +46352,8 @@
           </p:sp>
         </mc:Fallback>
       </mc:AlternateContent>
-      <mc:AlternateContent xmlns:mc="http://schemas.openxmlformats.org/markup-compatibility/2006">
-        <mc:Choice xmlns:a14="http://schemas.microsoft.com/office/drawing/2010/main" Requires="a14">
+      <mc:AlternateContent xmlns:mc="http://schemas.openxmlformats.org/markup-compatibility/2006" xmlns:a14="http://schemas.microsoft.com/office/drawing/2010/main">
+        <mc:Choice Requires="a14">
           <p:sp>
             <p:nvSpPr>
               <p:cNvPr id="52" name="Rounded Rectangle 51">
@@ -46548,7 +46578,7 @@
             </p:txBody>
           </p:sp>
         </mc:Choice>
-        <mc:Fallback>
+        <mc:Fallback xmlns="">
           <p:sp>
             <p:nvSpPr>
               <p:cNvPr id="52" name="Rounded Rectangle 51">
@@ -46600,8 +46630,8 @@
           </p:sp>
         </mc:Fallback>
       </mc:AlternateContent>
-      <mc:AlternateContent xmlns:mc="http://schemas.openxmlformats.org/markup-compatibility/2006">
-        <mc:Choice xmlns:a14="http://schemas.microsoft.com/office/drawing/2010/main" Requires="a14">
+      <mc:AlternateContent xmlns:mc="http://schemas.openxmlformats.org/markup-compatibility/2006" xmlns:a14="http://schemas.microsoft.com/office/drawing/2010/main">
+        <mc:Choice Requires="a14">
           <p:sp>
             <p:nvSpPr>
               <p:cNvPr id="53" name="Rounded Rectangle 52">
@@ -46826,7 +46856,7 @@
             </p:txBody>
           </p:sp>
         </mc:Choice>
-        <mc:Fallback>
+        <mc:Fallback xmlns="">
           <p:sp>
             <p:nvSpPr>
               <p:cNvPr id="53" name="Rounded Rectangle 52">
@@ -46970,8 +47000,8 @@
           </a:fontRef>
         </p:style>
       </p:cxnSp>
-      <mc:AlternateContent xmlns:mc="http://schemas.openxmlformats.org/markup-compatibility/2006">
-        <mc:Choice xmlns:a14="http://schemas.microsoft.com/office/drawing/2010/main" Requires="a14">
+      <mc:AlternateContent xmlns:mc="http://schemas.openxmlformats.org/markup-compatibility/2006" xmlns:a14="http://schemas.microsoft.com/office/drawing/2010/main">
+        <mc:Choice Requires="a14">
           <p:sp>
             <p:nvSpPr>
               <p:cNvPr id="56" name="TextBox 55">
@@ -47040,7 +47070,7 @@
             </p:txBody>
           </p:sp>
         </mc:Choice>
-        <mc:Fallback>
+        <mc:Fallback xmlns="">
           <p:sp>
             <p:nvSpPr>
               <p:cNvPr id="56" name="TextBox 55">
@@ -47085,8 +47115,8 @@
           </p:sp>
         </mc:Fallback>
       </mc:AlternateContent>
-      <mc:AlternateContent xmlns:mc="http://schemas.openxmlformats.org/markup-compatibility/2006">
-        <mc:Choice xmlns:a14="http://schemas.microsoft.com/office/drawing/2010/main" Requires="a14">
+      <mc:AlternateContent xmlns:mc="http://schemas.openxmlformats.org/markup-compatibility/2006" xmlns:a14="http://schemas.microsoft.com/office/drawing/2010/main">
+        <mc:Choice Requires="a14">
           <p:sp>
             <p:nvSpPr>
               <p:cNvPr id="57" name="TextBox 56">
@@ -47136,7 +47166,7 @@
             </p:txBody>
           </p:sp>
         </mc:Choice>
-        <mc:Fallback>
+        <mc:Fallback xmlns="">
           <p:sp>
             <p:nvSpPr>
               <p:cNvPr id="57" name="TextBox 56">
@@ -47181,8 +47211,8 @@
           </p:sp>
         </mc:Fallback>
       </mc:AlternateContent>
-      <mc:AlternateContent xmlns:mc="http://schemas.openxmlformats.org/markup-compatibility/2006">
-        <mc:Choice xmlns:a14="http://schemas.microsoft.com/office/drawing/2010/main" Requires="a14">
+      <mc:AlternateContent xmlns:mc="http://schemas.openxmlformats.org/markup-compatibility/2006" xmlns:a14="http://schemas.microsoft.com/office/drawing/2010/main">
+        <mc:Choice Requires="a14">
           <p:sp>
             <p:nvSpPr>
               <p:cNvPr id="58" name="TextBox 57">
@@ -47232,7 +47262,7 @@
             </p:txBody>
           </p:sp>
         </mc:Choice>
-        <mc:Fallback>
+        <mc:Fallback xmlns="">
           <p:sp>
             <p:nvSpPr>
               <p:cNvPr id="58" name="TextBox 57">
@@ -47277,8 +47307,8 @@
           </p:sp>
         </mc:Fallback>
       </mc:AlternateContent>
-      <mc:AlternateContent xmlns:mc="http://schemas.openxmlformats.org/markup-compatibility/2006">
-        <mc:Choice xmlns:a14="http://schemas.microsoft.com/office/drawing/2010/main" Requires="a14">
+      <mc:AlternateContent xmlns:mc="http://schemas.openxmlformats.org/markup-compatibility/2006" xmlns:a14="http://schemas.microsoft.com/office/drawing/2010/main">
+        <mc:Choice Requires="a14">
           <p:sp>
             <p:nvSpPr>
               <p:cNvPr id="59" name="Rounded Rectangle 58">
@@ -47483,7 +47513,7 @@
             </p:txBody>
           </p:sp>
         </mc:Choice>
-        <mc:Fallback>
+        <mc:Fallback xmlns="">
           <p:sp>
             <p:nvSpPr>
               <p:cNvPr id="59" name="Rounded Rectangle 58">
@@ -47537,8 +47567,8 @@
           </p:sp>
         </mc:Fallback>
       </mc:AlternateContent>
-      <mc:AlternateContent xmlns:mc="http://schemas.openxmlformats.org/markup-compatibility/2006">
-        <mc:Choice xmlns:a14="http://schemas.microsoft.com/office/drawing/2010/main" Requires="a14">
+      <mc:AlternateContent xmlns:mc="http://schemas.openxmlformats.org/markup-compatibility/2006" xmlns:a14="http://schemas.microsoft.com/office/drawing/2010/main">
+        <mc:Choice Requires="a14">
           <p:sp>
             <p:nvSpPr>
               <p:cNvPr id="60" name="TextBox 59">
@@ -47588,7 +47618,7 @@
             </p:txBody>
           </p:sp>
         </mc:Choice>
-        <mc:Fallback>
+        <mc:Fallback xmlns="">
           <p:sp>
             <p:nvSpPr>
               <p:cNvPr id="60" name="TextBox 59">
@@ -47633,8 +47663,8 @@
           </p:sp>
         </mc:Fallback>
       </mc:AlternateContent>
-      <mc:AlternateContent xmlns:mc="http://schemas.openxmlformats.org/markup-compatibility/2006">
-        <mc:Choice xmlns:a14="http://schemas.microsoft.com/office/drawing/2010/main" Requires="a14">
+      <mc:AlternateContent xmlns:mc="http://schemas.openxmlformats.org/markup-compatibility/2006" xmlns:a14="http://schemas.microsoft.com/office/drawing/2010/main">
+        <mc:Choice Requires="a14">
           <p:sp>
             <p:nvSpPr>
               <p:cNvPr id="61" name="Rounded Rectangle 60">
@@ -47809,7 +47839,7 @@
             </p:txBody>
           </p:sp>
         </mc:Choice>
-        <mc:Fallback>
+        <mc:Fallback xmlns="">
           <p:sp>
             <p:nvSpPr>
               <p:cNvPr id="61" name="Rounded Rectangle 60">
@@ -47861,8 +47891,8 @@
           </p:sp>
         </mc:Fallback>
       </mc:AlternateContent>
-      <mc:AlternateContent xmlns:mc="http://schemas.openxmlformats.org/markup-compatibility/2006">
-        <mc:Choice xmlns:a14="http://schemas.microsoft.com/office/drawing/2010/main" Requires="a14">
+      <mc:AlternateContent xmlns:mc="http://schemas.openxmlformats.org/markup-compatibility/2006" xmlns:a14="http://schemas.microsoft.com/office/drawing/2010/main">
+        <mc:Choice Requires="a14">
           <p:sp>
             <p:nvSpPr>
               <p:cNvPr id="62" name="TextBox 61">
@@ -47912,7 +47942,7 @@
             </p:txBody>
           </p:sp>
         </mc:Choice>
-        <mc:Fallback>
+        <mc:Fallback xmlns="">
           <p:sp>
             <p:nvSpPr>
               <p:cNvPr id="62" name="TextBox 61">
@@ -47957,8 +47987,8 @@
           </p:sp>
         </mc:Fallback>
       </mc:AlternateContent>
-      <mc:AlternateContent xmlns:mc="http://schemas.openxmlformats.org/markup-compatibility/2006">
-        <mc:Choice xmlns:a14="http://schemas.microsoft.com/office/drawing/2010/main" Requires="a14">
+      <mc:AlternateContent xmlns:mc="http://schemas.openxmlformats.org/markup-compatibility/2006" xmlns:a14="http://schemas.microsoft.com/office/drawing/2010/main">
+        <mc:Choice Requires="a14">
           <p:sp>
             <p:nvSpPr>
               <p:cNvPr id="65" name="Rounded Rectangle 64">
@@ -48106,7 +48136,7 @@
             </p:txBody>
           </p:sp>
         </mc:Choice>
-        <mc:Fallback>
+        <mc:Fallback xmlns="">
           <p:sp>
             <p:nvSpPr>
               <p:cNvPr id="65" name="Rounded Rectangle 64">
@@ -48158,8 +48188,8 @@
           </p:sp>
         </mc:Fallback>
       </mc:AlternateContent>
-      <mc:AlternateContent xmlns:mc="http://schemas.openxmlformats.org/markup-compatibility/2006">
-        <mc:Choice xmlns:a14="http://schemas.microsoft.com/office/drawing/2010/main" Requires="a14">
+      <mc:AlternateContent xmlns:mc="http://schemas.openxmlformats.org/markup-compatibility/2006" xmlns:a14="http://schemas.microsoft.com/office/drawing/2010/main">
+        <mc:Choice Requires="a14">
           <p:sp>
             <p:nvSpPr>
               <p:cNvPr id="66" name="Rounded Rectangle 65">
@@ -48307,7 +48337,7 @@
             </p:txBody>
           </p:sp>
         </mc:Choice>
-        <mc:Fallback>
+        <mc:Fallback xmlns="">
           <p:sp>
             <p:nvSpPr>
               <p:cNvPr id="66" name="Rounded Rectangle 65">
@@ -48359,8 +48389,8 @@
           </p:sp>
         </mc:Fallback>
       </mc:AlternateContent>
-      <mc:AlternateContent xmlns:mc="http://schemas.openxmlformats.org/markup-compatibility/2006">
-        <mc:Choice xmlns:a14="http://schemas.microsoft.com/office/drawing/2010/main" Requires="a14">
+      <mc:AlternateContent xmlns:mc="http://schemas.openxmlformats.org/markup-compatibility/2006" xmlns:a14="http://schemas.microsoft.com/office/drawing/2010/main">
+        <mc:Choice Requires="a14">
           <p:sp>
             <p:nvSpPr>
               <p:cNvPr id="67" name="Rounded Rectangle 66">
@@ -48508,7 +48538,7 @@
             </p:txBody>
           </p:sp>
         </mc:Choice>
-        <mc:Fallback>
+        <mc:Fallback xmlns="">
           <p:sp>
             <p:nvSpPr>
               <p:cNvPr id="67" name="Rounded Rectangle 66">
@@ -48560,8 +48590,8 @@
           </p:sp>
         </mc:Fallback>
       </mc:AlternateContent>
-      <mc:AlternateContent xmlns:mc="http://schemas.openxmlformats.org/markup-compatibility/2006">
-        <mc:Choice xmlns:a14="http://schemas.microsoft.com/office/drawing/2010/main" Requires="a14">
+      <mc:AlternateContent xmlns:mc="http://schemas.openxmlformats.org/markup-compatibility/2006" xmlns:a14="http://schemas.microsoft.com/office/drawing/2010/main">
+        <mc:Choice Requires="a14">
           <p:sp>
             <p:nvSpPr>
               <p:cNvPr id="68" name="Rounded Rectangle 67">
@@ -48709,7 +48739,7 @@
             </p:txBody>
           </p:sp>
         </mc:Choice>
-        <mc:Fallback>
+        <mc:Fallback xmlns="">
           <p:sp>
             <p:nvSpPr>
               <p:cNvPr id="68" name="Rounded Rectangle 67">
@@ -49533,8 +49563,8 @@
           </p:style>
         </p:cxnSp>
       </p:grpSp>
-      <mc:AlternateContent xmlns:mc="http://schemas.openxmlformats.org/markup-compatibility/2006">
-        <mc:Choice xmlns:a14="http://schemas.microsoft.com/office/drawing/2010/main" Requires="a14">
+      <mc:AlternateContent xmlns:mc="http://schemas.openxmlformats.org/markup-compatibility/2006" xmlns:a14="http://schemas.microsoft.com/office/drawing/2010/main">
+        <mc:Choice Requires="a14">
           <p:sp>
             <p:nvSpPr>
               <p:cNvPr id="74" name="Rectangle 73">
@@ -49583,7 +49613,7 @@
             </p:txBody>
           </p:sp>
         </mc:Choice>
-        <mc:Fallback>
+        <mc:Fallback xmlns="">
           <p:sp>
             <p:nvSpPr>
               <p:cNvPr id="74" name="Rectangle 73">
@@ -49871,8 +49901,8 @@
               </a:p>
             </p:txBody>
           </p:sp>
-          <mc:AlternateContent xmlns:mc="http://schemas.openxmlformats.org/markup-compatibility/2006">
-            <mc:Choice xmlns:a14="http://schemas.microsoft.com/office/drawing/2010/main" Requires="a14">
+          <mc:AlternateContent xmlns:mc="http://schemas.openxmlformats.org/markup-compatibility/2006" xmlns:a14="http://schemas.microsoft.com/office/drawing/2010/main">
+            <mc:Choice Requires="a14">
               <p:sp>
                 <p:nvSpPr>
                   <p:cNvPr id="106" name="Rounded Rectangle 105">
@@ -50081,7 +50111,7 @@
                 </p:txBody>
               </p:sp>
             </mc:Choice>
-            <mc:Fallback>
+            <mc:Fallback xmlns="">
               <p:sp>
                 <p:nvSpPr>
                   <p:cNvPr id="106" name="Rounded Rectangle 105">
@@ -50548,8 +50578,8 @@
             </p:style>
           </p:cxnSp>
         </p:grpSp>
-        <mc:AlternateContent xmlns:mc="http://schemas.openxmlformats.org/markup-compatibility/2006">
-          <mc:Choice xmlns:a14="http://schemas.microsoft.com/office/drawing/2010/main" Requires="a14">
+        <mc:AlternateContent xmlns:mc="http://schemas.openxmlformats.org/markup-compatibility/2006" xmlns:a14="http://schemas.microsoft.com/office/drawing/2010/main">
+          <mc:Choice Requires="a14">
             <p:sp>
               <p:nvSpPr>
                 <p:cNvPr id="99" name="TextBox 98">
@@ -50611,7 +50641,7 @@
               </p:txBody>
             </p:sp>
           </mc:Choice>
-          <mc:Fallback>
+          <mc:Fallback xmlns="">
             <p:sp>
               <p:nvSpPr>
                 <p:cNvPr id="99" name="TextBox 98">
@@ -50941,8 +50971,8 @@
           </a:p>
         </p:txBody>
       </p:sp>
-      <mc:AlternateContent xmlns:mc="http://schemas.openxmlformats.org/markup-compatibility/2006">
-        <mc:Choice xmlns:a14="http://schemas.microsoft.com/office/drawing/2010/main" Requires="a14">
+      <mc:AlternateContent xmlns:mc="http://schemas.openxmlformats.org/markup-compatibility/2006" xmlns:a14="http://schemas.microsoft.com/office/drawing/2010/main">
+        <mc:Choice Requires="a14">
           <p:sp>
             <p:nvSpPr>
               <p:cNvPr id="117" name="TextBox 116">
@@ -51011,7 +51041,7 @@
             </p:txBody>
           </p:sp>
         </mc:Choice>
-        <mc:Fallback>
+        <mc:Fallback xmlns="">
           <p:sp>
             <p:nvSpPr>
               <p:cNvPr id="117" name="TextBox 116">
@@ -51056,8 +51086,8 @@
           </p:sp>
         </mc:Fallback>
       </mc:AlternateContent>
-      <mc:AlternateContent xmlns:mc="http://schemas.openxmlformats.org/markup-compatibility/2006">
-        <mc:Choice xmlns:a14="http://schemas.microsoft.com/office/drawing/2010/main" Requires="a14">
+      <mc:AlternateContent xmlns:mc="http://schemas.openxmlformats.org/markup-compatibility/2006" xmlns:a14="http://schemas.microsoft.com/office/drawing/2010/main">
+        <mc:Choice Requires="a14">
           <p:sp>
             <p:nvSpPr>
               <p:cNvPr id="118" name="TextBox 117">
@@ -51126,7 +51156,7 @@
             </p:txBody>
           </p:sp>
         </mc:Choice>
-        <mc:Fallback>
+        <mc:Fallback xmlns="">
           <p:sp>
             <p:nvSpPr>
               <p:cNvPr id="118" name="TextBox 117">
@@ -51171,8 +51201,8 @@
           </p:sp>
         </mc:Fallback>
       </mc:AlternateContent>
-      <mc:AlternateContent xmlns:mc="http://schemas.openxmlformats.org/markup-compatibility/2006">
-        <mc:Choice xmlns:a14="http://schemas.microsoft.com/office/drawing/2010/main" Requires="a14">
+      <mc:AlternateContent xmlns:mc="http://schemas.openxmlformats.org/markup-compatibility/2006" xmlns:a14="http://schemas.microsoft.com/office/drawing/2010/main">
+        <mc:Choice Requires="a14">
           <p:sp>
             <p:nvSpPr>
               <p:cNvPr id="119" name="TextBox 118">
@@ -51241,7 +51271,7 @@
             </p:txBody>
           </p:sp>
         </mc:Choice>
-        <mc:Fallback>
+        <mc:Fallback xmlns="">
           <p:sp>
             <p:nvSpPr>
               <p:cNvPr id="119" name="TextBox 118">
@@ -51286,8 +51316,8 @@
           </p:sp>
         </mc:Fallback>
       </mc:AlternateContent>
-      <mc:AlternateContent xmlns:mc="http://schemas.openxmlformats.org/markup-compatibility/2006">
-        <mc:Choice xmlns:a14="http://schemas.microsoft.com/office/drawing/2010/main" Requires="a14">
+      <mc:AlternateContent xmlns:mc="http://schemas.openxmlformats.org/markup-compatibility/2006" xmlns:a14="http://schemas.microsoft.com/office/drawing/2010/main">
+        <mc:Choice Requires="a14">
           <p:sp>
             <p:nvSpPr>
               <p:cNvPr id="121" name="TextBox 120">
@@ -51356,7 +51386,7 @@
             </p:txBody>
           </p:sp>
         </mc:Choice>
-        <mc:Fallback>
+        <mc:Fallback xmlns="">
           <p:sp>
             <p:nvSpPr>
               <p:cNvPr id="121" name="TextBox 120">
@@ -51401,8 +51431,8 @@
           </p:sp>
         </mc:Fallback>
       </mc:AlternateContent>
-      <mc:AlternateContent xmlns:mc="http://schemas.openxmlformats.org/markup-compatibility/2006">
-        <mc:Choice xmlns:a14="http://schemas.microsoft.com/office/drawing/2010/main" Requires="a14">
+      <mc:AlternateContent xmlns:mc="http://schemas.openxmlformats.org/markup-compatibility/2006" xmlns:a14="http://schemas.microsoft.com/office/drawing/2010/main">
+        <mc:Choice Requires="a14">
           <p:sp>
             <p:nvSpPr>
               <p:cNvPr id="125" name="Rounded Rectangle 124">
@@ -51548,7 +51578,7 @@
             </p:txBody>
           </p:sp>
         </mc:Choice>
-        <mc:Fallback>
+        <mc:Fallback xmlns="">
           <p:sp>
             <p:nvSpPr>
               <p:cNvPr id="125" name="Rounded Rectangle 124">
@@ -51598,8 +51628,8 @@
           </p:sp>
         </mc:Fallback>
       </mc:AlternateContent>
-      <mc:AlternateContent xmlns:mc="http://schemas.openxmlformats.org/markup-compatibility/2006">
-        <mc:Choice xmlns:a14="http://schemas.microsoft.com/office/drawing/2010/main" Requires="a14">
+      <mc:AlternateContent xmlns:mc="http://schemas.openxmlformats.org/markup-compatibility/2006" xmlns:a14="http://schemas.microsoft.com/office/drawing/2010/main">
+        <mc:Choice Requires="a14">
           <p:sp>
             <p:nvSpPr>
               <p:cNvPr id="126" name="Rounded Rectangle 125">
@@ -51745,7 +51775,7 @@
             </p:txBody>
           </p:sp>
         </mc:Choice>
-        <mc:Fallback>
+        <mc:Fallback xmlns="">
           <p:sp>
             <p:nvSpPr>
               <p:cNvPr id="126" name="Rounded Rectangle 125">
@@ -51795,8 +51825,8 @@
           </p:sp>
         </mc:Fallback>
       </mc:AlternateContent>
-      <mc:AlternateContent xmlns:mc="http://schemas.openxmlformats.org/markup-compatibility/2006">
-        <mc:Choice xmlns:a14="http://schemas.microsoft.com/office/drawing/2010/main" Requires="a14">
+      <mc:AlternateContent xmlns:mc="http://schemas.openxmlformats.org/markup-compatibility/2006" xmlns:a14="http://schemas.microsoft.com/office/drawing/2010/main">
+        <mc:Choice Requires="a14">
           <p:sp>
             <p:nvSpPr>
               <p:cNvPr id="128" name="Rounded Rectangle 127">
@@ -51942,7 +51972,7 @@
             </p:txBody>
           </p:sp>
         </mc:Choice>
-        <mc:Fallback>
+        <mc:Fallback xmlns="">
           <p:sp>
             <p:nvSpPr>
               <p:cNvPr id="128" name="Rounded Rectangle 127">

</xml_diff>